<commit_message>
updates for infocom submission
</commit_message>
<xml_diff>
--- a/images/architecture-redux.pptx
+++ b/images/architecture-redux.pptx
@@ -5,7 +5,7 @@
     <p:sldMasterId id="2147483648" r:id="rId1"/>
   </p:sldMasterIdLst>
   <p:notesMasterIdLst>
-    <p:notesMasterId r:id="rId10"/>
+    <p:notesMasterId r:id="rId11"/>
   </p:notesMasterIdLst>
   <p:sldIdLst>
     <p:sldId id="256" r:id="rId2"/>
@@ -16,6 +16,7 @@
     <p:sldId id="262" r:id="rId7"/>
     <p:sldId id="263" r:id="rId8"/>
     <p:sldId id="264" r:id="rId9"/>
+    <p:sldId id="265" r:id="rId10"/>
   </p:sldIdLst>
   <p:sldSz cx="12192000" cy="6858000"/>
   <p:notesSz cx="6858000" cy="9144000"/>
@@ -122,7 +123,7 @@
             <a:srgbClr val="A4A3A4"/>
           </p15:clr>
         </p15:guide>
-        <p15:guide id="2" pos="3840" userDrawn="1">
+        <p15:guide id="2" pos="3864" userDrawn="1">
           <p15:clr>
             <a:srgbClr val="A4A3A4"/>
           </p15:clr>
@@ -215,7 +216,7 @@
           <a:p>
             <a:fld id="{D4905BDC-F0FA-FC48-81D9-06A9CC513ED1}" type="datetimeFigureOut">
               <a:rPr lang="en-US" smtClean="0"/>
-              <a:t>5/10/19</a:t>
+              <a:t>7/12/21</a:t>
             </a:fld>
             <a:endParaRPr lang="en-US"/>
           </a:p>
@@ -279,38 +280,37 @@
           <a:p>
             <a:pPr lvl="0"/>
             <a:r>
-              <a:rPr lang="en-US" smtClean="0"/>
+              <a:rPr lang="en-US"/>
               <a:t>Click to edit Master text styles</a:t>
             </a:r>
           </a:p>
           <a:p>
             <a:pPr lvl="1"/>
             <a:r>
-              <a:rPr lang="en-US" smtClean="0"/>
+              <a:rPr lang="en-US"/>
               <a:t>Second level</a:t>
             </a:r>
           </a:p>
           <a:p>
             <a:pPr lvl="2"/>
             <a:r>
-              <a:rPr lang="en-US" smtClean="0"/>
+              <a:rPr lang="en-US"/>
               <a:t>Third level</a:t>
             </a:r>
           </a:p>
           <a:p>
             <a:pPr lvl="3"/>
             <a:r>
-              <a:rPr lang="en-US" smtClean="0"/>
+              <a:rPr lang="en-US"/>
               <a:t>Fourth level</a:t>
             </a:r>
           </a:p>
           <a:p>
             <a:pPr lvl="4"/>
             <a:r>
-              <a:rPr lang="en-US" smtClean="0"/>
+              <a:rPr lang="en-US"/>
               <a:t>Fifth level</a:t>
             </a:r>
-            <a:endParaRPr lang="en-US"/>
           </a:p>
         </p:txBody>
       </p:sp>
@@ -1030,7 +1030,7 @@
           <p:cNvPr id="2" name="Title 1">
             <a:extLst>
               <a:ext uri="{FF2B5EF4-FFF2-40B4-BE49-F238E27FC236}">
-                <a16:creationId xmlns="" xmlns:a16="http://schemas.microsoft.com/office/drawing/2014/main" id="{96081C46-9393-BE43-96F9-85CEEC26F0FA}"/>
+                <a16:creationId xmlns:a16="http://schemas.microsoft.com/office/drawing/2014/main" id="{96081C46-9393-BE43-96F9-85CEEC26F0FA}"/>
               </a:ext>
             </a:extLst>
           </p:cNvPr>
@@ -1067,7 +1067,7 @@
           <p:cNvPr id="3" name="Subtitle 2">
             <a:extLst>
               <a:ext uri="{FF2B5EF4-FFF2-40B4-BE49-F238E27FC236}">
-                <a16:creationId xmlns="" xmlns:a16="http://schemas.microsoft.com/office/drawing/2014/main" id="{BF2E2C2A-E9AA-DC49-B6CA-D768BA10DAF9}"/>
+                <a16:creationId xmlns:a16="http://schemas.microsoft.com/office/drawing/2014/main" id="{BF2E2C2A-E9AA-DC49-B6CA-D768BA10DAF9}"/>
               </a:ext>
             </a:extLst>
           </p:cNvPr>
@@ -1137,7 +1137,7 @@
           <p:cNvPr id="4" name="Date Placeholder 3">
             <a:extLst>
               <a:ext uri="{FF2B5EF4-FFF2-40B4-BE49-F238E27FC236}">
-                <a16:creationId xmlns="" xmlns:a16="http://schemas.microsoft.com/office/drawing/2014/main" id="{3A971158-9062-8345-AD73-34CE5E3C5190}"/>
+                <a16:creationId xmlns:a16="http://schemas.microsoft.com/office/drawing/2014/main" id="{3A971158-9062-8345-AD73-34CE5E3C5190}"/>
               </a:ext>
             </a:extLst>
           </p:cNvPr>
@@ -1155,7 +1155,7 @@
           <a:p>
             <a:fld id="{92A59E99-CB85-EC4A-A89B-6E9F71EC8DDF}" type="datetimeFigureOut">
               <a:rPr lang="en-US" smtClean="0"/>
-              <a:t>5/10/19</a:t>
+              <a:t>7/12/21</a:t>
             </a:fld>
             <a:endParaRPr lang="en-US"/>
           </a:p>
@@ -1166,7 +1166,7 @@
           <p:cNvPr id="5" name="Footer Placeholder 4">
             <a:extLst>
               <a:ext uri="{FF2B5EF4-FFF2-40B4-BE49-F238E27FC236}">
-                <a16:creationId xmlns="" xmlns:a16="http://schemas.microsoft.com/office/drawing/2014/main" id="{7A92EEF0-A4BA-3641-9047-260FA4D5B47E}"/>
+                <a16:creationId xmlns:a16="http://schemas.microsoft.com/office/drawing/2014/main" id="{7A92EEF0-A4BA-3641-9047-260FA4D5B47E}"/>
               </a:ext>
             </a:extLst>
           </p:cNvPr>
@@ -1191,7 +1191,7 @@
           <p:cNvPr id="6" name="Slide Number Placeholder 5">
             <a:extLst>
               <a:ext uri="{FF2B5EF4-FFF2-40B4-BE49-F238E27FC236}">
-                <a16:creationId xmlns="" xmlns:a16="http://schemas.microsoft.com/office/drawing/2014/main" id="{A0097C1A-3130-4448-B317-DD26E39F2CC1}"/>
+                <a16:creationId xmlns:a16="http://schemas.microsoft.com/office/drawing/2014/main" id="{A0097C1A-3130-4448-B317-DD26E39F2CC1}"/>
               </a:ext>
             </a:extLst>
           </p:cNvPr>
@@ -1250,7 +1250,7 @@
           <p:cNvPr id="2" name="Title 1">
             <a:extLst>
               <a:ext uri="{FF2B5EF4-FFF2-40B4-BE49-F238E27FC236}">
-                <a16:creationId xmlns="" xmlns:a16="http://schemas.microsoft.com/office/drawing/2014/main" id="{F4C52F57-6064-B94E-B90B-0315C5BAFB6C}"/>
+                <a16:creationId xmlns:a16="http://schemas.microsoft.com/office/drawing/2014/main" id="{F4C52F57-6064-B94E-B90B-0315C5BAFB6C}"/>
               </a:ext>
             </a:extLst>
           </p:cNvPr>
@@ -1278,7 +1278,7 @@
           <p:cNvPr id="3" name="Vertical Text Placeholder 2">
             <a:extLst>
               <a:ext uri="{FF2B5EF4-FFF2-40B4-BE49-F238E27FC236}">
-                <a16:creationId xmlns="" xmlns:a16="http://schemas.microsoft.com/office/drawing/2014/main" id="{3EC9DA28-AA3D-9E44-AE0A-E4D7565CCCF1}"/>
+                <a16:creationId xmlns:a16="http://schemas.microsoft.com/office/drawing/2014/main" id="{3EC9DA28-AA3D-9E44-AE0A-E4D7565CCCF1}"/>
               </a:ext>
             </a:extLst>
           </p:cNvPr>
@@ -1335,7 +1335,7 @@
           <p:cNvPr id="4" name="Date Placeholder 3">
             <a:extLst>
               <a:ext uri="{FF2B5EF4-FFF2-40B4-BE49-F238E27FC236}">
-                <a16:creationId xmlns="" xmlns:a16="http://schemas.microsoft.com/office/drawing/2014/main" id="{CDF35FDA-3ECA-EE45-BC5F-220D4AD4B3B1}"/>
+                <a16:creationId xmlns:a16="http://schemas.microsoft.com/office/drawing/2014/main" id="{CDF35FDA-3ECA-EE45-BC5F-220D4AD4B3B1}"/>
               </a:ext>
             </a:extLst>
           </p:cNvPr>
@@ -1353,7 +1353,7 @@
           <a:p>
             <a:fld id="{92A59E99-CB85-EC4A-A89B-6E9F71EC8DDF}" type="datetimeFigureOut">
               <a:rPr lang="en-US" smtClean="0"/>
-              <a:t>5/10/19</a:t>
+              <a:t>7/12/21</a:t>
             </a:fld>
             <a:endParaRPr lang="en-US"/>
           </a:p>
@@ -1364,7 +1364,7 @@
           <p:cNvPr id="5" name="Footer Placeholder 4">
             <a:extLst>
               <a:ext uri="{FF2B5EF4-FFF2-40B4-BE49-F238E27FC236}">
-                <a16:creationId xmlns="" xmlns:a16="http://schemas.microsoft.com/office/drawing/2014/main" id="{33BFADED-89A3-9E42-A4C9-0E5DC97451C7}"/>
+                <a16:creationId xmlns:a16="http://schemas.microsoft.com/office/drawing/2014/main" id="{33BFADED-89A3-9E42-A4C9-0E5DC97451C7}"/>
               </a:ext>
             </a:extLst>
           </p:cNvPr>
@@ -1389,7 +1389,7 @@
           <p:cNvPr id="6" name="Slide Number Placeholder 5">
             <a:extLst>
               <a:ext uri="{FF2B5EF4-FFF2-40B4-BE49-F238E27FC236}">
-                <a16:creationId xmlns="" xmlns:a16="http://schemas.microsoft.com/office/drawing/2014/main" id="{35CA664E-D8D0-EB42-B677-5D5AB24CA6C0}"/>
+                <a16:creationId xmlns:a16="http://schemas.microsoft.com/office/drawing/2014/main" id="{35CA664E-D8D0-EB42-B677-5D5AB24CA6C0}"/>
               </a:ext>
             </a:extLst>
           </p:cNvPr>
@@ -1448,7 +1448,7 @@
           <p:cNvPr id="2" name="Vertical Title 1">
             <a:extLst>
               <a:ext uri="{FF2B5EF4-FFF2-40B4-BE49-F238E27FC236}">
-                <a16:creationId xmlns="" xmlns:a16="http://schemas.microsoft.com/office/drawing/2014/main" id="{1E92F913-22FC-9744-97B5-786BEB5F8AF9}"/>
+                <a16:creationId xmlns:a16="http://schemas.microsoft.com/office/drawing/2014/main" id="{1E92F913-22FC-9744-97B5-786BEB5F8AF9}"/>
               </a:ext>
             </a:extLst>
           </p:cNvPr>
@@ -1481,7 +1481,7 @@
           <p:cNvPr id="3" name="Vertical Text Placeholder 2">
             <a:extLst>
               <a:ext uri="{FF2B5EF4-FFF2-40B4-BE49-F238E27FC236}">
-                <a16:creationId xmlns="" xmlns:a16="http://schemas.microsoft.com/office/drawing/2014/main" id="{9F9B6321-C99E-C143-8E40-4399B97F4552}"/>
+                <a16:creationId xmlns:a16="http://schemas.microsoft.com/office/drawing/2014/main" id="{9F9B6321-C99E-C143-8E40-4399B97F4552}"/>
               </a:ext>
             </a:extLst>
           </p:cNvPr>
@@ -1543,7 +1543,7 @@
           <p:cNvPr id="4" name="Date Placeholder 3">
             <a:extLst>
               <a:ext uri="{FF2B5EF4-FFF2-40B4-BE49-F238E27FC236}">
-                <a16:creationId xmlns="" xmlns:a16="http://schemas.microsoft.com/office/drawing/2014/main" id="{5D168020-D24D-B647-9626-4C1D635AF199}"/>
+                <a16:creationId xmlns:a16="http://schemas.microsoft.com/office/drawing/2014/main" id="{5D168020-D24D-B647-9626-4C1D635AF199}"/>
               </a:ext>
             </a:extLst>
           </p:cNvPr>
@@ -1561,7 +1561,7 @@
           <a:p>
             <a:fld id="{92A59E99-CB85-EC4A-A89B-6E9F71EC8DDF}" type="datetimeFigureOut">
               <a:rPr lang="en-US" smtClean="0"/>
-              <a:t>5/10/19</a:t>
+              <a:t>7/12/21</a:t>
             </a:fld>
             <a:endParaRPr lang="en-US"/>
           </a:p>
@@ -1572,7 +1572,7 @@
           <p:cNvPr id="5" name="Footer Placeholder 4">
             <a:extLst>
               <a:ext uri="{FF2B5EF4-FFF2-40B4-BE49-F238E27FC236}">
-                <a16:creationId xmlns="" xmlns:a16="http://schemas.microsoft.com/office/drawing/2014/main" id="{F8D049AC-EF98-E348-A44A-719267E30008}"/>
+                <a16:creationId xmlns:a16="http://schemas.microsoft.com/office/drawing/2014/main" id="{F8D049AC-EF98-E348-A44A-719267E30008}"/>
               </a:ext>
             </a:extLst>
           </p:cNvPr>
@@ -1597,7 +1597,7 @@
           <p:cNvPr id="6" name="Slide Number Placeholder 5">
             <a:extLst>
               <a:ext uri="{FF2B5EF4-FFF2-40B4-BE49-F238E27FC236}">
-                <a16:creationId xmlns="" xmlns:a16="http://schemas.microsoft.com/office/drawing/2014/main" id="{DDDC2EFC-947B-D843-90DF-EEAEF34C0DC4}"/>
+                <a16:creationId xmlns:a16="http://schemas.microsoft.com/office/drawing/2014/main" id="{DDDC2EFC-947B-D843-90DF-EEAEF34C0DC4}"/>
               </a:ext>
             </a:extLst>
           </p:cNvPr>
@@ -1656,7 +1656,7 @@
           <p:cNvPr id="2" name="Title 1">
             <a:extLst>
               <a:ext uri="{FF2B5EF4-FFF2-40B4-BE49-F238E27FC236}">
-                <a16:creationId xmlns="" xmlns:a16="http://schemas.microsoft.com/office/drawing/2014/main" id="{2DEA48BB-5BDB-654F-AC7B-7D49F0CFC738}"/>
+                <a16:creationId xmlns:a16="http://schemas.microsoft.com/office/drawing/2014/main" id="{2DEA48BB-5BDB-654F-AC7B-7D49F0CFC738}"/>
               </a:ext>
             </a:extLst>
           </p:cNvPr>
@@ -1684,7 +1684,7 @@
           <p:cNvPr id="3" name="Content Placeholder 2">
             <a:extLst>
               <a:ext uri="{FF2B5EF4-FFF2-40B4-BE49-F238E27FC236}">
-                <a16:creationId xmlns="" xmlns:a16="http://schemas.microsoft.com/office/drawing/2014/main" id="{5FB7BF49-D341-D043-AED6-B150CA567B20}"/>
+                <a16:creationId xmlns:a16="http://schemas.microsoft.com/office/drawing/2014/main" id="{5FB7BF49-D341-D043-AED6-B150CA567B20}"/>
               </a:ext>
             </a:extLst>
           </p:cNvPr>
@@ -1741,7 +1741,7 @@
           <p:cNvPr id="4" name="Date Placeholder 3">
             <a:extLst>
               <a:ext uri="{FF2B5EF4-FFF2-40B4-BE49-F238E27FC236}">
-                <a16:creationId xmlns="" xmlns:a16="http://schemas.microsoft.com/office/drawing/2014/main" id="{2BA823E2-FE5E-6F4C-9EAF-D783063EC237}"/>
+                <a16:creationId xmlns:a16="http://schemas.microsoft.com/office/drawing/2014/main" id="{2BA823E2-FE5E-6F4C-9EAF-D783063EC237}"/>
               </a:ext>
             </a:extLst>
           </p:cNvPr>
@@ -1759,7 +1759,7 @@
           <a:p>
             <a:fld id="{92A59E99-CB85-EC4A-A89B-6E9F71EC8DDF}" type="datetimeFigureOut">
               <a:rPr lang="en-US" smtClean="0"/>
-              <a:t>5/10/19</a:t>
+              <a:t>7/12/21</a:t>
             </a:fld>
             <a:endParaRPr lang="en-US"/>
           </a:p>
@@ -1770,7 +1770,7 @@
           <p:cNvPr id="5" name="Footer Placeholder 4">
             <a:extLst>
               <a:ext uri="{FF2B5EF4-FFF2-40B4-BE49-F238E27FC236}">
-                <a16:creationId xmlns="" xmlns:a16="http://schemas.microsoft.com/office/drawing/2014/main" id="{6A3FA467-13A5-7C45-83A4-464F0DBC54F0}"/>
+                <a16:creationId xmlns:a16="http://schemas.microsoft.com/office/drawing/2014/main" id="{6A3FA467-13A5-7C45-83A4-464F0DBC54F0}"/>
               </a:ext>
             </a:extLst>
           </p:cNvPr>
@@ -1795,7 +1795,7 @@
           <p:cNvPr id="6" name="Slide Number Placeholder 5">
             <a:extLst>
               <a:ext uri="{FF2B5EF4-FFF2-40B4-BE49-F238E27FC236}">
-                <a16:creationId xmlns="" xmlns:a16="http://schemas.microsoft.com/office/drawing/2014/main" id="{CDED5CB4-F449-DB48-BB8E-5A287D8C73AB}"/>
+                <a16:creationId xmlns:a16="http://schemas.microsoft.com/office/drawing/2014/main" id="{CDED5CB4-F449-DB48-BB8E-5A287D8C73AB}"/>
               </a:ext>
             </a:extLst>
           </p:cNvPr>
@@ -1854,7 +1854,7 @@
           <p:cNvPr id="2" name="Title 1">
             <a:extLst>
               <a:ext uri="{FF2B5EF4-FFF2-40B4-BE49-F238E27FC236}">
-                <a16:creationId xmlns="" xmlns:a16="http://schemas.microsoft.com/office/drawing/2014/main" id="{B898B8C5-F25D-684E-970D-0B1D89550B8E}"/>
+                <a16:creationId xmlns:a16="http://schemas.microsoft.com/office/drawing/2014/main" id="{B898B8C5-F25D-684E-970D-0B1D89550B8E}"/>
               </a:ext>
             </a:extLst>
           </p:cNvPr>
@@ -1891,7 +1891,7 @@
           <p:cNvPr id="3" name="Text Placeholder 2">
             <a:extLst>
               <a:ext uri="{FF2B5EF4-FFF2-40B4-BE49-F238E27FC236}">
-                <a16:creationId xmlns="" xmlns:a16="http://schemas.microsoft.com/office/drawing/2014/main" id="{9316DAA3-5934-264D-B978-0F94E407CE3E}"/>
+                <a16:creationId xmlns:a16="http://schemas.microsoft.com/office/drawing/2014/main" id="{9316DAA3-5934-264D-B978-0F94E407CE3E}"/>
               </a:ext>
             </a:extLst>
           </p:cNvPr>
@@ -2016,7 +2016,7 @@
           <p:cNvPr id="4" name="Date Placeholder 3">
             <a:extLst>
               <a:ext uri="{FF2B5EF4-FFF2-40B4-BE49-F238E27FC236}">
-                <a16:creationId xmlns="" xmlns:a16="http://schemas.microsoft.com/office/drawing/2014/main" id="{EAD44C33-A0ED-A14E-BA03-F360F22B4CA7}"/>
+                <a16:creationId xmlns:a16="http://schemas.microsoft.com/office/drawing/2014/main" id="{EAD44C33-A0ED-A14E-BA03-F360F22B4CA7}"/>
               </a:ext>
             </a:extLst>
           </p:cNvPr>
@@ -2034,7 +2034,7 @@
           <a:p>
             <a:fld id="{92A59E99-CB85-EC4A-A89B-6E9F71EC8DDF}" type="datetimeFigureOut">
               <a:rPr lang="en-US" smtClean="0"/>
-              <a:t>5/10/19</a:t>
+              <a:t>7/12/21</a:t>
             </a:fld>
             <a:endParaRPr lang="en-US"/>
           </a:p>
@@ -2045,7 +2045,7 @@
           <p:cNvPr id="5" name="Footer Placeholder 4">
             <a:extLst>
               <a:ext uri="{FF2B5EF4-FFF2-40B4-BE49-F238E27FC236}">
-                <a16:creationId xmlns="" xmlns:a16="http://schemas.microsoft.com/office/drawing/2014/main" id="{DFD428DC-3AB4-EF48-994E-BB4F2E24CBF0}"/>
+                <a16:creationId xmlns:a16="http://schemas.microsoft.com/office/drawing/2014/main" id="{DFD428DC-3AB4-EF48-994E-BB4F2E24CBF0}"/>
               </a:ext>
             </a:extLst>
           </p:cNvPr>
@@ -2070,7 +2070,7 @@
           <p:cNvPr id="6" name="Slide Number Placeholder 5">
             <a:extLst>
               <a:ext uri="{FF2B5EF4-FFF2-40B4-BE49-F238E27FC236}">
-                <a16:creationId xmlns="" xmlns:a16="http://schemas.microsoft.com/office/drawing/2014/main" id="{04B86A7B-D1FF-BA4C-B2C0-7F07F6961A59}"/>
+                <a16:creationId xmlns:a16="http://schemas.microsoft.com/office/drawing/2014/main" id="{04B86A7B-D1FF-BA4C-B2C0-7F07F6961A59}"/>
               </a:ext>
             </a:extLst>
           </p:cNvPr>
@@ -2129,7 +2129,7 @@
           <p:cNvPr id="2" name="Title 1">
             <a:extLst>
               <a:ext uri="{FF2B5EF4-FFF2-40B4-BE49-F238E27FC236}">
-                <a16:creationId xmlns="" xmlns:a16="http://schemas.microsoft.com/office/drawing/2014/main" id="{959D05EC-EC16-2840-A236-5BEBC6578B21}"/>
+                <a16:creationId xmlns:a16="http://schemas.microsoft.com/office/drawing/2014/main" id="{959D05EC-EC16-2840-A236-5BEBC6578B21}"/>
               </a:ext>
             </a:extLst>
           </p:cNvPr>
@@ -2157,7 +2157,7 @@
           <p:cNvPr id="3" name="Content Placeholder 2">
             <a:extLst>
               <a:ext uri="{FF2B5EF4-FFF2-40B4-BE49-F238E27FC236}">
-                <a16:creationId xmlns="" xmlns:a16="http://schemas.microsoft.com/office/drawing/2014/main" id="{6F8E78BE-04FD-1F4B-83F0-0C7D5AAC37D2}"/>
+                <a16:creationId xmlns:a16="http://schemas.microsoft.com/office/drawing/2014/main" id="{6F8E78BE-04FD-1F4B-83F0-0C7D5AAC37D2}"/>
               </a:ext>
             </a:extLst>
           </p:cNvPr>
@@ -2219,7 +2219,7 @@
           <p:cNvPr id="4" name="Content Placeholder 3">
             <a:extLst>
               <a:ext uri="{FF2B5EF4-FFF2-40B4-BE49-F238E27FC236}">
-                <a16:creationId xmlns="" xmlns:a16="http://schemas.microsoft.com/office/drawing/2014/main" id="{C0CC1560-76CB-0048-B430-8B526B37A772}"/>
+                <a16:creationId xmlns:a16="http://schemas.microsoft.com/office/drawing/2014/main" id="{C0CC1560-76CB-0048-B430-8B526B37A772}"/>
               </a:ext>
             </a:extLst>
           </p:cNvPr>
@@ -2281,7 +2281,7 @@
           <p:cNvPr id="5" name="Date Placeholder 4">
             <a:extLst>
               <a:ext uri="{FF2B5EF4-FFF2-40B4-BE49-F238E27FC236}">
-                <a16:creationId xmlns="" xmlns:a16="http://schemas.microsoft.com/office/drawing/2014/main" id="{47BCBC49-9776-2A45-A90B-EE8F3002A630}"/>
+                <a16:creationId xmlns:a16="http://schemas.microsoft.com/office/drawing/2014/main" id="{47BCBC49-9776-2A45-A90B-EE8F3002A630}"/>
               </a:ext>
             </a:extLst>
           </p:cNvPr>
@@ -2299,7 +2299,7 @@
           <a:p>
             <a:fld id="{92A59E99-CB85-EC4A-A89B-6E9F71EC8DDF}" type="datetimeFigureOut">
               <a:rPr lang="en-US" smtClean="0"/>
-              <a:t>5/10/19</a:t>
+              <a:t>7/12/21</a:t>
             </a:fld>
             <a:endParaRPr lang="en-US"/>
           </a:p>
@@ -2310,7 +2310,7 @@
           <p:cNvPr id="6" name="Footer Placeholder 5">
             <a:extLst>
               <a:ext uri="{FF2B5EF4-FFF2-40B4-BE49-F238E27FC236}">
-                <a16:creationId xmlns="" xmlns:a16="http://schemas.microsoft.com/office/drawing/2014/main" id="{6E9DAB44-58B1-AF4B-BB66-6F1BC66A941C}"/>
+                <a16:creationId xmlns:a16="http://schemas.microsoft.com/office/drawing/2014/main" id="{6E9DAB44-58B1-AF4B-BB66-6F1BC66A941C}"/>
               </a:ext>
             </a:extLst>
           </p:cNvPr>
@@ -2335,7 +2335,7 @@
           <p:cNvPr id="7" name="Slide Number Placeholder 6">
             <a:extLst>
               <a:ext uri="{FF2B5EF4-FFF2-40B4-BE49-F238E27FC236}">
-                <a16:creationId xmlns="" xmlns:a16="http://schemas.microsoft.com/office/drawing/2014/main" id="{7EDBA642-E4BE-EB46-AB57-45113EB348A4}"/>
+                <a16:creationId xmlns:a16="http://schemas.microsoft.com/office/drawing/2014/main" id="{7EDBA642-E4BE-EB46-AB57-45113EB348A4}"/>
               </a:ext>
             </a:extLst>
           </p:cNvPr>
@@ -2394,7 +2394,7 @@
           <p:cNvPr id="2" name="Title 1">
             <a:extLst>
               <a:ext uri="{FF2B5EF4-FFF2-40B4-BE49-F238E27FC236}">
-                <a16:creationId xmlns="" xmlns:a16="http://schemas.microsoft.com/office/drawing/2014/main" id="{CFE1B081-2269-8642-8668-E09910E971D7}"/>
+                <a16:creationId xmlns:a16="http://schemas.microsoft.com/office/drawing/2014/main" id="{CFE1B081-2269-8642-8668-E09910E971D7}"/>
               </a:ext>
             </a:extLst>
           </p:cNvPr>
@@ -2427,7 +2427,7 @@
           <p:cNvPr id="3" name="Text Placeholder 2">
             <a:extLst>
               <a:ext uri="{FF2B5EF4-FFF2-40B4-BE49-F238E27FC236}">
-                <a16:creationId xmlns="" xmlns:a16="http://schemas.microsoft.com/office/drawing/2014/main" id="{B026128F-EEFA-EE43-9782-868FE5886333}"/>
+                <a16:creationId xmlns:a16="http://schemas.microsoft.com/office/drawing/2014/main" id="{B026128F-EEFA-EE43-9782-868FE5886333}"/>
               </a:ext>
             </a:extLst>
           </p:cNvPr>
@@ -2498,7 +2498,7 @@
           <p:cNvPr id="4" name="Content Placeholder 3">
             <a:extLst>
               <a:ext uri="{FF2B5EF4-FFF2-40B4-BE49-F238E27FC236}">
-                <a16:creationId xmlns="" xmlns:a16="http://schemas.microsoft.com/office/drawing/2014/main" id="{0FDEC369-4C11-6F46-8D29-EC91C7DFCEE3}"/>
+                <a16:creationId xmlns:a16="http://schemas.microsoft.com/office/drawing/2014/main" id="{0FDEC369-4C11-6F46-8D29-EC91C7DFCEE3}"/>
               </a:ext>
             </a:extLst>
           </p:cNvPr>
@@ -2560,7 +2560,7 @@
           <p:cNvPr id="5" name="Text Placeholder 4">
             <a:extLst>
               <a:ext uri="{FF2B5EF4-FFF2-40B4-BE49-F238E27FC236}">
-                <a16:creationId xmlns="" xmlns:a16="http://schemas.microsoft.com/office/drawing/2014/main" id="{17E50335-63CD-434A-978E-2EA6D328DBE0}"/>
+                <a16:creationId xmlns:a16="http://schemas.microsoft.com/office/drawing/2014/main" id="{17E50335-63CD-434A-978E-2EA6D328DBE0}"/>
               </a:ext>
             </a:extLst>
           </p:cNvPr>
@@ -2631,7 +2631,7 @@
           <p:cNvPr id="6" name="Content Placeholder 5">
             <a:extLst>
               <a:ext uri="{FF2B5EF4-FFF2-40B4-BE49-F238E27FC236}">
-                <a16:creationId xmlns="" xmlns:a16="http://schemas.microsoft.com/office/drawing/2014/main" id="{4842D658-5CFE-0F40-8E35-D800CF6F3CD9}"/>
+                <a16:creationId xmlns:a16="http://schemas.microsoft.com/office/drawing/2014/main" id="{4842D658-5CFE-0F40-8E35-D800CF6F3CD9}"/>
               </a:ext>
             </a:extLst>
           </p:cNvPr>
@@ -2693,7 +2693,7 @@
           <p:cNvPr id="7" name="Date Placeholder 6">
             <a:extLst>
               <a:ext uri="{FF2B5EF4-FFF2-40B4-BE49-F238E27FC236}">
-                <a16:creationId xmlns="" xmlns:a16="http://schemas.microsoft.com/office/drawing/2014/main" id="{4D6C49D0-21A3-3B4E-9EF8-3C6E4A5EC6B9}"/>
+                <a16:creationId xmlns:a16="http://schemas.microsoft.com/office/drawing/2014/main" id="{4D6C49D0-21A3-3B4E-9EF8-3C6E4A5EC6B9}"/>
               </a:ext>
             </a:extLst>
           </p:cNvPr>
@@ -2711,7 +2711,7 @@
           <a:p>
             <a:fld id="{92A59E99-CB85-EC4A-A89B-6E9F71EC8DDF}" type="datetimeFigureOut">
               <a:rPr lang="en-US" smtClean="0"/>
-              <a:t>5/10/19</a:t>
+              <a:t>7/12/21</a:t>
             </a:fld>
             <a:endParaRPr lang="en-US"/>
           </a:p>
@@ -2722,7 +2722,7 @@
           <p:cNvPr id="8" name="Footer Placeholder 7">
             <a:extLst>
               <a:ext uri="{FF2B5EF4-FFF2-40B4-BE49-F238E27FC236}">
-                <a16:creationId xmlns="" xmlns:a16="http://schemas.microsoft.com/office/drawing/2014/main" id="{785B2419-F017-4842-BBF2-34A3F361D59E}"/>
+                <a16:creationId xmlns:a16="http://schemas.microsoft.com/office/drawing/2014/main" id="{785B2419-F017-4842-BBF2-34A3F361D59E}"/>
               </a:ext>
             </a:extLst>
           </p:cNvPr>
@@ -2747,7 +2747,7 @@
           <p:cNvPr id="9" name="Slide Number Placeholder 8">
             <a:extLst>
               <a:ext uri="{FF2B5EF4-FFF2-40B4-BE49-F238E27FC236}">
-                <a16:creationId xmlns="" xmlns:a16="http://schemas.microsoft.com/office/drawing/2014/main" id="{886A294C-BE85-4B49-AD59-7CF1D4FF8D3E}"/>
+                <a16:creationId xmlns:a16="http://schemas.microsoft.com/office/drawing/2014/main" id="{886A294C-BE85-4B49-AD59-7CF1D4FF8D3E}"/>
               </a:ext>
             </a:extLst>
           </p:cNvPr>
@@ -2806,7 +2806,7 @@
           <p:cNvPr id="2" name="Title 1">
             <a:extLst>
               <a:ext uri="{FF2B5EF4-FFF2-40B4-BE49-F238E27FC236}">
-                <a16:creationId xmlns="" xmlns:a16="http://schemas.microsoft.com/office/drawing/2014/main" id="{40279BE2-7D78-B84B-9422-B02B8C162589}"/>
+                <a16:creationId xmlns:a16="http://schemas.microsoft.com/office/drawing/2014/main" id="{40279BE2-7D78-B84B-9422-B02B8C162589}"/>
               </a:ext>
             </a:extLst>
           </p:cNvPr>
@@ -2834,7 +2834,7 @@
           <p:cNvPr id="3" name="Date Placeholder 2">
             <a:extLst>
               <a:ext uri="{FF2B5EF4-FFF2-40B4-BE49-F238E27FC236}">
-                <a16:creationId xmlns="" xmlns:a16="http://schemas.microsoft.com/office/drawing/2014/main" id="{357FFDF6-5E4C-A44C-A861-45B38D18428A}"/>
+                <a16:creationId xmlns:a16="http://schemas.microsoft.com/office/drawing/2014/main" id="{357FFDF6-5E4C-A44C-A861-45B38D18428A}"/>
               </a:ext>
             </a:extLst>
           </p:cNvPr>
@@ -2852,7 +2852,7 @@
           <a:p>
             <a:fld id="{92A59E99-CB85-EC4A-A89B-6E9F71EC8DDF}" type="datetimeFigureOut">
               <a:rPr lang="en-US" smtClean="0"/>
-              <a:t>5/10/19</a:t>
+              <a:t>7/12/21</a:t>
             </a:fld>
             <a:endParaRPr lang="en-US"/>
           </a:p>
@@ -2863,7 +2863,7 @@
           <p:cNvPr id="4" name="Footer Placeholder 3">
             <a:extLst>
               <a:ext uri="{FF2B5EF4-FFF2-40B4-BE49-F238E27FC236}">
-                <a16:creationId xmlns="" xmlns:a16="http://schemas.microsoft.com/office/drawing/2014/main" id="{9D608352-FD27-464B-8F7B-B3C464F751DD}"/>
+                <a16:creationId xmlns:a16="http://schemas.microsoft.com/office/drawing/2014/main" id="{9D608352-FD27-464B-8F7B-B3C464F751DD}"/>
               </a:ext>
             </a:extLst>
           </p:cNvPr>
@@ -2888,7 +2888,7 @@
           <p:cNvPr id="5" name="Slide Number Placeholder 4">
             <a:extLst>
               <a:ext uri="{FF2B5EF4-FFF2-40B4-BE49-F238E27FC236}">
-                <a16:creationId xmlns="" xmlns:a16="http://schemas.microsoft.com/office/drawing/2014/main" id="{BC229138-D138-134B-B228-400EBFD3495E}"/>
+                <a16:creationId xmlns:a16="http://schemas.microsoft.com/office/drawing/2014/main" id="{BC229138-D138-134B-B228-400EBFD3495E}"/>
               </a:ext>
             </a:extLst>
           </p:cNvPr>
@@ -2947,7 +2947,7 @@
           <p:cNvPr id="2" name="Date Placeholder 1">
             <a:extLst>
               <a:ext uri="{FF2B5EF4-FFF2-40B4-BE49-F238E27FC236}">
-                <a16:creationId xmlns="" xmlns:a16="http://schemas.microsoft.com/office/drawing/2014/main" id="{90AFEA39-0BA3-0647-B99F-19EDC044F974}"/>
+                <a16:creationId xmlns:a16="http://schemas.microsoft.com/office/drawing/2014/main" id="{90AFEA39-0BA3-0647-B99F-19EDC044F974}"/>
               </a:ext>
             </a:extLst>
           </p:cNvPr>
@@ -2965,7 +2965,7 @@
           <a:p>
             <a:fld id="{92A59E99-CB85-EC4A-A89B-6E9F71EC8DDF}" type="datetimeFigureOut">
               <a:rPr lang="en-US" smtClean="0"/>
-              <a:t>5/10/19</a:t>
+              <a:t>7/12/21</a:t>
             </a:fld>
             <a:endParaRPr lang="en-US"/>
           </a:p>
@@ -2976,7 +2976,7 @@
           <p:cNvPr id="3" name="Footer Placeholder 2">
             <a:extLst>
               <a:ext uri="{FF2B5EF4-FFF2-40B4-BE49-F238E27FC236}">
-                <a16:creationId xmlns="" xmlns:a16="http://schemas.microsoft.com/office/drawing/2014/main" id="{6A749063-5289-9E48-9754-F2CC4C60AFCD}"/>
+                <a16:creationId xmlns:a16="http://schemas.microsoft.com/office/drawing/2014/main" id="{6A749063-5289-9E48-9754-F2CC4C60AFCD}"/>
               </a:ext>
             </a:extLst>
           </p:cNvPr>
@@ -3001,7 +3001,7 @@
           <p:cNvPr id="4" name="Slide Number Placeholder 3">
             <a:extLst>
               <a:ext uri="{FF2B5EF4-FFF2-40B4-BE49-F238E27FC236}">
-                <a16:creationId xmlns="" xmlns:a16="http://schemas.microsoft.com/office/drawing/2014/main" id="{E1E0849B-A260-3D46-9565-576767392CBF}"/>
+                <a16:creationId xmlns:a16="http://schemas.microsoft.com/office/drawing/2014/main" id="{E1E0849B-A260-3D46-9565-576767392CBF}"/>
               </a:ext>
             </a:extLst>
           </p:cNvPr>
@@ -3060,7 +3060,7 @@
           <p:cNvPr id="2" name="Title 1">
             <a:extLst>
               <a:ext uri="{FF2B5EF4-FFF2-40B4-BE49-F238E27FC236}">
-                <a16:creationId xmlns="" xmlns:a16="http://schemas.microsoft.com/office/drawing/2014/main" id="{013A4915-9C4A-7C46-BC2A-C8EA46754AA9}"/>
+                <a16:creationId xmlns:a16="http://schemas.microsoft.com/office/drawing/2014/main" id="{013A4915-9C4A-7C46-BC2A-C8EA46754AA9}"/>
               </a:ext>
             </a:extLst>
           </p:cNvPr>
@@ -3097,7 +3097,7 @@
           <p:cNvPr id="3" name="Content Placeholder 2">
             <a:extLst>
               <a:ext uri="{FF2B5EF4-FFF2-40B4-BE49-F238E27FC236}">
-                <a16:creationId xmlns="" xmlns:a16="http://schemas.microsoft.com/office/drawing/2014/main" id="{7D27D998-ED19-5E4E-85A3-4D599572837B}"/>
+                <a16:creationId xmlns:a16="http://schemas.microsoft.com/office/drawing/2014/main" id="{7D27D998-ED19-5E4E-85A3-4D599572837B}"/>
               </a:ext>
             </a:extLst>
           </p:cNvPr>
@@ -3187,7 +3187,7 @@
           <p:cNvPr id="4" name="Text Placeholder 3">
             <a:extLst>
               <a:ext uri="{FF2B5EF4-FFF2-40B4-BE49-F238E27FC236}">
-                <a16:creationId xmlns="" xmlns:a16="http://schemas.microsoft.com/office/drawing/2014/main" id="{F1857787-3195-DD40-B313-6FE951C69D3B}"/>
+                <a16:creationId xmlns:a16="http://schemas.microsoft.com/office/drawing/2014/main" id="{F1857787-3195-DD40-B313-6FE951C69D3B}"/>
               </a:ext>
             </a:extLst>
           </p:cNvPr>
@@ -3258,7 +3258,7 @@
           <p:cNvPr id="5" name="Date Placeholder 4">
             <a:extLst>
               <a:ext uri="{FF2B5EF4-FFF2-40B4-BE49-F238E27FC236}">
-                <a16:creationId xmlns="" xmlns:a16="http://schemas.microsoft.com/office/drawing/2014/main" id="{7248DA73-07B4-0A45-9E6E-A51A45685773}"/>
+                <a16:creationId xmlns:a16="http://schemas.microsoft.com/office/drawing/2014/main" id="{7248DA73-07B4-0A45-9E6E-A51A45685773}"/>
               </a:ext>
             </a:extLst>
           </p:cNvPr>
@@ -3276,7 +3276,7 @@
           <a:p>
             <a:fld id="{92A59E99-CB85-EC4A-A89B-6E9F71EC8DDF}" type="datetimeFigureOut">
               <a:rPr lang="en-US" smtClean="0"/>
-              <a:t>5/10/19</a:t>
+              <a:t>7/12/21</a:t>
             </a:fld>
             <a:endParaRPr lang="en-US"/>
           </a:p>
@@ -3287,7 +3287,7 @@
           <p:cNvPr id="6" name="Footer Placeholder 5">
             <a:extLst>
               <a:ext uri="{FF2B5EF4-FFF2-40B4-BE49-F238E27FC236}">
-                <a16:creationId xmlns="" xmlns:a16="http://schemas.microsoft.com/office/drawing/2014/main" id="{D7A9710C-8D1A-BC40-B18A-3182701468AE}"/>
+                <a16:creationId xmlns:a16="http://schemas.microsoft.com/office/drawing/2014/main" id="{D7A9710C-8D1A-BC40-B18A-3182701468AE}"/>
               </a:ext>
             </a:extLst>
           </p:cNvPr>
@@ -3312,7 +3312,7 @@
           <p:cNvPr id="7" name="Slide Number Placeholder 6">
             <a:extLst>
               <a:ext uri="{FF2B5EF4-FFF2-40B4-BE49-F238E27FC236}">
-                <a16:creationId xmlns="" xmlns:a16="http://schemas.microsoft.com/office/drawing/2014/main" id="{718D5D61-26C2-1C4D-9D1E-AEF3968A2A5D}"/>
+                <a16:creationId xmlns:a16="http://schemas.microsoft.com/office/drawing/2014/main" id="{718D5D61-26C2-1C4D-9D1E-AEF3968A2A5D}"/>
               </a:ext>
             </a:extLst>
           </p:cNvPr>
@@ -3371,7 +3371,7 @@
           <p:cNvPr id="2" name="Title 1">
             <a:extLst>
               <a:ext uri="{FF2B5EF4-FFF2-40B4-BE49-F238E27FC236}">
-                <a16:creationId xmlns="" xmlns:a16="http://schemas.microsoft.com/office/drawing/2014/main" id="{4C50044B-CC25-F244-8996-93A0107ABA95}"/>
+                <a16:creationId xmlns:a16="http://schemas.microsoft.com/office/drawing/2014/main" id="{4C50044B-CC25-F244-8996-93A0107ABA95}"/>
               </a:ext>
             </a:extLst>
           </p:cNvPr>
@@ -3408,7 +3408,7 @@
           <p:cNvPr id="3" name="Picture Placeholder 2">
             <a:extLst>
               <a:ext uri="{FF2B5EF4-FFF2-40B4-BE49-F238E27FC236}">
-                <a16:creationId xmlns="" xmlns:a16="http://schemas.microsoft.com/office/drawing/2014/main" id="{A171C9D9-48CB-3D4B-8E79-B644C6EB7DA1}"/>
+                <a16:creationId xmlns:a16="http://schemas.microsoft.com/office/drawing/2014/main" id="{A171C9D9-48CB-3D4B-8E79-B644C6EB7DA1}"/>
               </a:ext>
             </a:extLst>
           </p:cNvPr>
@@ -3475,7 +3475,7 @@
           <p:cNvPr id="4" name="Text Placeholder 3">
             <a:extLst>
               <a:ext uri="{FF2B5EF4-FFF2-40B4-BE49-F238E27FC236}">
-                <a16:creationId xmlns="" xmlns:a16="http://schemas.microsoft.com/office/drawing/2014/main" id="{FF3F03AC-07A0-4943-A301-F52465549361}"/>
+                <a16:creationId xmlns:a16="http://schemas.microsoft.com/office/drawing/2014/main" id="{FF3F03AC-07A0-4943-A301-F52465549361}"/>
               </a:ext>
             </a:extLst>
           </p:cNvPr>
@@ -3546,7 +3546,7 @@
           <p:cNvPr id="5" name="Date Placeholder 4">
             <a:extLst>
               <a:ext uri="{FF2B5EF4-FFF2-40B4-BE49-F238E27FC236}">
-                <a16:creationId xmlns="" xmlns:a16="http://schemas.microsoft.com/office/drawing/2014/main" id="{8B446296-7330-0849-B312-37F06AD33C82}"/>
+                <a16:creationId xmlns:a16="http://schemas.microsoft.com/office/drawing/2014/main" id="{8B446296-7330-0849-B312-37F06AD33C82}"/>
               </a:ext>
             </a:extLst>
           </p:cNvPr>
@@ -3564,7 +3564,7 @@
           <a:p>
             <a:fld id="{92A59E99-CB85-EC4A-A89B-6E9F71EC8DDF}" type="datetimeFigureOut">
               <a:rPr lang="en-US" smtClean="0"/>
-              <a:t>5/10/19</a:t>
+              <a:t>7/12/21</a:t>
             </a:fld>
             <a:endParaRPr lang="en-US"/>
           </a:p>
@@ -3575,7 +3575,7 @@
           <p:cNvPr id="6" name="Footer Placeholder 5">
             <a:extLst>
               <a:ext uri="{FF2B5EF4-FFF2-40B4-BE49-F238E27FC236}">
-                <a16:creationId xmlns="" xmlns:a16="http://schemas.microsoft.com/office/drawing/2014/main" id="{E0675D40-0DFD-F548-9376-4943B584D0C4}"/>
+                <a16:creationId xmlns:a16="http://schemas.microsoft.com/office/drawing/2014/main" id="{E0675D40-0DFD-F548-9376-4943B584D0C4}"/>
               </a:ext>
             </a:extLst>
           </p:cNvPr>
@@ -3600,7 +3600,7 @@
           <p:cNvPr id="7" name="Slide Number Placeholder 6">
             <a:extLst>
               <a:ext uri="{FF2B5EF4-FFF2-40B4-BE49-F238E27FC236}">
-                <a16:creationId xmlns="" xmlns:a16="http://schemas.microsoft.com/office/drawing/2014/main" id="{B621A768-0F30-1B4D-A2D7-AC827DF853BD}"/>
+                <a16:creationId xmlns:a16="http://schemas.microsoft.com/office/drawing/2014/main" id="{B621A768-0F30-1B4D-A2D7-AC827DF853BD}"/>
               </a:ext>
             </a:extLst>
           </p:cNvPr>
@@ -3664,7 +3664,7 @@
           <p:cNvPr id="2" name="Title Placeholder 1">
             <a:extLst>
               <a:ext uri="{FF2B5EF4-FFF2-40B4-BE49-F238E27FC236}">
-                <a16:creationId xmlns="" xmlns:a16="http://schemas.microsoft.com/office/drawing/2014/main" id="{8E29DC26-FF3E-AC47-95D0-6C673D94144E}"/>
+                <a16:creationId xmlns:a16="http://schemas.microsoft.com/office/drawing/2014/main" id="{8E29DC26-FF3E-AC47-95D0-6C673D94144E}"/>
               </a:ext>
             </a:extLst>
           </p:cNvPr>
@@ -3702,7 +3702,7 @@
           <p:cNvPr id="3" name="Text Placeholder 2">
             <a:extLst>
               <a:ext uri="{FF2B5EF4-FFF2-40B4-BE49-F238E27FC236}">
-                <a16:creationId xmlns="" xmlns:a16="http://schemas.microsoft.com/office/drawing/2014/main" id="{4230C871-10F8-8740-8305-58D7FDDAC307}"/>
+                <a16:creationId xmlns:a16="http://schemas.microsoft.com/office/drawing/2014/main" id="{4230C871-10F8-8740-8305-58D7FDDAC307}"/>
               </a:ext>
             </a:extLst>
           </p:cNvPr>
@@ -3769,7 +3769,7 @@
           <p:cNvPr id="4" name="Date Placeholder 3">
             <a:extLst>
               <a:ext uri="{FF2B5EF4-FFF2-40B4-BE49-F238E27FC236}">
-                <a16:creationId xmlns="" xmlns:a16="http://schemas.microsoft.com/office/drawing/2014/main" id="{511B793D-9194-9641-A7FC-DE9718D62407}"/>
+                <a16:creationId xmlns:a16="http://schemas.microsoft.com/office/drawing/2014/main" id="{511B793D-9194-9641-A7FC-DE9718D62407}"/>
               </a:ext>
             </a:extLst>
           </p:cNvPr>
@@ -3805,7 +3805,7 @@
           <a:p>
             <a:fld id="{92A59E99-CB85-EC4A-A89B-6E9F71EC8DDF}" type="datetimeFigureOut">
               <a:rPr lang="en-US" smtClean="0"/>
-              <a:t>5/10/19</a:t>
+              <a:t>7/12/21</a:t>
             </a:fld>
             <a:endParaRPr lang="en-US"/>
           </a:p>
@@ -3816,7 +3816,7 @@
           <p:cNvPr id="5" name="Footer Placeholder 4">
             <a:extLst>
               <a:ext uri="{FF2B5EF4-FFF2-40B4-BE49-F238E27FC236}">
-                <a16:creationId xmlns="" xmlns:a16="http://schemas.microsoft.com/office/drawing/2014/main" id="{0C056C5B-1CFF-5C40-8E75-A82324EFC846}"/>
+                <a16:creationId xmlns:a16="http://schemas.microsoft.com/office/drawing/2014/main" id="{0C056C5B-1CFF-5C40-8E75-A82324EFC846}"/>
               </a:ext>
             </a:extLst>
           </p:cNvPr>
@@ -3859,7 +3859,7 @@
           <p:cNvPr id="6" name="Slide Number Placeholder 5">
             <a:extLst>
               <a:ext uri="{FF2B5EF4-FFF2-40B4-BE49-F238E27FC236}">
-                <a16:creationId xmlns="" xmlns:a16="http://schemas.microsoft.com/office/drawing/2014/main" id="{A7C6B3E6-2042-4144-8A3A-EBC7729C8632}"/>
+                <a16:creationId xmlns:a16="http://schemas.microsoft.com/office/drawing/2014/main" id="{A7C6B3E6-2042-4144-8A3A-EBC7729C8632}"/>
               </a:ext>
             </a:extLst>
           </p:cNvPr>
@@ -4227,7 +4227,7 @@
           <p:cNvPr id="33" name="Group 32">
             <a:extLst>
               <a:ext uri="{FF2B5EF4-FFF2-40B4-BE49-F238E27FC236}">
-                <a16:creationId xmlns="" xmlns:a16="http://schemas.microsoft.com/office/drawing/2014/main" id="{9B5C971E-E823-6F4B-AC92-7FCC182551B0}"/>
+                <a16:creationId xmlns:a16="http://schemas.microsoft.com/office/drawing/2014/main" id="{9B5C971E-E823-6F4B-AC92-7FCC182551B0}"/>
               </a:ext>
             </a:extLst>
           </p:cNvPr>
@@ -4247,7 +4247,7 @@
             <p:cNvPr id="6" name="Rectangle 5">
               <a:extLst>
                 <a:ext uri="{FF2B5EF4-FFF2-40B4-BE49-F238E27FC236}">
-                  <a16:creationId xmlns="" xmlns:a16="http://schemas.microsoft.com/office/drawing/2014/main" id="{F96E4CEF-4C1B-B244-BE6A-0BB540570619}"/>
+                  <a16:creationId xmlns:a16="http://schemas.microsoft.com/office/drawing/2014/main" id="{F96E4CEF-4C1B-B244-BE6A-0BB540570619}"/>
                 </a:ext>
               </a:extLst>
             </p:cNvPr>
@@ -4302,7 +4302,7 @@
             <p:cNvPr id="10" name="Rounded Rectangle 9">
               <a:extLst>
                 <a:ext uri="{FF2B5EF4-FFF2-40B4-BE49-F238E27FC236}">
-                  <a16:creationId xmlns="" xmlns:a16="http://schemas.microsoft.com/office/drawing/2014/main" id="{7C598126-C6D0-9B4F-A3C9-B5DFDD798F12}"/>
+                  <a16:creationId xmlns:a16="http://schemas.microsoft.com/office/drawing/2014/main" id="{7C598126-C6D0-9B4F-A3C9-B5DFDD798F12}"/>
                 </a:ext>
               </a:extLst>
             </p:cNvPr>
@@ -4364,7 +4364,7 @@
             <p:cNvPr id="28" name="Group 27">
               <a:extLst>
                 <a:ext uri="{FF2B5EF4-FFF2-40B4-BE49-F238E27FC236}">
-                  <a16:creationId xmlns="" xmlns:a16="http://schemas.microsoft.com/office/drawing/2014/main" id="{C7818A16-01EB-2D4B-8821-4DB8CE3F1CD7}"/>
+                  <a16:creationId xmlns:a16="http://schemas.microsoft.com/office/drawing/2014/main" id="{C7818A16-01EB-2D4B-8821-4DB8CE3F1CD7}"/>
                 </a:ext>
               </a:extLst>
             </p:cNvPr>
@@ -4384,7 +4384,7 @@
               <p:cNvPr id="21" name="TextBox 20">
                 <a:extLst>
                   <a:ext uri="{FF2B5EF4-FFF2-40B4-BE49-F238E27FC236}">
-                    <a16:creationId xmlns="" xmlns:a16="http://schemas.microsoft.com/office/drawing/2014/main" id="{8E115417-89E6-CF46-9DFE-0603E4CEA342}"/>
+                    <a16:creationId xmlns:a16="http://schemas.microsoft.com/office/drawing/2014/main" id="{8E115417-89E6-CF46-9DFE-0603E4CEA342}"/>
                   </a:ext>
                 </a:extLst>
               </p:cNvPr>
@@ -4424,7 +4424,7 @@
               <p:cNvPr id="22" name="Group 21">
                 <a:extLst>
                   <a:ext uri="{FF2B5EF4-FFF2-40B4-BE49-F238E27FC236}">
-                    <a16:creationId xmlns="" xmlns:a16="http://schemas.microsoft.com/office/drawing/2014/main" id="{D7F20AD9-7CA4-0041-955B-5E18FE4DAC77}"/>
+                    <a16:creationId xmlns:a16="http://schemas.microsoft.com/office/drawing/2014/main" id="{D7F20AD9-7CA4-0041-955B-5E18FE4DAC77}"/>
                   </a:ext>
                 </a:extLst>
               </p:cNvPr>
@@ -4444,7 +4444,7 @@
                 <p:cNvPr id="23" name="Snip Single Corner Rectangle 22">
                   <a:extLst>
                     <a:ext uri="{FF2B5EF4-FFF2-40B4-BE49-F238E27FC236}">
-                      <a16:creationId xmlns="" xmlns:a16="http://schemas.microsoft.com/office/drawing/2014/main" id="{06FA0D0C-9EA4-F04D-A8A9-5995163A633F}"/>
+                      <a16:creationId xmlns:a16="http://schemas.microsoft.com/office/drawing/2014/main" id="{06FA0D0C-9EA4-F04D-A8A9-5995163A633F}"/>
                     </a:ext>
                   </a:extLst>
                 </p:cNvPr>
@@ -4488,7 +4488,7 @@
                 <p:cNvPr id="24" name="Straight Connector 23">
                   <a:extLst>
                     <a:ext uri="{FF2B5EF4-FFF2-40B4-BE49-F238E27FC236}">
-                      <a16:creationId xmlns="" xmlns:a16="http://schemas.microsoft.com/office/drawing/2014/main" id="{308B8246-BD2E-AE48-879F-EBC48ABC90EA}"/>
+                      <a16:creationId xmlns:a16="http://schemas.microsoft.com/office/drawing/2014/main" id="{308B8246-BD2E-AE48-879F-EBC48ABC90EA}"/>
                     </a:ext>
                   </a:extLst>
                 </p:cNvPr>
@@ -4529,7 +4529,7 @@
                 <p:cNvPr id="25" name="Straight Connector 24">
                   <a:extLst>
                     <a:ext uri="{FF2B5EF4-FFF2-40B4-BE49-F238E27FC236}">
-                      <a16:creationId xmlns="" xmlns:a16="http://schemas.microsoft.com/office/drawing/2014/main" id="{78CCB9DB-2613-214E-9817-C9A41BE4C724}"/>
+                      <a16:creationId xmlns:a16="http://schemas.microsoft.com/office/drawing/2014/main" id="{78CCB9DB-2613-214E-9817-C9A41BE4C724}"/>
                     </a:ext>
                   </a:extLst>
                 </p:cNvPr>
@@ -4570,7 +4570,7 @@
                 <p:cNvPr id="26" name="Straight Connector 25">
                   <a:extLst>
                     <a:ext uri="{FF2B5EF4-FFF2-40B4-BE49-F238E27FC236}">
-                      <a16:creationId xmlns="" xmlns:a16="http://schemas.microsoft.com/office/drawing/2014/main" id="{6B70F2B2-5A83-1F4B-B4D5-AD5064B29D6D}"/>
+                      <a16:creationId xmlns:a16="http://schemas.microsoft.com/office/drawing/2014/main" id="{6B70F2B2-5A83-1F4B-B4D5-AD5064B29D6D}"/>
                     </a:ext>
                   </a:extLst>
                 </p:cNvPr>
@@ -4611,7 +4611,7 @@
                 <p:cNvPr id="27" name="Straight Connector 26">
                   <a:extLst>
                     <a:ext uri="{FF2B5EF4-FFF2-40B4-BE49-F238E27FC236}">
-                      <a16:creationId xmlns="" xmlns:a16="http://schemas.microsoft.com/office/drawing/2014/main" id="{77E995BE-6ACF-9B43-8A72-2F40C0D6AE54}"/>
+                      <a16:creationId xmlns:a16="http://schemas.microsoft.com/office/drawing/2014/main" id="{77E995BE-6ACF-9B43-8A72-2F40C0D6AE54}"/>
                     </a:ext>
                   </a:extLst>
                 </p:cNvPr>
@@ -4655,7 +4655,7 @@
           <p:cNvPr id="4" name="Rectangle 3">
             <a:extLst>
               <a:ext uri="{FF2B5EF4-FFF2-40B4-BE49-F238E27FC236}">
-                <a16:creationId xmlns="" xmlns:a16="http://schemas.microsoft.com/office/drawing/2014/main" id="{D44296FC-44E1-5E44-B8F1-ACF7669705BF}"/>
+                <a16:creationId xmlns:a16="http://schemas.microsoft.com/office/drawing/2014/main" id="{D44296FC-44E1-5E44-B8F1-ACF7669705BF}"/>
               </a:ext>
             </a:extLst>
           </p:cNvPr>
@@ -4704,7 +4704,7 @@
           <p:cNvPr id="8" name="Rounded Rectangle 7">
             <a:extLst>
               <a:ext uri="{FF2B5EF4-FFF2-40B4-BE49-F238E27FC236}">
-                <a16:creationId xmlns="" xmlns:a16="http://schemas.microsoft.com/office/drawing/2014/main" id="{67F55CC5-2673-4A46-8AA5-EF074A023FBE}"/>
+                <a16:creationId xmlns:a16="http://schemas.microsoft.com/office/drawing/2014/main" id="{67F55CC5-2673-4A46-8AA5-EF074A023FBE}"/>
               </a:ext>
             </a:extLst>
           </p:cNvPr>
@@ -4751,7 +4751,7 @@
           <p:cNvPr id="5" name="Rectangle 4">
             <a:extLst>
               <a:ext uri="{FF2B5EF4-FFF2-40B4-BE49-F238E27FC236}">
-                <a16:creationId xmlns="" xmlns:a16="http://schemas.microsoft.com/office/drawing/2014/main" id="{92388B54-2A40-D447-84BE-2EA6F53F107A}"/>
+                <a16:creationId xmlns:a16="http://schemas.microsoft.com/office/drawing/2014/main" id="{92388B54-2A40-D447-84BE-2EA6F53F107A}"/>
               </a:ext>
             </a:extLst>
           </p:cNvPr>
@@ -4800,7 +4800,7 @@
           <p:cNvPr id="9" name="Rounded Rectangle 8">
             <a:extLst>
               <a:ext uri="{FF2B5EF4-FFF2-40B4-BE49-F238E27FC236}">
-                <a16:creationId xmlns="" xmlns:a16="http://schemas.microsoft.com/office/drawing/2014/main" id="{351CB379-D8CA-574B-9035-4F9773A33529}"/>
+                <a16:creationId xmlns:a16="http://schemas.microsoft.com/office/drawing/2014/main" id="{351CB379-D8CA-574B-9035-4F9773A33529}"/>
               </a:ext>
             </a:extLst>
           </p:cNvPr>
@@ -4855,7 +4855,7 @@
           <p:cNvPr id="34" name="Group 33">
             <a:extLst>
               <a:ext uri="{FF2B5EF4-FFF2-40B4-BE49-F238E27FC236}">
-                <a16:creationId xmlns="" xmlns:a16="http://schemas.microsoft.com/office/drawing/2014/main" id="{B81CAC7E-E4B1-F44B-B0CA-252498C86C2A}"/>
+                <a16:creationId xmlns:a16="http://schemas.microsoft.com/office/drawing/2014/main" id="{B81CAC7E-E4B1-F44B-B0CA-252498C86C2A}"/>
               </a:ext>
             </a:extLst>
           </p:cNvPr>
@@ -4875,7 +4875,7 @@
             <p:cNvPr id="7" name="Rectangle 6">
               <a:extLst>
                 <a:ext uri="{FF2B5EF4-FFF2-40B4-BE49-F238E27FC236}">
-                  <a16:creationId xmlns="" xmlns:a16="http://schemas.microsoft.com/office/drawing/2014/main" id="{24B2218B-44C2-2E49-A2B2-C8C5EFA69EAE}"/>
+                  <a16:creationId xmlns:a16="http://schemas.microsoft.com/office/drawing/2014/main" id="{24B2218B-44C2-2E49-A2B2-C8C5EFA69EAE}"/>
                 </a:ext>
               </a:extLst>
             </p:cNvPr>
@@ -4924,7 +4924,7 @@
             <p:cNvPr id="11" name="Rounded Rectangle 10">
               <a:extLst>
                 <a:ext uri="{FF2B5EF4-FFF2-40B4-BE49-F238E27FC236}">
-                  <a16:creationId xmlns="" xmlns:a16="http://schemas.microsoft.com/office/drawing/2014/main" id="{39322434-EC85-F440-A08A-BB8939C64696}"/>
+                  <a16:creationId xmlns:a16="http://schemas.microsoft.com/office/drawing/2014/main" id="{39322434-EC85-F440-A08A-BB8939C64696}"/>
                 </a:ext>
               </a:extLst>
             </p:cNvPr>
@@ -4971,7 +4971,7 @@
             <p:cNvPr id="30" name="Rounded Rectangle 29">
               <a:extLst>
                 <a:ext uri="{FF2B5EF4-FFF2-40B4-BE49-F238E27FC236}">
-                  <a16:creationId xmlns="" xmlns:a16="http://schemas.microsoft.com/office/drawing/2014/main" id="{DB32C2BA-0B7D-F040-AB58-94D2D873B677}"/>
+                  <a16:creationId xmlns:a16="http://schemas.microsoft.com/office/drawing/2014/main" id="{DB32C2BA-0B7D-F040-AB58-94D2D873B677}"/>
                 </a:ext>
               </a:extLst>
             </p:cNvPr>
@@ -5019,7 +5019,7 @@
           <p:cNvPr id="36" name="Cube 35">
             <a:extLst>
               <a:ext uri="{FF2B5EF4-FFF2-40B4-BE49-F238E27FC236}">
-                <a16:creationId xmlns="" xmlns:a16="http://schemas.microsoft.com/office/drawing/2014/main" id="{5DFE8F63-223C-8C46-830B-AD32A76C8DDF}"/>
+                <a16:creationId xmlns:a16="http://schemas.microsoft.com/office/drawing/2014/main" id="{5DFE8F63-223C-8C46-830B-AD32A76C8DDF}"/>
               </a:ext>
             </a:extLst>
           </p:cNvPr>
@@ -5082,7 +5082,7 @@
           <p:cNvPr id="41" name="Group 40">
             <a:extLst>
               <a:ext uri="{FF2B5EF4-FFF2-40B4-BE49-F238E27FC236}">
-                <a16:creationId xmlns="" xmlns:a16="http://schemas.microsoft.com/office/drawing/2014/main" id="{C759A5BA-5A51-DA4A-8A74-2BA45EFF015A}"/>
+                <a16:creationId xmlns:a16="http://schemas.microsoft.com/office/drawing/2014/main" id="{C759A5BA-5A51-DA4A-8A74-2BA45EFF015A}"/>
               </a:ext>
             </a:extLst>
           </p:cNvPr>
@@ -5102,7 +5102,7 @@
             <p:cNvPr id="40" name="Rectangle 39">
               <a:extLst>
                 <a:ext uri="{FF2B5EF4-FFF2-40B4-BE49-F238E27FC236}">
-                  <a16:creationId xmlns="" xmlns:a16="http://schemas.microsoft.com/office/drawing/2014/main" id="{CC39024A-6FDD-8F47-91B0-9BD408A82A49}"/>
+                  <a16:creationId xmlns:a16="http://schemas.microsoft.com/office/drawing/2014/main" id="{CC39024A-6FDD-8F47-91B0-9BD408A82A49}"/>
                 </a:ext>
               </a:extLst>
             </p:cNvPr>
@@ -5184,7 +5184,7 @@
             <p:cNvPr id="38" name="Cube 37">
               <a:extLst>
                 <a:ext uri="{FF2B5EF4-FFF2-40B4-BE49-F238E27FC236}">
-                  <a16:creationId xmlns="" xmlns:a16="http://schemas.microsoft.com/office/drawing/2014/main" id="{EF254B30-7B6E-4D4B-8766-DADA7C3745BD}"/>
+                  <a16:creationId xmlns:a16="http://schemas.microsoft.com/office/drawing/2014/main" id="{EF254B30-7B6E-4D4B-8766-DADA7C3745BD}"/>
                 </a:ext>
               </a:extLst>
             </p:cNvPr>
@@ -5244,7 +5244,7 @@
             <p:cNvPr id="39" name="Cube 38">
               <a:extLst>
                 <a:ext uri="{FF2B5EF4-FFF2-40B4-BE49-F238E27FC236}">
-                  <a16:creationId xmlns="" xmlns:a16="http://schemas.microsoft.com/office/drawing/2014/main" id="{3E2FEE0B-6DC4-6D45-A59D-CB44842C9199}"/>
+                  <a16:creationId xmlns:a16="http://schemas.microsoft.com/office/drawing/2014/main" id="{3E2FEE0B-6DC4-6D45-A59D-CB44842C9199}"/>
                 </a:ext>
               </a:extLst>
             </p:cNvPr>
@@ -5305,7 +5305,7 @@
           <p:cNvPr id="51" name="Group 50">
             <a:extLst>
               <a:ext uri="{FF2B5EF4-FFF2-40B4-BE49-F238E27FC236}">
-                <a16:creationId xmlns="" xmlns:a16="http://schemas.microsoft.com/office/drawing/2014/main" id="{939957FA-2E1A-3749-8915-4CD639FD7321}"/>
+                <a16:creationId xmlns:a16="http://schemas.microsoft.com/office/drawing/2014/main" id="{939957FA-2E1A-3749-8915-4CD639FD7321}"/>
               </a:ext>
             </a:extLst>
           </p:cNvPr>
@@ -5325,7 +5325,7 @@
             <p:cNvPr id="44" name="TextBox 43">
               <a:extLst>
                 <a:ext uri="{FF2B5EF4-FFF2-40B4-BE49-F238E27FC236}">
-                  <a16:creationId xmlns="" xmlns:a16="http://schemas.microsoft.com/office/drawing/2014/main" id="{B83B24E7-9069-1D46-A036-037F09CB3C79}"/>
+                  <a16:creationId xmlns:a16="http://schemas.microsoft.com/office/drawing/2014/main" id="{B83B24E7-9069-1D46-A036-037F09CB3C79}"/>
                 </a:ext>
               </a:extLst>
             </p:cNvPr>
@@ -5361,7 +5361,7 @@
             <p:cNvPr id="45" name="Snip Single Corner Rectangle 44">
               <a:extLst>
                 <a:ext uri="{FF2B5EF4-FFF2-40B4-BE49-F238E27FC236}">
-                  <a16:creationId xmlns="" xmlns:a16="http://schemas.microsoft.com/office/drawing/2014/main" id="{A24C9062-CD3E-A54B-97B1-157FC18FBF37}"/>
+                  <a16:creationId xmlns:a16="http://schemas.microsoft.com/office/drawing/2014/main" id="{A24C9062-CD3E-A54B-97B1-157FC18FBF37}"/>
                 </a:ext>
               </a:extLst>
             </p:cNvPr>
@@ -5405,7 +5405,7 @@
             <p:cNvPr id="46" name="Straight Connector 45">
               <a:extLst>
                 <a:ext uri="{FF2B5EF4-FFF2-40B4-BE49-F238E27FC236}">
-                  <a16:creationId xmlns="" xmlns:a16="http://schemas.microsoft.com/office/drawing/2014/main" id="{A594B55A-05E1-3445-8981-2D39C362D1E3}"/>
+                  <a16:creationId xmlns:a16="http://schemas.microsoft.com/office/drawing/2014/main" id="{A594B55A-05E1-3445-8981-2D39C362D1E3}"/>
                 </a:ext>
               </a:extLst>
             </p:cNvPr>
@@ -5446,7 +5446,7 @@
             <p:cNvPr id="47" name="Straight Connector 46">
               <a:extLst>
                 <a:ext uri="{FF2B5EF4-FFF2-40B4-BE49-F238E27FC236}">
-                  <a16:creationId xmlns="" xmlns:a16="http://schemas.microsoft.com/office/drawing/2014/main" id="{EA47048D-6BF2-6842-B8C6-88EFEA789922}"/>
+                  <a16:creationId xmlns:a16="http://schemas.microsoft.com/office/drawing/2014/main" id="{EA47048D-6BF2-6842-B8C6-88EFEA789922}"/>
                 </a:ext>
               </a:extLst>
             </p:cNvPr>
@@ -5487,7 +5487,7 @@
             <p:cNvPr id="48" name="Straight Connector 47">
               <a:extLst>
                 <a:ext uri="{FF2B5EF4-FFF2-40B4-BE49-F238E27FC236}">
-                  <a16:creationId xmlns="" xmlns:a16="http://schemas.microsoft.com/office/drawing/2014/main" id="{9E7BE855-2BFC-BA44-8692-677CF511F5B3}"/>
+                  <a16:creationId xmlns:a16="http://schemas.microsoft.com/office/drawing/2014/main" id="{9E7BE855-2BFC-BA44-8692-677CF511F5B3}"/>
                 </a:ext>
               </a:extLst>
             </p:cNvPr>
@@ -5528,7 +5528,7 @@
             <p:cNvPr id="49" name="Straight Connector 48">
               <a:extLst>
                 <a:ext uri="{FF2B5EF4-FFF2-40B4-BE49-F238E27FC236}">
-                  <a16:creationId xmlns="" xmlns:a16="http://schemas.microsoft.com/office/drawing/2014/main" id="{F14E4605-A5CF-514A-910E-73412EA14BA3}"/>
+                  <a16:creationId xmlns:a16="http://schemas.microsoft.com/office/drawing/2014/main" id="{F14E4605-A5CF-514A-910E-73412EA14BA3}"/>
                 </a:ext>
               </a:extLst>
             </p:cNvPr>
@@ -5570,7 +5570,7 @@
           <p:cNvPr id="53" name="Curved Connector 52">
             <a:extLst>
               <a:ext uri="{FF2B5EF4-FFF2-40B4-BE49-F238E27FC236}">
-                <a16:creationId xmlns="" xmlns:a16="http://schemas.microsoft.com/office/drawing/2014/main" id="{950E21EB-BC86-F644-8B06-3360B209EA13}"/>
+                <a16:creationId xmlns:a16="http://schemas.microsoft.com/office/drawing/2014/main" id="{950E21EB-BC86-F644-8B06-3360B209EA13}"/>
               </a:ext>
             </a:extLst>
           </p:cNvPr>
@@ -5613,7 +5613,7 @@
           <p:cNvPr id="54" name="Curved Connector 53">
             <a:extLst>
               <a:ext uri="{FF2B5EF4-FFF2-40B4-BE49-F238E27FC236}">
-                <a16:creationId xmlns="" xmlns:a16="http://schemas.microsoft.com/office/drawing/2014/main" id="{ACB9E620-19E0-5D4F-9ECE-3A536286F796}"/>
+                <a16:creationId xmlns:a16="http://schemas.microsoft.com/office/drawing/2014/main" id="{ACB9E620-19E0-5D4F-9ECE-3A536286F796}"/>
               </a:ext>
             </a:extLst>
           </p:cNvPr>
@@ -5658,7 +5658,7 @@
           <p:cNvPr id="57" name="Curved Connector 56">
             <a:extLst>
               <a:ext uri="{FF2B5EF4-FFF2-40B4-BE49-F238E27FC236}">
-                <a16:creationId xmlns="" xmlns:a16="http://schemas.microsoft.com/office/drawing/2014/main" id="{387DC31D-2539-3449-92C1-4A4272DEB432}"/>
+                <a16:creationId xmlns:a16="http://schemas.microsoft.com/office/drawing/2014/main" id="{387DC31D-2539-3449-92C1-4A4272DEB432}"/>
               </a:ext>
             </a:extLst>
           </p:cNvPr>
@@ -5703,7 +5703,7 @@
           <p:cNvPr id="60" name="Curved Connector 59">
             <a:extLst>
               <a:ext uri="{FF2B5EF4-FFF2-40B4-BE49-F238E27FC236}">
-                <a16:creationId xmlns="" xmlns:a16="http://schemas.microsoft.com/office/drawing/2014/main" id="{56361E46-CFB5-9248-8E67-947FF6B18BA0}"/>
+                <a16:creationId xmlns:a16="http://schemas.microsoft.com/office/drawing/2014/main" id="{56361E46-CFB5-9248-8E67-947FF6B18BA0}"/>
               </a:ext>
             </a:extLst>
           </p:cNvPr>
@@ -5744,7 +5744,7 @@
           <p:cNvPr id="64" name="Curved Connector 59">
             <a:extLst>
               <a:ext uri="{FF2B5EF4-FFF2-40B4-BE49-F238E27FC236}">
-                <a16:creationId xmlns="" xmlns:a16="http://schemas.microsoft.com/office/drawing/2014/main" id="{56D9BF13-AB6C-E845-8961-B80393CBAF45}"/>
+                <a16:creationId xmlns:a16="http://schemas.microsoft.com/office/drawing/2014/main" id="{56D9BF13-AB6C-E845-8961-B80393CBAF45}"/>
               </a:ext>
             </a:extLst>
           </p:cNvPr>
@@ -5785,7 +5785,7 @@
           <p:cNvPr id="67" name="Curved Connector 59">
             <a:extLst>
               <a:ext uri="{FF2B5EF4-FFF2-40B4-BE49-F238E27FC236}">
-                <a16:creationId xmlns="" xmlns:a16="http://schemas.microsoft.com/office/drawing/2014/main" id="{0B6BBEF3-E586-5746-A3EE-56ECF7FFCA8F}"/>
+                <a16:creationId xmlns:a16="http://schemas.microsoft.com/office/drawing/2014/main" id="{0B6BBEF3-E586-5746-A3EE-56ECF7FFCA8F}"/>
               </a:ext>
             </a:extLst>
           </p:cNvPr>
@@ -5828,7 +5828,7 @@
           <p:cNvPr id="70" name="Curved Connector 59">
             <a:extLst>
               <a:ext uri="{FF2B5EF4-FFF2-40B4-BE49-F238E27FC236}">
-                <a16:creationId xmlns="" xmlns:a16="http://schemas.microsoft.com/office/drawing/2014/main" id="{99360F58-4658-B048-A0CF-62812767E25F}"/>
+                <a16:creationId xmlns:a16="http://schemas.microsoft.com/office/drawing/2014/main" id="{99360F58-4658-B048-A0CF-62812767E25F}"/>
               </a:ext>
             </a:extLst>
           </p:cNvPr>
@@ -5869,7 +5869,7 @@
           <p:cNvPr id="71" name="Curved Connector 70">
             <a:extLst>
               <a:ext uri="{FF2B5EF4-FFF2-40B4-BE49-F238E27FC236}">
-                <a16:creationId xmlns="" xmlns:a16="http://schemas.microsoft.com/office/drawing/2014/main" id="{669BBF38-EDC0-AB42-94EF-9DD97C18B96C}"/>
+                <a16:creationId xmlns:a16="http://schemas.microsoft.com/office/drawing/2014/main" id="{669BBF38-EDC0-AB42-94EF-9DD97C18B96C}"/>
               </a:ext>
             </a:extLst>
           </p:cNvPr>
@@ -5912,7 +5912,7 @@
           <p:cNvPr id="74" name="Curved Connector 73">
             <a:extLst>
               <a:ext uri="{FF2B5EF4-FFF2-40B4-BE49-F238E27FC236}">
-                <a16:creationId xmlns="" xmlns:a16="http://schemas.microsoft.com/office/drawing/2014/main" id="{3D1CA2FA-15DF-AF44-945E-700F8DABE0F0}"/>
+                <a16:creationId xmlns:a16="http://schemas.microsoft.com/office/drawing/2014/main" id="{3D1CA2FA-15DF-AF44-945E-700F8DABE0F0}"/>
               </a:ext>
             </a:extLst>
           </p:cNvPr>
@@ -5954,7 +5954,7 @@
           <p:cNvPr id="91" name="Curved Connector 70">
             <a:extLst>
               <a:ext uri="{FF2B5EF4-FFF2-40B4-BE49-F238E27FC236}">
-                <a16:creationId xmlns="" xmlns:a16="http://schemas.microsoft.com/office/drawing/2014/main" id="{E43F8FDE-0B3F-7746-9F63-6C815C19DDFD}"/>
+                <a16:creationId xmlns:a16="http://schemas.microsoft.com/office/drawing/2014/main" id="{E43F8FDE-0B3F-7746-9F63-6C815C19DDFD}"/>
               </a:ext>
             </a:extLst>
           </p:cNvPr>
@@ -5995,7 +5995,7 @@
           <p:cNvPr id="12" name="Can 11">
             <a:extLst>
               <a:ext uri="{FF2B5EF4-FFF2-40B4-BE49-F238E27FC236}">
-                <a16:creationId xmlns="" xmlns:a16="http://schemas.microsoft.com/office/drawing/2014/main" id="{D9F2DBDA-57C0-904A-B5A4-5D742186469D}"/>
+                <a16:creationId xmlns:a16="http://schemas.microsoft.com/office/drawing/2014/main" id="{D9F2DBDA-57C0-904A-B5A4-5D742186469D}"/>
               </a:ext>
             </a:extLst>
           </p:cNvPr>
@@ -6051,7 +6051,7 @@
           <p:cNvPr id="92" name="Curved Connector 91">
             <a:extLst>
               <a:ext uri="{FF2B5EF4-FFF2-40B4-BE49-F238E27FC236}">
-                <a16:creationId xmlns="" xmlns:a16="http://schemas.microsoft.com/office/drawing/2014/main" id="{A5F259BC-8033-1647-A622-CBA797C2683C}"/>
+                <a16:creationId xmlns:a16="http://schemas.microsoft.com/office/drawing/2014/main" id="{A5F259BC-8033-1647-A622-CBA797C2683C}"/>
               </a:ext>
             </a:extLst>
           </p:cNvPr>
@@ -6094,7 +6094,7 @@
           <p:cNvPr id="29" name="Group 28">
             <a:extLst>
               <a:ext uri="{FF2B5EF4-FFF2-40B4-BE49-F238E27FC236}">
-                <a16:creationId xmlns="" xmlns:a16="http://schemas.microsoft.com/office/drawing/2014/main" id="{8F5AD7A2-4700-6341-800C-4E99A75867F1}"/>
+                <a16:creationId xmlns:a16="http://schemas.microsoft.com/office/drawing/2014/main" id="{8F5AD7A2-4700-6341-800C-4E99A75867F1}"/>
               </a:ext>
             </a:extLst>
           </p:cNvPr>
@@ -6114,7 +6114,7 @@
             <p:cNvPr id="14" name="TextBox 13">
               <a:extLst>
                 <a:ext uri="{FF2B5EF4-FFF2-40B4-BE49-F238E27FC236}">
-                  <a16:creationId xmlns="" xmlns:a16="http://schemas.microsoft.com/office/drawing/2014/main" id="{C7B0DA6A-76CB-DB4F-8044-E1EFBB470C68}"/>
+                  <a16:creationId xmlns:a16="http://schemas.microsoft.com/office/drawing/2014/main" id="{C7B0DA6A-76CB-DB4F-8044-E1EFBB470C68}"/>
                 </a:ext>
               </a:extLst>
             </p:cNvPr>
@@ -6154,7 +6154,7 @@
             <p:cNvPr id="20" name="Group 19">
               <a:extLst>
                 <a:ext uri="{FF2B5EF4-FFF2-40B4-BE49-F238E27FC236}">
-                  <a16:creationId xmlns="" xmlns:a16="http://schemas.microsoft.com/office/drawing/2014/main" id="{2204B3AF-644C-2644-A3A0-1903EEA77DD9}"/>
+                  <a16:creationId xmlns:a16="http://schemas.microsoft.com/office/drawing/2014/main" id="{2204B3AF-644C-2644-A3A0-1903EEA77DD9}"/>
                 </a:ext>
               </a:extLst>
             </p:cNvPr>
@@ -6174,7 +6174,7 @@
               <p:cNvPr id="13" name="Snip Single Corner Rectangle 12">
                 <a:extLst>
                   <a:ext uri="{FF2B5EF4-FFF2-40B4-BE49-F238E27FC236}">
-                    <a16:creationId xmlns="" xmlns:a16="http://schemas.microsoft.com/office/drawing/2014/main" id="{751FE470-CF90-C340-B80C-758938E46A44}"/>
+                    <a16:creationId xmlns:a16="http://schemas.microsoft.com/office/drawing/2014/main" id="{751FE470-CF90-C340-B80C-758938E46A44}"/>
                   </a:ext>
                 </a:extLst>
               </p:cNvPr>
@@ -6218,7 +6218,7 @@
               <p:cNvPr id="16" name="Straight Connector 15">
                 <a:extLst>
                   <a:ext uri="{FF2B5EF4-FFF2-40B4-BE49-F238E27FC236}">
-                    <a16:creationId xmlns="" xmlns:a16="http://schemas.microsoft.com/office/drawing/2014/main" id="{34BE5600-1732-BF43-8B35-46C1653C2836}"/>
+                    <a16:creationId xmlns:a16="http://schemas.microsoft.com/office/drawing/2014/main" id="{34BE5600-1732-BF43-8B35-46C1653C2836}"/>
                   </a:ext>
                 </a:extLst>
               </p:cNvPr>
@@ -6259,7 +6259,7 @@
               <p:cNvPr id="17" name="Straight Connector 16">
                 <a:extLst>
                   <a:ext uri="{FF2B5EF4-FFF2-40B4-BE49-F238E27FC236}">
-                    <a16:creationId xmlns="" xmlns:a16="http://schemas.microsoft.com/office/drawing/2014/main" id="{E722A8A1-4DD9-6445-A3BD-3B1EBD0A9E7D}"/>
+                    <a16:creationId xmlns:a16="http://schemas.microsoft.com/office/drawing/2014/main" id="{E722A8A1-4DD9-6445-A3BD-3B1EBD0A9E7D}"/>
                   </a:ext>
                 </a:extLst>
               </p:cNvPr>
@@ -6300,7 +6300,7 @@
               <p:cNvPr id="18" name="Straight Connector 17">
                 <a:extLst>
                   <a:ext uri="{FF2B5EF4-FFF2-40B4-BE49-F238E27FC236}">
-                    <a16:creationId xmlns="" xmlns:a16="http://schemas.microsoft.com/office/drawing/2014/main" id="{DE7F96F3-534C-2146-91C5-BE4B60173515}"/>
+                    <a16:creationId xmlns:a16="http://schemas.microsoft.com/office/drawing/2014/main" id="{DE7F96F3-534C-2146-91C5-BE4B60173515}"/>
                   </a:ext>
                 </a:extLst>
               </p:cNvPr>
@@ -6341,7 +6341,7 @@
               <p:cNvPr id="19" name="Straight Connector 18">
                 <a:extLst>
                   <a:ext uri="{FF2B5EF4-FFF2-40B4-BE49-F238E27FC236}">
-                    <a16:creationId xmlns="" xmlns:a16="http://schemas.microsoft.com/office/drawing/2014/main" id="{E1879E24-CFD8-814F-9429-4339AC223CB7}"/>
+                    <a16:creationId xmlns:a16="http://schemas.microsoft.com/office/drawing/2014/main" id="{E1879E24-CFD8-814F-9429-4339AC223CB7}"/>
                   </a:ext>
                 </a:extLst>
               </p:cNvPr>
@@ -6414,7 +6414,7 @@
           <p:cNvPr id="33" name="Group 32">
             <a:extLst>
               <a:ext uri="{FF2B5EF4-FFF2-40B4-BE49-F238E27FC236}">
-                <a16:creationId xmlns="" xmlns:a16="http://schemas.microsoft.com/office/drawing/2014/main" id="{9B5C971E-E823-6F4B-AC92-7FCC182551B0}"/>
+                <a16:creationId xmlns:a16="http://schemas.microsoft.com/office/drawing/2014/main" id="{9B5C971E-E823-6F4B-AC92-7FCC182551B0}"/>
               </a:ext>
             </a:extLst>
           </p:cNvPr>
@@ -6434,7 +6434,7 @@
             <p:cNvPr id="6" name="Rectangle 5">
               <a:extLst>
                 <a:ext uri="{FF2B5EF4-FFF2-40B4-BE49-F238E27FC236}">
-                  <a16:creationId xmlns="" xmlns:a16="http://schemas.microsoft.com/office/drawing/2014/main" id="{F96E4CEF-4C1B-B244-BE6A-0BB540570619}"/>
+                  <a16:creationId xmlns:a16="http://schemas.microsoft.com/office/drawing/2014/main" id="{F96E4CEF-4C1B-B244-BE6A-0BB540570619}"/>
                 </a:ext>
               </a:extLst>
             </p:cNvPr>
@@ -6489,7 +6489,7 @@
             <p:cNvPr id="10" name="Rounded Rectangle 9">
               <a:extLst>
                 <a:ext uri="{FF2B5EF4-FFF2-40B4-BE49-F238E27FC236}">
-                  <a16:creationId xmlns="" xmlns:a16="http://schemas.microsoft.com/office/drawing/2014/main" id="{7C598126-C6D0-9B4F-A3C9-B5DFDD798F12}"/>
+                  <a16:creationId xmlns:a16="http://schemas.microsoft.com/office/drawing/2014/main" id="{7C598126-C6D0-9B4F-A3C9-B5DFDD798F12}"/>
                 </a:ext>
               </a:extLst>
             </p:cNvPr>
@@ -6551,7 +6551,7 @@
             <p:cNvPr id="28" name="Group 27">
               <a:extLst>
                 <a:ext uri="{FF2B5EF4-FFF2-40B4-BE49-F238E27FC236}">
-                  <a16:creationId xmlns="" xmlns:a16="http://schemas.microsoft.com/office/drawing/2014/main" id="{C7818A16-01EB-2D4B-8821-4DB8CE3F1CD7}"/>
+                  <a16:creationId xmlns:a16="http://schemas.microsoft.com/office/drawing/2014/main" id="{C7818A16-01EB-2D4B-8821-4DB8CE3F1CD7}"/>
                 </a:ext>
               </a:extLst>
             </p:cNvPr>
@@ -6571,7 +6571,7 @@
               <p:cNvPr id="21" name="TextBox 20">
                 <a:extLst>
                   <a:ext uri="{FF2B5EF4-FFF2-40B4-BE49-F238E27FC236}">
-                    <a16:creationId xmlns="" xmlns:a16="http://schemas.microsoft.com/office/drawing/2014/main" id="{8E115417-89E6-CF46-9DFE-0603E4CEA342}"/>
+                    <a16:creationId xmlns:a16="http://schemas.microsoft.com/office/drawing/2014/main" id="{8E115417-89E6-CF46-9DFE-0603E4CEA342}"/>
                   </a:ext>
                 </a:extLst>
               </p:cNvPr>
@@ -6611,7 +6611,7 @@
               <p:cNvPr id="22" name="Group 21">
                 <a:extLst>
                   <a:ext uri="{FF2B5EF4-FFF2-40B4-BE49-F238E27FC236}">
-                    <a16:creationId xmlns="" xmlns:a16="http://schemas.microsoft.com/office/drawing/2014/main" id="{D7F20AD9-7CA4-0041-955B-5E18FE4DAC77}"/>
+                    <a16:creationId xmlns:a16="http://schemas.microsoft.com/office/drawing/2014/main" id="{D7F20AD9-7CA4-0041-955B-5E18FE4DAC77}"/>
                   </a:ext>
                 </a:extLst>
               </p:cNvPr>
@@ -6631,7 +6631,7 @@
                 <p:cNvPr id="23" name="Snip Single Corner Rectangle 22">
                   <a:extLst>
                     <a:ext uri="{FF2B5EF4-FFF2-40B4-BE49-F238E27FC236}">
-                      <a16:creationId xmlns="" xmlns:a16="http://schemas.microsoft.com/office/drawing/2014/main" id="{06FA0D0C-9EA4-F04D-A8A9-5995163A633F}"/>
+                      <a16:creationId xmlns:a16="http://schemas.microsoft.com/office/drawing/2014/main" id="{06FA0D0C-9EA4-F04D-A8A9-5995163A633F}"/>
                     </a:ext>
                   </a:extLst>
                 </p:cNvPr>
@@ -6675,7 +6675,7 @@
                 <p:cNvPr id="24" name="Straight Connector 23">
                   <a:extLst>
                     <a:ext uri="{FF2B5EF4-FFF2-40B4-BE49-F238E27FC236}">
-                      <a16:creationId xmlns="" xmlns:a16="http://schemas.microsoft.com/office/drawing/2014/main" id="{308B8246-BD2E-AE48-879F-EBC48ABC90EA}"/>
+                      <a16:creationId xmlns:a16="http://schemas.microsoft.com/office/drawing/2014/main" id="{308B8246-BD2E-AE48-879F-EBC48ABC90EA}"/>
                     </a:ext>
                   </a:extLst>
                 </p:cNvPr>
@@ -6716,7 +6716,7 @@
                 <p:cNvPr id="25" name="Straight Connector 24">
                   <a:extLst>
                     <a:ext uri="{FF2B5EF4-FFF2-40B4-BE49-F238E27FC236}">
-                      <a16:creationId xmlns="" xmlns:a16="http://schemas.microsoft.com/office/drawing/2014/main" id="{78CCB9DB-2613-214E-9817-C9A41BE4C724}"/>
+                      <a16:creationId xmlns:a16="http://schemas.microsoft.com/office/drawing/2014/main" id="{78CCB9DB-2613-214E-9817-C9A41BE4C724}"/>
                     </a:ext>
                   </a:extLst>
                 </p:cNvPr>
@@ -6757,7 +6757,7 @@
                 <p:cNvPr id="26" name="Straight Connector 25">
                   <a:extLst>
                     <a:ext uri="{FF2B5EF4-FFF2-40B4-BE49-F238E27FC236}">
-                      <a16:creationId xmlns="" xmlns:a16="http://schemas.microsoft.com/office/drawing/2014/main" id="{6B70F2B2-5A83-1F4B-B4D5-AD5064B29D6D}"/>
+                      <a16:creationId xmlns:a16="http://schemas.microsoft.com/office/drawing/2014/main" id="{6B70F2B2-5A83-1F4B-B4D5-AD5064B29D6D}"/>
                     </a:ext>
                   </a:extLst>
                 </p:cNvPr>
@@ -6798,7 +6798,7 @@
                 <p:cNvPr id="27" name="Straight Connector 26">
                   <a:extLst>
                     <a:ext uri="{FF2B5EF4-FFF2-40B4-BE49-F238E27FC236}">
-                      <a16:creationId xmlns="" xmlns:a16="http://schemas.microsoft.com/office/drawing/2014/main" id="{77E995BE-6ACF-9B43-8A72-2F40C0D6AE54}"/>
+                      <a16:creationId xmlns:a16="http://schemas.microsoft.com/office/drawing/2014/main" id="{77E995BE-6ACF-9B43-8A72-2F40C0D6AE54}"/>
                     </a:ext>
                   </a:extLst>
                 </p:cNvPr>
@@ -6842,7 +6842,7 @@
           <p:cNvPr id="4" name="Rectangle 3">
             <a:extLst>
               <a:ext uri="{FF2B5EF4-FFF2-40B4-BE49-F238E27FC236}">
-                <a16:creationId xmlns="" xmlns:a16="http://schemas.microsoft.com/office/drawing/2014/main" id="{D44296FC-44E1-5E44-B8F1-ACF7669705BF}"/>
+                <a16:creationId xmlns:a16="http://schemas.microsoft.com/office/drawing/2014/main" id="{D44296FC-44E1-5E44-B8F1-ACF7669705BF}"/>
               </a:ext>
             </a:extLst>
           </p:cNvPr>
@@ -6891,7 +6891,7 @@
           <p:cNvPr id="8" name="Rounded Rectangle 7">
             <a:extLst>
               <a:ext uri="{FF2B5EF4-FFF2-40B4-BE49-F238E27FC236}">
-                <a16:creationId xmlns="" xmlns:a16="http://schemas.microsoft.com/office/drawing/2014/main" id="{67F55CC5-2673-4A46-8AA5-EF074A023FBE}"/>
+                <a16:creationId xmlns:a16="http://schemas.microsoft.com/office/drawing/2014/main" id="{67F55CC5-2673-4A46-8AA5-EF074A023FBE}"/>
               </a:ext>
             </a:extLst>
           </p:cNvPr>
@@ -6938,7 +6938,7 @@
           <p:cNvPr id="5" name="Rectangle 4">
             <a:extLst>
               <a:ext uri="{FF2B5EF4-FFF2-40B4-BE49-F238E27FC236}">
-                <a16:creationId xmlns="" xmlns:a16="http://schemas.microsoft.com/office/drawing/2014/main" id="{92388B54-2A40-D447-84BE-2EA6F53F107A}"/>
+                <a16:creationId xmlns:a16="http://schemas.microsoft.com/office/drawing/2014/main" id="{92388B54-2A40-D447-84BE-2EA6F53F107A}"/>
               </a:ext>
             </a:extLst>
           </p:cNvPr>
@@ -6987,7 +6987,7 @@
           <p:cNvPr id="9" name="Rounded Rectangle 8">
             <a:extLst>
               <a:ext uri="{FF2B5EF4-FFF2-40B4-BE49-F238E27FC236}">
-                <a16:creationId xmlns="" xmlns:a16="http://schemas.microsoft.com/office/drawing/2014/main" id="{351CB379-D8CA-574B-9035-4F9773A33529}"/>
+                <a16:creationId xmlns:a16="http://schemas.microsoft.com/office/drawing/2014/main" id="{351CB379-D8CA-574B-9035-4F9773A33529}"/>
               </a:ext>
             </a:extLst>
           </p:cNvPr>
@@ -7042,7 +7042,7 @@
           <p:cNvPr id="34" name="Group 33">
             <a:extLst>
               <a:ext uri="{FF2B5EF4-FFF2-40B4-BE49-F238E27FC236}">
-                <a16:creationId xmlns="" xmlns:a16="http://schemas.microsoft.com/office/drawing/2014/main" id="{B81CAC7E-E4B1-F44B-B0CA-252498C86C2A}"/>
+                <a16:creationId xmlns:a16="http://schemas.microsoft.com/office/drawing/2014/main" id="{B81CAC7E-E4B1-F44B-B0CA-252498C86C2A}"/>
               </a:ext>
             </a:extLst>
           </p:cNvPr>
@@ -7062,7 +7062,7 @@
             <p:cNvPr id="7" name="Rectangle 6">
               <a:extLst>
                 <a:ext uri="{FF2B5EF4-FFF2-40B4-BE49-F238E27FC236}">
-                  <a16:creationId xmlns="" xmlns:a16="http://schemas.microsoft.com/office/drawing/2014/main" id="{24B2218B-44C2-2E49-A2B2-C8C5EFA69EAE}"/>
+                  <a16:creationId xmlns:a16="http://schemas.microsoft.com/office/drawing/2014/main" id="{24B2218B-44C2-2E49-A2B2-C8C5EFA69EAE}"/>
                 </a:ext>
               </a:extLst>
             </p:cNvPr>
@@ -7111,7 +7111,7 @@
             <p:cNvPr id="11" name="Rounded Rectangle 10">
               <a:extLst>
                 <a:ext uri="{FF2B5EF4-FFF2-40B4-BE49-F238E27FC236}">
-                  <a16:creationId xmlns="" xmlns:a16="http://schemas.microsoft.com/office/drawing/2014/main" id="{39322434-EC85-F440-A08A-BB8939C64696}"/>
+                  <a16:creationId xmlns:a16="http://schemas.microsoft.com/office/drawing/2014/main" id="{39322434-EC85-F440-A08A-BB8939C64696}"/>
                 </a:ext>
               </a:extLst>
             </p:cNvPr>
@@ -7158,7 +7158,7 @@
             <p:cNvPr id="30" name="Rounded Rectangle 29">
               <a:extLst>
                 <a:ext uri="{FF2B5EF4-FFF2-40B4-BE49-F238E27FC236}">
-                  <a16:creationId xmlns="" xmlns:a16="http://schemas.microsoft.com/office/drawing/2014/main" id="{DB32C2BA-0B7D-F040-AB58-94D2D873B677}"/>
+                  <a16:creationId xmlns:a16="http://schemas.microsoft.com/office/drawing/2014/main" id="{DB32C2BA-0B7D-F040-AB58-94D2D873B677}"/>
                 </a:ext>
               </a:extLst>
             </p:cNvPr>
@@ -7206,7 +7206,7 @@
           <p:cNvPr id="36" name="Cube 35">
             <a:extLst>
               <a:ext uri="{FF2B5EF4-FFF2-40B4-BE49-F238E27FC236}">
-                <a16:creationId xmlns="" xmlns:a16="http://schemas.microsoft.com/office/drawing/2014/main" id="{5DFE8F63-223C-8C46-830B-AD32A76C8DDF}"/>
+                <a16:creationId xmlns:a16="http://schemas.microsoft.com/office/drawing/2014/main" id="{5DFE8F63-223C-8C46-830B-AD32A76C8DDF}"/>
               </a:ext>
             </a:extLst>
           </p:cNvPr>
@@ -7269,7 +7269,7 @@
           <p:cNvPr id="41" name="Group 40">
             <a:extLst>
               <a:ext uri="{FF2B5EF4-FFF2-40B4-BE49-F238E27FC236}">
-                <a16:creationId xmlns="" xmlns:a16="http://schemas.microsoft.com/office/drawing/2014/main" id="{C759A5BA-5A51-DA4A-8A74-2BA45EFF015A}"/>
+                <a16:creationId xmlns:a16="http://schemas.microsoft.com/office/drawing/2014/main" id="{C759A5BA-5A51-DA4A-8A74-2BA45EFF015A}"/>
               </a:ext>
             </a:extLst>
           </p:cNvPr>
@@ -7289,7 +7289,7 @@
             <p:cNvPr id="40" name="Rectangle 39">
               <a:extLst>
                 <a:ext uri="{FF2B5EF4-FFF2-40B4-BE49-F238E27FC236}">
-                  <a16:creationId xmlns="" xmlns:a16="http://schemas.microsoft.com/office/drawing/2014/main" id="{CC39024A-6FDD-8F47-91B0-9BD408A82A49}"/>
+                  <a16:creationId xmlns:a16="http://schemas.microsoft.com/office/drawing/2014/main" id="{CC39024A-6FDD-8F47-91B0-9BD408A82A49}"/>
                 </a:ext>
               </a:extLst>
             </p:cNvPr>
@@ -7371,7 +7371,7 @@
             <p:cNvPr id="38" name="Cube 37">
               <a:extLst>
                 <a:ext uri="{FF2B5EF4-FFF2-40B4-BE49-F238E27FC236}">
-                  <a16:creationId xmlns="" xmlns:a16="http://schemas.microsoft.com/office/drawing/2014/main" id="{EF254B30-7B6E-4D4B-8766-DADA7C3745BD}"/>
+                  <a16:creationId xmlns:a16="http://schemas.microsoft.com/office/drawing/2014/main" id="{EF254B30-7B6E-4D4B-8766-DADA7C3745BD}"/>
                 </a:ext>
               </a:extLst>
             </p:cNvPr>
@@ -7431,7 +7431,7 @@
             <p:cNvPr id="39" name="Cube 38">
               <a:extLst>
                 <a:ext uri="{FF2B5EF4-FFF2-40B4-BE49-F238E27FC236}">
-                  <a16:creationId xmlns="" xmlns:a16="http://schemas.microsoft.com/office/drawing/2014/main" id="{3E2FEE0B-6DC4-6D45-A59D-CB44842C9199}"/>
+                  <a16:creationId xmlns:a16="http://schemas.microsoft.com/office/drawing/2014/main" id="{3E2FEE0B-6DC4-6D45-A59D-CB44842C9199}"/>
                 </a:ext>
               </a:extLst>
             </p:cNvPr>
@@ -7492,7 +7492,7 @@
           <p:cNvPr id="51" name="Group 50">
             <a:extLst>
               <a:ext uri="{FF2B5EF4-FFF2-40B4-BE49-F238E27FC236}">
-                <a16:creationId xmlns="" xmlns:a16="http://schemas.microsoft.com/office/drawing/2014/main" id="{939957FA-2E1A-3749-8915-4CD639FD7321}"/>
+                <a16:creationId xmlns:a16="http://schemas.microsoft.com/office/drawing/2014/main" id="{939957FA-2E1A-3749-8915-4CD639FD7321}"/>
               </a:ext>
             </a:extLst>
           </p:cNvPr>
@@ -7512,7 +7512,7 @@
             <p:cNvPr id="44" name="TextBox 43">
               <a:extLst>
                 <a:ext uri="{FF2B5EF4-FFF2-40B4-BE49-F238E27FC236}">
-                  <a16:creationId xmlns="" xmlns:a16="http://schemas.microsoft.com/office/drawing/2014/main" id="{B83B24E7-9069-1D46-A036-037F09CB3C79}"/>
+                  <a16:creationId xmlns:a16="http://schemas.microsoft.com/office/drawing/2014/main" id="{B83B24E7-9069-1D46-A036-037F09CB3C79}"/>
                 </a:ext>
               </a:extLst>
             </p:cNvPr>
@@ -7548,7 +7548,7 @@
             <p:cNvPr id="45" name="Snip Single Corner Rectangle 44">
               <a:extLst>
                 <a:ext uri="{FF2B5EF4-FFF2-40B4-BE49-F238E27FC236}">
-                  <a16:creationId xmlns="" xmlns:a16="http://schemas.microsoft.com/office/drawing/2014/main" id="{A24C9062-CD3E-A54B-97B1-157FC18FBF37}"/>
+                  <a16:creationId xmlns:a16="http://schemas.microsoft.com/office/drawing/2014/main" id="{A24C9062-CD3E-A54B-97B1-157FC18FBF37}"/>
                 </a:ext>
               </a:extLst>
             </p:cNvPr>
@@ -7592,7 +7592,7 @@
             <p:cNvPr id="46" name="Straight Connector 45">
               <a:extLst>
                 <a:ext uri="{FF2B5EF4-FFF2-40B4-BE49-F238E27FC236}">
-                  <a16:creationId xmlns="" xmlns:a16="http://schemas.microsoft.com/office/drawing/2014/main" id="{A594B55A-05E1-3445-8981-2D39C362D1E3}"/>
+                  <a16:creationId xmlns:a16="http://schemas.microsoft.com/office/drawing/2014/main" id="{A594B55A-05E1-3445-8981-2D39C362D1E3}"/>
                 </a:ext>
               </a:extLst>
             </p:cNvPr>
@@ -7633,7 +7633,7 @@
             <p:cNvPr id="47" name="Straight Connector 46">
               <a:extLst>
                 <a:ext uri="{FF2B5EF4-FFF2-40B4-BE49-F238E27FC236}">
-                  <a16:creationId xmlns="" xmlns:a16="http://schemas.microsoft.com/office/drawing/2014/main" id="{EA47048D-6BF2-6842-B8C6-88EFEA789922}"/>
+                  <a16:creationId xmlns:a16="http://schemas.microsoft.com/office/drawing/2014/main" id="{EA47048D-6BF2-6842-B8C6-88EFEA789922}"/>
                 </a:ext>
               </a:extLst>
             </p:cNvPr>
@@ -7674,7 +7674,7 @@
             <p:cNvPr id="48" name="Straight Connector 47">
               <a:extLst>
                 <a:ext uri="{FF2B5EF4-FFF2-40B4-BE49-F238E27FC236}">
-                  <a16:creationId xmlns="" xmlns:a16="http://schemas.microsoft.com/office/drawing/2014/main" id="{9E7BE855-2BFC-BA44-8692-677CF511F5B3}"/>
+                  <a16:creationId xmlns:a16="http://schemas.microsoft.com/office/drawing/2014/main" id="{9E7BE855-2BFC-BA44-8692-677CF511F5B3}"/>
                 </a:ext>
               </a:extLst>
             </p:cNvPr>
@@ -7715,7 +7715,7 @@
             <p:cNvPr id="49" name="Straight Connector 48">
               <a:extLst>
                 <a:ext uri="{FF2B5EF4-FFF2-40B4-BE49-F238E27FC236}">
-                  <a16:creationId xmlns="" xmlns:a16="http://schemas.microsoft.com/office/drawing/2014/main" id="{F14E4605-A5CF-514A-910E-73412EA14BA3}"/>
+                  <a16:creationId xmlns:a16="http://schemas.microsoft.com/office/drawing/2014/main" id="{F14E4605-A5CF-514A-910E-73412EA14BA3}"/>
                 </a:ext>
               </a:extLst>
             </p:cNvPr>
@@ -7757,7 +7757,7 @@
           <p:cNvPr id="53" name="Curved Connector 52">
             <a:extLst>
               <a:ext uri="{FF2B5EF4-FFF2-40B4-BE49-F238E27FC236}">
-                <a16:creationId xmlns="" xmlns:a16="http://schemas.microsoft.com/office/drawing/2014/main" id="{950E21EB-BC86-F644-8B06-3360B209EA13}"/>
+                <a16:creationId xmlns:a16="http://schemas.microsoft.com/office/drawing/2014/main" id="{950E21EB-BC86-F644-8B06-3360B209EA13}"/>
               </a:ext>
             </a:extLst>
           </p:cNvPr>
@@ -7800,7 +7800,7 @@
           <p:cNvPr id="54" name="Curved Connector 53">
             <a:extLst>
               <a:ext uri="{FF2B5EF4-FFF2-40B4-BE49-F238E27FC236}">
-                <a16:creationId xmlns="" xmlns:a16="http://schemas.microsoft.com/office/drawing/2014/main" id="{ACB9E620-19E0-5D4F-9ECE-3A536286F796}"/>
+                <a16:creationId xmlns:a16="http://schemas.microsoft.com/office/drawing/2014/main" id="{ACB9E620-19E0-5D4F-9ECE-3A536286F796}"/>
               </a:ext>
             </a:extLst>
           </p:cNvPr>
@@ -7845,7 +7845,7 @@
           <p:cNvPr id="57" name="Curved Connector 56">
             <a:extLst>
               <a:ext uri="{FF2B5EF4-FFF2-40B4-BE49-F238E27FC236}">
-                <a16:creationId xmlns="" xmlns:a16="http://schemas.microsoft.com/office/drawing/2014/main" id="{387DC31D-2539-3449-92C1-4A4272DEB432}"/>
+                <a16:creationId xmlns:a16="http://schemas.microsoft.com/office/drawing/2014/main" id="{387DC31D-2539-3449-92C1-4A4272DEB432}"/>
               </a:ext>
             </a:extLst>
           </p:cNvPr>
@@ -7890,7 +7890,7 @@
           <p:cNvPr id="60" name="Curved Connector 59">
             <a:extLst>
               <a:ext uri="{FF2B5EF4-FFF2-40B4-BE49-F238E27FC236}">
-                <a16:creationId xmlns="" xmlns:a16="http://schemas.microsoft.com/office/drawing/2014/main" id="{56361E46-CFB5-9248-8E67-947FF6B18BA0}"/>
+                <a16:creationId xmlns:a16="http://schemas.microsoft.com/office/drawing/2014/main" id="{56361E46-CFB5-9248-8E67-947FF6B18BA0}"/>
               </a:ext>
             </a:extLst>
           </p:cNvPr>
@@ -7931,7 +7931,7 @@
           <p:cNvPr id="64" name="Curved Connector 59">
             <a:extLst>
               <a:ext uri="{FF2B5EF4-FFF2-40B4-BE49-F238E27FC236}">
-                <a16:creationId xmlns="" xmlns:a16="http://schemas.microsoft.com/office/drawing/2014/main" id="{56D9BF13-AB6C-E845-8961-B80393CBAF45}"/>
+                <a16:creationId xmlns:a16="http://schemas.microsoft.com/office/drawing/2014/main" id="{56D9BF13-AB6C-E845-8961-B80393CBAF45}"/>
               </a:ext>
             </a:extLst>
           </p:cNvPr>
@@ -7972,7 +7972,7 @@
           <p:cNvPr id="67" name="Curved Connector 59">
             <a:extLst>
               <a:ext uri="{FF2B5EF4-FFF2-40B4-BE49-F238E27FC236}">
-                <a16:creationId xmlns="" xmlns:a16="http://schemas.microsoft.com/office/drawing/2014/main" id="{0B6BBEF3-E586-5746-A3EE-56ECF7FFCA8F}"/>
+                <a16:creationId xmlns:a16="http://schemas.microsoft.com/office/drawing/2014/main" id="{0B6BBEF3-E586-5746-A3EE-56ECF7FFCA8F}"/>
               </a:ext>
             </a:extLst>
           </p:cNvPr>
@@ -8015,7 +8015,7 @@
           <p:cNvPr id="70" name="Curved Connector 59">
             <a:extLst>
               <a:ext uri="{FF2B5EF4-FFF2-40B4-BE49-F238E27FC236}">
-                <a16:creationId xmlns="" xmlns:a16="http://schemas.microsoft.com/office/drawing/2014/main" id="{99360F58-4658-B048-A0CF-62812767E25F}"/>
+                <a16:creationId xmlns:a16="http://schemas.microsoft.com/office/drawing/2014/main" id="{99360F58-4658-B048-A0CF-62812767E25F}"/>
               </a:ext>
             </a:extLst>
           </p:cNvPr>
@@ -8056,7 +8056,7 @@
           <p:cNvPr id="71" name="Curved Connector 70">
             <a:extLst>
               <a:ext uri="{FF2B5EF4-FFF2-40B4-BE49-F238E27FC236}">
-                <a16:creationId xmlns="" xmlns:a16="http://schemas.microsoft.com/office/drawing/2014/main" id="{669BBF38-EDC0-AB42-94EF-9DD97C18B96C}"/>
+                <a16:creationId xmlns:a16="http://schemas.microsoft.com/office/drawing/2014/main" id="{669BBF38-EDC0-AB42-94EF-9DD97C18B96C}"/>
               </a:ext>
             </a:extLst>
           </p:cNvPr>
@@ -8099,7 +8099,7 @@
           <p:cNvPr id="74" name="Curved Connector 73">
             <a:extLst>
               <a:ext uri="{FF2B5EF4-FFF2-40B4-BE49-F238E27FC236}">
-                <a16:creationId xmlns="" xmlns:a16="http://schemas.microsoft.com/office/drawing/2014/main" id="{3D1CA2FA-15DF-AF44-945E-700F8DABE0F0}"/>
+                <a16:creationId xmlns:a16="http://schemas.microsoft.com/office/drawing/2014/main" id="{3D1CA2FA-15DF-AF44-945E-700F8DABE0F0}"/>
               </a:ext>
             </a:extLst>
           </p:cNvPr>
@@ -8141,7 +8141,7 @@
           <p:cNvPr id="91" name="Curved Connector 70">
             <a:extLst>
               <a:ext uri="{FF2B5EF4-FFF2-40B4-BE49-F238E27FC236}">
-                <a16:creationId xmlns="" xmlns:a16="http://schemas.microsoft.com/office/drawing/2014/main" id="{E43F8FDE-0B3F-7746-9F63-6C815C19DDFD}"/>
+                <a16:creationId xmlns:a16="http://schemas.microsoft.com/office/drawing/2014/main" id="{E43F8FDE-0B3F-7746-9F63-6C815C19DDFD}"/>
               </a:ext>
             </a:extLst>
           </p:cNvPr>
@@ -8182,7 +8182,7 @@
           <p:cNvPr id="12" name="Can 11">
             <a:extLst>
               <a:ext uri="{FF2B5EF4-FFF2-40B4-BE49-F238E27FC236}">
-                <a16:creationId xmlns="" xmlns:a16="http://schemas.microsoft.com/office/drawing/2014/main" id="{D9F2DBDA-57C0-904A-B5A4-5D742186469D}"/>
+                <a16:creationId xmlns:a16="http://schemas.microsoft.com/office/drawing/2014/main" id="{D9F2DBDA-57C0-904A-B5A4-5D742186469D}"/>
               </a:ext>
             </a:extLst>
           </p:cNvPr>
@@ -8238,7 +8238,7 @@
           <p:cNvPr id="92" name="Curved Connector 91">
             <a:extLst>
               <a:ext uri="{FF2B5EF4-FFF2-40B4-BE49-F238E27FC236}">
-                <a16:creationId xmlns="" xmlns:a16="http://schemas.microsoft.com/office/drawing/2014/main" id="{A5F259BC-8033-1647-A622-CBA797C2683C}"/>
+                <a16:creationId xmlns:a16="http://schemas.microsoft.com/office/drawing/2014/main" id="{A5F259BC-8033-1647-A622-CBA797C2683C}"/>
               </a:ext>
             </a:extLst>
           </p:cNvPr>
@@ -8281,7 +8281,7 @@
           <p:cNvPr id="29" name="Group 28">
             <a:extLst>
               <a:ext uri="{FF2B5EF4-FFF2-40B4-BE49-F238E27FC236}">
-                <a16:creationId xmlns="" xmlns:a16="http://schemas.microsoft.com/office/drawing/2014/main" id="{8F5AD7A2-4700-6341-800C-4E99A75867F1}"/>
+                <a16:creationId xmlns:a16="http://schemas.microsoft.com/office/drawing/2014/main" id="{8F5AD7A2-4700-6341-800C-4E99A75867F1}"/>
               </a:ext>
             </a:extLst>
           </p:cNvPr>
@@ -8301,7 +8301,7 @@
             <p:cNvPr id="14" name="TextBox 13">
               <a:extLst>
                 <a:ext uri="{FF2B5EF4-FFF2-40B4-BE49-F238E27FC236}">
-                  <a16:creationId xmlns="" xmlns:a16="http://schemas.microsoft.com/office/drawing/2014/main" id="{C7B0DA6A-76CB-DB4F-8044-E1EFBB470C68}"/>
+                  <a16:creationId xmlns:a16="http://schemas.microsoft.com/office/drawing/2014/main" id="{C7B0DA6A-76CB-DB4F-8044-E1EFBB470C68}"/>
                 </a:ext>
               </a:extLst>
             </p:cNvPr>
@@ -8341,7 +8341,7 @@
             <p:cNvPr id="20" name="Group 19">
               <a:extLst>
                 <a:ext uri="{FF2B5EF4-FFF2-40B4-BE49-F238E27FC236}">
-                  <a16:creationId xmlns="" xmlns:a16="http://schemas.microsoft.com/office/drawing/2014/main" id="{2204B3AF-644C-2644-A3A0-1903EEA77DD9}"/>
+                  <a16:creationId xmlns:a16="http://schemas.microsoft.com/office/drawing/2014/main" id="{2204B3AF-644C-2644-A3A0-1903EEA77DD9}"/>
                 </a:ext>
               </a:extLst>
             </p:cNvPr>
@@ -8361,7 +8361,7 @@
               <p:cNvPr id="13" name="Snip Single Corner Rectangle 12">
                 <a:extLst>
                   <a:ext uri="{FF2B5EF4-FFF2-40B4-BE49-F238E27FC236}">
-                    <a16:creationId xmlns="" xmlns:a16="http://schemas.microsoft.com/office/drawing/2014/main" id="{751FE470-CF90-C340-B80C-758938E46A44}"/>
+                    <a16:creationId xmlns:a16="http://schemas.microsoft.com/office/drawing/2014/main" id="{751FE470-CF90-C340-B80C-758938E46A44}"/>
                   </a:ext>
                 </a:extLst>
               </p:cNvPr>
@@ -8405,7 +8405,7 @@
               <p:cNvPr id="16" name="Straight Connector 15">
                 <a:extLst>
                   <a:ext uri="{FF2B5EF4-FFF2-40B4-BE49-F238E27FC236}">
-                    <a16:creationId xmlns="" xmlns:a16="http://schemas.microsoft.com/office/drawing/2014/main" id="{34BE5600-1732-BF43-8B35-46C1653C2836}"/>
+                    <a16:creationId xmlns:a16="http://schemas.microsoft.com/office/drawing/2014/main" id="{34BE5600-1732-BF43-8B35-46C1653C2836}"/>
                   </a:ext>
                 </a:extLst>
               </p:cNvPr>
@@ -8446,7 +8446,7 @@
               <p:cNvPr id="17" name="Straight Connector 16">
                 <a:extLst>
                   <a:ext uri="{FF2B5EF4-FFF2-40B4-BE49-F238E27FC236}">
-                    <a16:creationId xmlns="" xmlns:a16="http://schemas.microsoft.com/office/drawing/2014/main" id="{E722A8A1-4DD9-6445-A3BD-3B1EBD0A9E7D}"/>
+                    <a16:creationId xmlns:a16="http://schemas.microsoft.com/office/drawing/2014/main" id="{E722A8A1-4DD9-6445-A3BD-3B1EBD0A9E7D}"/>
                   </a:ext>
                 </a:extLst>
               </p:cNvPr>
@@ -8487,7 +8487,7 @@
               <p:cNvPr id="18" name="Straight Connector 17">
                 <a:extLst>
                   <a:ext uri="{FF2B5EF4-FFF2-40B4-BE49-F238E27FC236}">
-                    <a16:creationId xmlns="" xmlns:a16="http://schemas.microsoft.com/office/drawing/2014/main" id="{DE7F96F3-534C-2146-91C5-BE4B60173515}"/>
+                    <a16:creationId xmlns:a16="http://schemas.microsoft.com/office/drawing/2014/main" id="{DE7F96F3-534C-2146-91C5-BE4B60173515}"/>
                   </a:ext>
                 </a:extLst>
               </p:cNvPr>
@@ -8528,7 +8528,7 @@
               <p:cNvPr id="19" name="Straight Connector 18">
                 <a:extLst>
                   <a:ext uri="{FF2B5EF4-FFF2-40B4-BE49-F238E27FC236}">
-                    <a16:creationId xmlns="" xmlns:a16="http://schemas.microsoft.com/office/drawing/2014/main" id="{E1879E24-CFD8-814F-9429-4339AC223CB7}"/>
+                    <a16:creationId xmlns:a16="http://schemas.microsoft.com/office/drawing/2014/main" id="{E1879E24-CFD8-814F-9429-4339AC223CB7}"/>
                   </a:ext>
                 </a:extLst>
               </p:cNvPr>
@@ -8601,7 +8601,7 @@
           <p:cNvPr id="4" name="Rectangle 3">
             <a:extLst>
               <a:ext uri="{FF2B5EF4-FFF2-40B4-BE49-F238E27FC236}">
-                <a16:creationId xmlns="" xmlns:a16="http://schemas.microsoft.com/office/drawing/2014/main" id="{92388B54-2A40-D447-84BE-2EA6F53F107A}"/>
+                <a16:creationId xmlns:a16="http://schemas.microsoft.com/office/drawing/2014/main" id="{92388B54-2A40-D447-84BE-2EA6F53F107A}"/>
               </a:ext>
             </a:extLst>
           </p:cNvPr>
@@ -8661,7 +8661,7 @@
           <p:cNvPr id="5" name="Rounded Rectangle 4">
             <a:extLst>
               <a:ext uri="{FF2B5EF4-FFF2-40B4-BE49-F238E27FC236}">
-                <a16:creationId xmlns="" xmlns:a16="http://schemas.microsoft.com/office/drawing/2014/main" id="{351CB379-D8CA-574B-9035-4F9773A33529}"/>
+                <a16:creationId xmlns:a16="http://schemas.microsoft.com/office/drawing/2014/main" id="{351CB379-D8CA-574B-9035-4F9773A33529}"/>
               </a:ext>
             </a:extLst>
           </p:cNvPr>
@@ -8707,10 +8707,9 @@
           <a:p>
             <a:pPr algn="ctr"/>
             <a:r>
-              <a:rPr lang="en-US" sz="2400" dirty="0" smtClean="0"/>
+              <a:rPr lang="en-US" sz="2400" dirty="0"/>
               <a:t>Mapper</a:t>
             </a:r>
-            <a:endParaRPr lang="en-US" sz="2400" dirty="0"/>
           </a:p>
         </p:txBody>
       </p:sp>
@@ -8719,7 +8718,7 @@
           <p:cNvPr id="7" name="Curved Connector 59">
             <a:extLst>
               <a:ext uri="{FF2B5EF4-FFF2-40B4-BE49-F238E27FC236}">
-                <a16:creationId xmlns="" xmlns:a16="http://schemas.microsoft.com/office/drawing/2014/main" id="{99360F58-4658-B048-A0CF-62812767E25F}"/>
+                <a16:creationId xmlns:a16="http://schemas.microsoft.com/office/drawing/2014/main" id="{99360F58-4658-B048-A0CF-62812767E25F}"/>
               </a:ext>
             </a:extLst>
           </p:cNvPr>
@@ -8760,7 +8759,7 @@
           <p:cNvPr id="9" name="TextBox 8">
             <a:extLst>
               <a:ext uri="{FF2B5EF4-FFF2-40B4-BE49-F238E27FC236}">
-                <a16:creationId xmlns="" xmlns:a16="http://schemas.microsoft.com/office/drawing/2014/main" id="{C7B0DA6A-76CB-DB4F-8044-E1EFBB470C68}"/>
+                <a16:creationId xmlns:a16="http://schemas.microsoft.com/office/drawing/2014/main" id="{C7B0DA6A-76CB-DB4F-8044-E1EFBB470C68}"/>
               </a:ext>
             </a:extLst>
           </p:cNvPr>
@@ -8796,7 +8795,7 @@
           <p:cNvPr id="10" name="Group 9">
             <a:extLst>
               <a:ext uri="{FF2B5EF4-FFF2-40B4-BE49-F238E27FC236}">
-                <a16:creationId xmlns="" xmlns:a16="http://schemas.microsoft.com/office/drawing/2014/main" id="{2204B3AF-644C-2644-A3A0-1903EEA77DD9}"/>
+                <a16:creationId xmlns:a16="http://schemas.microsoft.com/office/drawing/2014/main" id="{2204B3AF-644C-2644-A3A0-1903EEA77DD9}"/>
               </a:ext>
             </a:extLst>
           </p:cNvPr>
@@ -8816,7 +8815,7 @@
             <p:cNvPr id="11" name="Snip Single Corner Rectangle 10">
               <a:extLst>
                 <a:ext uri="{FF2B5EF4-FFF2-40B4-BE49-F238E27FC236}">
-                  <a16:creationId xmlns="" xmlns:a16="http://schemas.microsoft.com/office/drawing/2014/main" id="{751FE470-CF90-C340-B80C-758938E46A44}"/>
+                  <a16:creationId xmlns:a16="http://schemas.microsoft.com/office/drawing/2014/main" id="{751FE470-CF90-C340-B80C-758938E46A44}"/>
                 </a:ext>
               </a:extLst>
             </p:cNvPr>
@@ -8868,7 +8867,7 @@
             <p:cNvPr id="12" name="Straight Connector 11">
               <a:extLst>
                 <a:ext uri="{FF2B5EF4-FFF2-40B4-BE49-F238E27FC236}">
-                  <a16:creationId xmlns="" xmlns:a16="http://schemas.microsoft.com/office/drawing/2014/main" id="{34BE5600-1732-BF43-8B35-46C1653C2836}"/>
+                  <a16:creationId xmlns:a16="http://schemas.microsoft.com/office/drawing/2014/main" id="{34BE5600-1732-BF43-8B35-46C1653C2836}"/>
                 </a:ext>
               </a:extLst>
             </p:cNvPr>
@@ -8912,7 +8911,7 @@
             <p:cNvPr id="13" name="Straight Connector 12">
               <a:extLst>
                 <a:ext uri="{FF2B5EF4-FFF2-40B4-BE49-F238E27FC236}">
-                  <a16:creationId xmlns="" xmlns:a16="http://schemas.microsoft.com/office/drawing/2014/main" id="{E722A8A1-4DD9-6445-A3BD-3B1EBD0A9E7D}"/>
+                  <a16:creationId xmlns:a16="http://schemas.microsoft.com/office/drawing/2014/main" id="{E722A8A1-4DD9-6445-A3BD-3B1EBD0A9E7D}"/>
                 </a:ext>
               </a:extLst>
             </p:cNvPr>
@@ -8956,7 +8955,7 @@
             <p:cNvPr id="14" name="Straight Connector 13">
               <a:extLst>
                 <a:ext uri="{FF2B5EF4-FFF2-40B4-BE49-F238E27FC236}">
-                  <a16:creationId xmlns="" xmlns:a16="http://schemas.microsoft.com/office/drawing/2014/main" id="{DE7F96F3-534C-2146-91C5-BE4B60173515}"/>
+                  <a16:creationId xmlns:a16="http://schemas.microsoft.com/office/drawing/2014/main" id="{DE7F96F3-534C-2146-91C5-BE4B60173515}"/>
                 </a:ext>
               </a:extLst>
             </p:cNvPr>
@@ -9000,7 +8999,7 @@
             <p:cNvPr id="15" name="Straight Connector 14">
               <a:extLst>
                 <a:ext uri="{FF2B5EF4-FFF2-40B4-BE49-F238E27FC236}">
-                  <a16:creationId xmlns="" xmlns:a16="http://schemas.microsoft.com/office/drawing/2014/main" id="{E1879E24-CFD8-814F-9429-4339AC223CB7}"/>
+                  <a16:creationId xmlns:a16="http://schemas.microsoft.com/office/drawing/2014/main" id="{E1879E24-CFD8-814F-9429-4339AC223CB7}"/>
                 </a:ext>
               </a:extLst>
             </p:cNvPr>
@@ -9080,7 +9079,7 @@
           <p:cNvPr id="18" name="Rectangle 17">
             <a:extLst>
               <a:ext uri="{FF2B5EF4-FFF2-40B4-BE49-F238E27FC236}">
-                <a16:creationId xmlns="" xmlns:a16="http://schemas.microsoft.com/office/drawing/2014/main" id="{D44296FC-44E1-5E44-B8F1-ACF7669705BF}"/>
+                <a16:creationId xmlns:a16="http://schemas.microsoft.com/office/drawing/2014/main" id="{D44296FC-44E1-5E44-B8F1-ACF7669705BF}"/>
               </a:ext>
             </a:extLst>
           </p:cNvPr>
@@ -9169,7 +9168,7 @@
           <p:cNvPr id="19" name="Rounded Rectangle 18">
             <a:extLst>
               <a:ext uri="{FF2B5EF4-FFF2-40B4-BE49-F238E27FC236}">
-                <a16:creationId xmlns="" xmlns:a16="http://schemas.microsoft.com/office/drawing/2014/main" id="{67F55CC5-2673-4A46-8AA5-EF074A023FBE}"/>
+                <a16:creationId xmlns:a16="http://schemas.microsoft.com/office/drawing/2014/main" id="{67F55CC5-2673-4A46-8AA5-EF074A023FBE}"/>
               </a:ext>
             </a:extLst>
           </p:cNvPr>
@@ -9226,7 +9225,7 @@
           <p:cNvPr id="20" name="Curved Connector 59">
             <a:extLst>
               <a:ext uri="{FF2B5EF4-FFF2-40B4-BE49-F238E27FC236}">
-                <a16:creationId xmlns="" xmlns:a16="http://schemas.microsoft.com/office/drawing/2014/main" id="{0B6BBEF3-E586-5746-A3EE-56ECF7FFCA8F}"/>
+                <a16:creationId xmlns:a16="http://schemas.microsoft.com/office/drawing/2014/main" id="{0B6BBEF3-E586-5746-A3EE-56ECF7FFCA8F}"/>
               </a:ext>
             </a:extLst>
           </p:cNvPr>
@@ -9269,7 +9268,7 @@
           <p:cNvPr id="21" name="Can 20">
             <a:extLst>
               <a:ext uri="{FF2B5EF4-FFF2-40B4-BE49-F238E27FC236}">
-                <a16:creationId xmlns="" xmlns:a16="http://schemas.microsoft.com/office/drawing/2014/main" id="{D9F2DBDA-57C0-904A-B5A4-5D742186469D}"/>
+                <a16:creationId xmlns:a16="http://schemas.microsoft.com/office/drawing/2014/main" id="{D9F2DBDA-57C0-904A-B5A4-5D742186469D}"/>
               </a:ext>
             </a:extLst>
           </p:cNvPr>
@@ -9341,7 +9340,7 @@
           <p:cNvPr id="23" name="Rectangle 22">
             <a:extLst>
               <a:ext uri="{FF2B5EF4-FFF2-40B4-BE49-F238E27FC236}">
-                <a16:creationId xmlns="" xmlns:a16="http://schemas.microsoft.com/office/drawing/2014/main" id="{F96E4CEF-4C1B-B244-BE6A-0BB540570619}"/>
+                <a16:creationId xmlns:a16="http://schemas.microsoft.com/office/drawing/2014/main" id="{F96E4CEF-4C1B-B244-BE6A-0BB540570619}"/>
               </a:ext>
             </a:extLst>
           </p:cNvPr>
@@ -9410,7 +9409,7 @@
           <p:cNvPr id="24" name="Rounded Rectangle 23">
             <a:extLst>
               <a:ext uri="{FF2B5EF4-FFF2-40B4-BE49-F238E27FC236}">
-                <a16:creationId xmlns="" xmlns:a16="http://schemas.microsoft.com/office/drawing/2014/main" id="{7C598126-C6D0-9B4F-A3C9-B5DFDD798F12}"/>
+                <a16:creationId xmlns:a16="http://schemas.microsoft.com/office/drawing/2014/main" id="{7C598126-C6D0-9B4F-A3C9-B5DFDD798F12}"/>
               </a:ext>
             </a:extLst>
           </p:cNvPr>
@@ -9455,13 +9454,8 @@
             <a:pPr algn="ctr"/>
             <a:r>
               <a:rPr lang="en-US" sz="2400" dirty="0"/>
-              <a:t>Static </a:t>
-            </a:r>
-            <a:r>
-              <a:rPr lang="en-US" sz="2400" dirty="0" smtClean="0"/>
-              <a:t>Analyzer</a:t>
-            </a:r>
-            <a:endParaRPr lang="en-US" sz="2400" dirty="0"/>
+              <a:t>Static Analyzer</a:t>
+            </a:r>
           </a:p>
         </p:txBody>
       </p:sp>
@@ -9470,7 +9464,7 @@
           <p:cNvPr id="26" name="TextBox 25">
             <a:extLst>
               <a:ext uri="{FF2B5EF4-FFF2-40B4-BE49-F238E27FC236}">
-                <a16:creationId xmlns="" xmlns:a16="http://schemas.microsoft.com/office/drawing/2014/main" id="{8E115417-89E6-CF46-9DFE-0603E4CEA342}"/>
+                <a16:creationId xmlns:a16="http://schemas.microsoft.com/office/drawing/2014/main" id="{8E115417-89E6-CF46-9DFE-0603E4CEA342}"/>
               </a:ext>
             </a:extLst>
           </p:cNvPr>
@@ -9518,7 +9512,7 @@
           <p:cNvPr id="27" name="Group 26">
             <a:extLst>
               <a:ext uri="{FF2B5EF4-FFF2-40B4-BE49-F238E27FC236}">
-                <a16:creationId xmlns="" xmlns:a16="http://schemas.microsoft.com/office/drawing/2014/main" id="{D7F20AD9-7CA4-0041-955B-5E18FE4DAC77}"/>
+                <a16:creationId xmlns:a16="http://schemas.microsoft.com/office/drawing/2014/main" id="{D7F20AD9-7CA4-0041-955B-5E18FE4DAC77}"/>
               </a:ext>
             </a:extLst>
           </p:cNvPr>
@@ -9538,7 +9532,7 @@
             <p:cNvPr id="28" name="Snip Single Corner Rectangle 27">
               <a:extLst>
                 <a:ext uri="{FF2B5EF4-FFF2-40B4-BE49-F238E27FC236}">
-                  <a16:creationId xmlns="" xmlns:a16="http://schemas.microsoft.com/office/drawing/2014/main" id="{06FA0D0C-9EA4-F04D-A8A9-5995163A633F}"/>
+                  <a16:creationId xmlns:a16="http://schemas.microsoft.com/office/drawing/2014/main" id="{06FA0D0C-9EA4-F04D-A8A9-5995163A633F}"/>
                 </a:ext>
               </a:extLst>
             </p:cNvPr>
@@ -9590,7 +9584,7 @@
             <p:cNvPr id="29" name="Straight Connector 28">
               <a:extLst>
                 <a:ext uri="{FF2B5EF4-FFF2-40B4-BE49-F238E27FC236}">
-                  <a16:creationId xmlns="" xmlns:a16="http://schemas.microsoft.com/office/drawing/2014/main" id="{308B8246-BD2E-AE48-879F-EBC48ABC90EA}"/>
+                  <a16:creationId xmlns:a16="http://schemas.microsoft.com/office/drawing/2014/main" id="{308B8246-BD2E-AE48-879F-EBC48ABC90EA}"/>
                 </a:ext>
               </a:extLst>
             </p:cNvPr>
@@ -9634,7 +9628,7 @@
             <p:cNvPr id="30" name="Straight Connector 29">
               <a:extLst>
                 <a:ext uri="{FF2B5EF4-FFF2-40B4-BE49-F238E27FC236}">
-                  <a16:creationId xmlns="" xmlns:a16="http://schemas.microsoft.com/office/drawing/2014/main" id="{78CCB9DB-2613-214E-9817-C9A41BE4C724}"/>
+                  <a16:creationId xmlns:a16="http://schemas.microsoft.com/office/drawing/2014/main" id="{78CCB9DB-2613-214E-9817-C9A41BE4C724}"/>
                 </a:ext>
               </a:extLst>
             </p:cNvPr>
@@ -9678,7 +9672,7 @@
             <p:cNvPr id="31" name="Straight Connector 30">
               <a:extLst>
                 <a:ext uri="{FF2B5EF4-FFF2-40B4-BE49-F238E27FC236}">
-                  <a16:creationId xmlns="" xmlns:a16="http://schemas.microsoft.com/office/drawing/2014/main" id="{6B70F2B2-5A83-1F4B-B4D5-AD5064B29D6D}"/>
+                  <a16:creationId xmlns:a16="http://schemas.microsoft.com/office/drawing/2014/main" id="{6B70F2B2-5A83-1F4B-B4D5-AD5064B29D6D}"/>
                 </a:ext>
               </a:extLst>
             </p:cNvPr>
@@ -9722,7 +9716,7 @@
             <p:cNvPr id="32" name="Straight Connector 31">
               <a:extLst>
                 <a:ext uri="{FF2B5EF4-FFF2-40B4-BE49-F238E27FC236}">
-                  <a16:creationId xmlns="" xmlns:a16="http://schemas.microsoft.com/office/drawing/2014/main" id="{77E995BE-6ACF-9B43-8A72-2F40C0D6AE54}"/>
+                  <a16:creationId xmlns:a16="http://schemas.microsoft.com/office/drawing/2014/main" id="{77E995BE-6ACF-9B43-8A72-2F40C0D6AE54}"/>
                 </a:ext>
               </a:extLst>
             </p:cNvPr>
@@ -9767,7 +9761,7 @@
           <p:cNvPr id="33" name="Curved Connector 59">
             <a:extLst>
               <a:ext uri="{FF2B5EF4-FFF2-40B4-BE49-F238E27FC236}">
-                <a16:creationId xmlns="" xmlns:a16="http://schemas.microsoft.com/office/drawing/2014/main" id="{56D9BF13-AB6C-E845-8961-B80393CBAF45}"/>
+                <a16:creationId xmlns:a16="http://schemas.microsoft.com/office/drawing/2014/main" id="{56D9BF13-AB6C-E845-8961-B80393CBAF45}"/>
               </a:ext>
             </a:extLst>
           </p:cNvPr>
@@ -9808,7 +9802,7 @@
           <p:cNvPr id="36" name="Rectangle 35">
             <a:extLst>
               <a:ext uri="{FF2B5EF4-FFF2-40B4-BE49-F238E27FC236}">
-                <a16:creationId xmlns="" xmlns:a16="http://schemas.microsoft.com/office/drawing/2014/main" id="{24B2218B-44C2-2E49-A2B2-C8C5EFA69EAE}"/>
+                <a16:creationId xmlns:a16="http://schemas.microsoft.com/office/drawing/2014/main" id="{24B2218B-44C2-2E49-A2B2-C8C5EFA69EAE}"/>
               </a:ext>
             </a:extLst>
           </p:cNvPr>
@@ -9870,7 +9864,7 @@
           <p:cNvPr id="37" name="Rounded Rectangle 36">
             <a:extLst>
               <a:ext uri="{FF2B5EF4-FFF2-40B4-BE49-F238E27FC236}">
-                <a16:creationId xmlns="" xmlns:a16="http://schemas.microsoft.com/office/drawing/2014/main" id="{39322434-EC85-F440-A08A-BB8939C64696}"/>
+                <a16:creationId xmlns:a16="http://schemas.microsoft.com/office/drawing/2014/main" id="{39322434-EC85-F440-A08A-BB8939C64696}"/>
               </a:ext>
             </a:extLst>
           </p:cNvPr>
@@ -9925,7 +9919,7 @@
           <p:cNvPr id="38" name="Rounded Rectangle 37">
             <a:extLst>
               <a:ext uri="{FF2B5EF4-FFF2-40B4-BE49-F238E27FC236}">
-                <a16:creationId xmlns="" xmlns:a16="http://schemas.microsoft.com/office/drawing/2014/main" id="{DB32C2BA-0B7D-F040-AB58-94D2D873B677}"/>
+                <a16:creationId xmlns:a16="http://schemas.microsoft.com/office/drawing/2014/main" id="{DB32C2BA-0B7D-F040-AB58-94D2D873B677}"/>
               </a:ext>
             </a:extLst>
           </p:cNvPr>
@@ -9969,12 +9963,8 @@
           <a:p>
             <a:pPr algn="ctr"/>
             <a:r>
-              <a:rPr lang="en-US" sz="2400" dirty="0" smtClean="0"/>
-              <a:t>Permission Mismatch </a:t>
-            </a:r>
-            <a:r>
               <a:rPr lang="en-US" sz="2400" dirty="0"/>
-              <a:t>Detector</a:t>
+              <a:t>Permission Mismatch Detector</a:t>
             </a:r>
           </a:p>
         </p:txBody>
@@ -10093,13 +10083,8 @@
             <a:pPr algn="ctr"/>
             <a:r>
               <a:rPr lang="en-US" sz="2400" dirty="0"/>
-              <a:t>Android </a:t>
-            </a:r>
-            <a:r>
-              <a:rPr lang="en-US" sz="2400" dirty="0" smtClean="0"/>
-              <a:t>Frameworks</a:t>
-            </a:r>
-            <a:endParaRPr lang="en-US" sz="2400" dirty="0"/>
+              <a:t>Android Frameworks</a:t>
+            </a:r>
           </a:p>
         </p:txBody>
       </p:sp>
@@ -10126,10 +10111,9 @@
           <a:p>
             <a:pPr algn="ctr"/>
             <a:r>
-              <a:rPr lang="en-US" sz="2400" dirty="0" smtClean="0"/>
+              <a:rPr lang="en-US" sz="2400" dirty="0"/>
               <a:t>Application</a:t>
             </a:r>
-            <a:endParaRPr lang="en-US" sz="2400" dirty="0"/>
           </a:p>
         </p:txBody>
       </p:sp>
@@ -10138,7 +10122,7 @@
           <p:cNvPr id="43" name="Curved Connector 42">
             <a:extLst>
               <a:ext uri="{FF2B5EF4-FFF2-40B4-BE49-F238E27FC236}">
-                <a16:creationId xmlns="" xmlns:a16="http://schemas.microsoft.com/office/drawing/2014/main" id="{950E21EB-BC86-F644-8B06-3360B209EA13}"/>
+                <a16:creationId xmlns:a16="http://schemas.microsoft.com/office/drawing/2014/main" id="{950E21EB-BC86-F644-8B06-3360B209EA13}"/>
               </a:ext>
             </a:extLst>
           </p:cNvPr>
@@ -10183,7 +10167,7 @@
           <p:cNvPr id="44" name="Curved Connector 43">
             <a:extLst>
               <a:ext uri="{FF2B5EF4-FFF2-40B4-BE49-F238E27FC236}">
-                <a16:creationId xmlns="" xmlns:a16="http://schemas.microsoft.com/office/drawing/2014/main" id="{ACB9E620-19E0-5D4F-9ECE-3A536286F796}"/>
+                <a16:creationId xmlns:a16="http://schemas.microsoft.com/office/drawing/2014/main" id="{ACB9E620-19E0-5D4F-9ECE-3A536286F796}"/>
               </a:ext>
             </a:extLst>
           </p:cNvPr>
@@ -10228,7 +10212,7 @@
           <p:cNvPr id="45" name="Curved Connector 44">
             <a:extLst>
               <a:ext uri="{FF2B5EF4-FFF2-40B4-BE49-F238E27FC236}">
-                <a16:creationId xmlns="" xmlns:a16="http://schemas.microsoft.com/office/drawing/2014/main" id="{387DC31D-2539-3449-92C1-4A4272DEB432}"/>
+                <a16:creationId xmlns:a16="http://schemas.microsoft.com/office/drawing/2014/main" id="{387DC31D-2539-3449-92C1-4A4272DEB432}"/>
               </a:ext>
             </a:extLst>
           </p:cNvPr>
@@ -10273,7 +10257,7 @@
           <p:cNvPr id="52" name="Curved Connector 59">
             <a:extLst>
               <a:ext uri="{FF2B5EF4-FFF2-40B4-BE49-F238E27FC236}">
-                <a16:creationId xmlns="" xmlns:a16="http://schemas.microsoft.com/office/drawing/2014/main" id="{56361E46-CFB5-9248-8E67-947FF6B18BA0}"/>
+                <a16:creationId xmlns:a16="http://schemas.microsoft.com/office/drawing/2014/main" id="{56361E46-CFB5-9248-8E67-947FF6B18BA0}"/>
               </a:ext>
             </a:extLst>
           </p:cNvPr>
@@ -10314,7 +10298,7 @@
           <p:cNvPr id="53" name="Curved Connector 52">
             <a:extLst>
               <a:ext uri="{FF2B5EF4-FFF2-40B4-BE49-F238E27FC236}">
-                <a16:creationId xmlns="" xmlns:a16="http://schemas.microsoft.com/office/drawing/2014/main" id="{A5F259BC-8033-1647-A622-CBA797C2683C}"/>
+                <a16:creationId xmlns:a16="http://schemas.microsoft.com/office/drawing/2014/main" id="{A5F259BC-8033-1647-A622-CBA797C2683C}"/>
               </a:ext>
             </a:extLst>
           </p:cNvPr>
@@ -10359,7 +10343,7 @@
           <p:cNvPr id="59" name="Curved Connector 73">
             <a:extLst>
               <a:ext uri="{FF2B5EF4-FFF2-40B4-BE49-F238E27FC236}">
-                <a16:creationId xmlns="" xmlns:a16="http://schemas.microsoft.com/office/drawing/2014/main" id="{3D1CA2FA-15DF-AF44-945E-700F8DABE0F0}"/>
+                <a16:creationId xmlns:a16="http://schemas.microsoft.com/office/drawing/2014/main" id="{3D1CA2FA-15DF-AF44-945E-700F8DABE0F0}"/>
               </a:ext>
             </a:extLst>
           </p:cNvPr>
@@ -10402,7 +10386,7 @@
           <p:cNvPr id="66" name="Curved Connector 65">
             <a:extLst>
               <a:ext uri="{FF2B5EF4-FFF2-40B4-BE49-F238E27FC236}">
-                <a16:creationId xmlns="" xmlns:a16="http://schemas.microsoft.com/office/drawing/2014/main" id="{A5F259BC-8033-1647-A622-CBA797C2683C}"/>
+                <a16:creationId xmlns:a16="http://schemas.microsoft.com/office/drawing/2014/main" id="{A5F259BC-8033-1647-A622-CBA797C2683C}"/>
               </a:ext>
             </a:extLst>
           </p:cNvPr>
@@ -10465,17 +10449,16 @@
           <a:p>
             <a:pPr algn="ctr"/>
             <a:r>
-              <a:rPr lang="en-US" sz="2400" dirty="0" smtClean="0"/>
+              <a:rPr lang="en-US" sz="2400" dirty="0"/>
               <a:t>Mismatch</a:t>
             </a:r>
           </a:p>
           <a:p>
             <a:pPr algn="ctr"/>
             <a:r>
-              <a:rPr lang="en-US" sz="2400" dirty="0" smtClean="0"/>
+              <a:rPr lang="en-US" sz="2400" dirty="0"/>
               <a:t>Issues</a:t>
             </a:r>
-            <a:endParaRPr lang="en-US" sz="2400" dirty="0"/>
           </a:p>
         </p:txBody>
       </p:sp>
@@ -10484,7 +10467,7 @@
           <p:cNvPr id="70" name="Curved Connector 59">
             <a:extLst>
               <a:ext uri="{FF2B5EF4-FFF2-40B4-BE49-F238E27FC236}">
-                <a16:creationId xmlns="" xmlns:a16="http://schemas.microsoft.com/office/drawing/2014/main" id="{56361E46-CFB5-9248-8E67-947FF6B18BA0}"/>
+                <a16:creationId xmlns:a16="http://schemas.microsoft.com/office/drawing/2014/main" id="{56361E46-CFB5-9248-8E67-947FF6B18BA0}"/>
               </a:ext>
             </a:extLst>
           </p:cNvPr>
@@ -10557,7 +10540,7 @@
           <p:cNvPr id="18" name="Rectangle 17">
             <a:extLst>
               <a:ext uri="{FF2B5EF4-FFF2-40B4-BE49-F238E27FC236}">
-                <a16:creationId xmlns="" xmlns:a16="http://schemas.microsoft.com/office/drawing/2014/main" id="{D44296FC-44E1-5E44-B8F1-ACF7669705BF}"/>
+                <a16:creationId xmlns:a16="http://schemas.microsoft.com/office/drawing/2014/main" id="{D44296FC-44E1-5E44-B8F1-ACF7669705BF}"/>
               </a:ext>
             </a:extLst>
           </p:cNvPr>
@@ -10609,7 +10592,7 @@
           <a:p>
             <a:pPr algn="ctr"/>
             <a:r>
-              <a:rPr lang="en-US" sz="2400" dirty="0" smtClean="0">
+              <a:rPr lang="en-US" sz="2400" dirty="0">
                 <a:solidFill>
                   <a:schemeClr val="accent1">
                     <a:lumMod val="50000"/>
@@ -10618,13 +10601,6 @@
               </a:rPr>
               <a:t>API &amp; Permission Modeler</a:t>
             </a:r>
-            <a:endParaRPr lang="en-US" sz="2400" dirty="0">
-              <a:solidFill>
-                <a:schemeClr val="accent1">
-                  <a:lumMod val="50000"/>
-                </a:schemeClr>
-              </a:solidFill>
-            </a:endParaRPr>
           </a:p>
         </p:txBody>
       </p:sp>
@@ -10633,7 +10609,7 @@
           <p:cNvPr id="5" name="Rounded Rectangle 4">
             <a:extLst>
               <a:ext uri="{FF2B5EF4-FFF2-40B4-BE49-F238E27FC236}">
-                <a16:creationId xmlns="" xmlns:a16="http://schemas.microsoft.com/office/drawing/2014/main" id="{351CB379-D8CA-574B-9035-4F9773A33529}"/>
+                <a16:creationId xmlns:a16="http://schemas.microsoft.com/office/drawing/2014/main" id="{351CB379-D8CA-574B-9035-4F9773A33529}"/>
               </a:ext>
             </a:extLst>
           </p:cNvPr>
@@ -10679,10 +10655,9 @@
           <a:p>
             <a:pPr algn="ctr"/>
             <a:r>
-              <a:rPr lang="en-US" sz="2400" dirty="0" smtClean="0"/>
+              <a:rPr lang="en-US" sz="2400" dirty="0"/>
               <a:t>Mapper</a:t>
             </a:r>
-            <a:endParaRPr lang="en-US" sz="2400" dirty="0"/>
           </a:p>
         </p:txBody>
       </p:sp>
@@ -10691,7 +10666,7 @@
           <p:cNvPr id="7" name="Curved Connector 59">
             <a:extLst>
               <a:ext uri="{FF2B5EF4-FFF2-40B4-BE49-F238E27FC236}">
-                <a16:creationId xmlns="" xmlns:a16="http://schemas.microsoft.com/office/drawing/2014/main" id="{99360F58-4658-B048-A0CF-62812767E25F}"/>
+                <a16:creationId xmlns:a16="http://schemas.microsoft.com/office/drawing/2014/main" id="{99360F58-4658-B048-A0CF-62812767E25F}"/>
               </a:ext>
             </a:extLst>
           </p:cNvPr>
@@ -10732,7 +10707,7 @@
           <p:cNvPr id="9" name="TextBox 8">
             <a:extLst>
               <a:ext uri="{FF2B5EF4-FFF2-40B4-BE49-F238E27FC236}">
-                <a16:creationId xmlns="" xmlns:a16="http://schemas.microsoft.com/office/drawing/2014/main" id="{C7B0DA6A-76CB-DB4F-8044-E1EFBB470C68}"/>
+                <a16:creationId xmlns:a16="http://schemas.microsoft.com/office/drawing/2014/main" id="{C7B0DA6A-76CB-DB4F-8044-E1EFBB470C68}"/>
               </a:ext>
             </a:extLst>
           </p:cNvPr>
@@ -10768,7 +10743,7 @@
           <p:cNvPr id="10" name="Group 9">
             <a:extLst>
               <a:ext uri="{FF2B5EF4-FFF2-40B4-BE49-F238E27FC236}">
-                <a16:creationId xmlns="" xmlns:a16="http://schemas.microsoft.com/office/drawing/2014/main" id="{2204B3AF-644C-2644-A3A0-1903EEA77DD9}"/>
+                <a16:creationId xmlns:a16="http://schemas.microsoft.com/office/drawing/2014/main" id="{2204B3AF-644C-2644-A3A0-1903EEA77DD9}"/>
               </a:ext>
             </a:extLst>
           </p:cNvPr>
@@ -10788,7 +10763,7 @@
             <p:cNvPr id="11" name="Snip Single Corner Rectangle 10">
               <a:extLst>
                 <a:ext uri="{FF2B5EF4-FFF2-40B4-BE49-F238E27FC236}">
-                  <a16:creationId xmlns="" xmlns:a16="http://schemas.microsoft.com/office/drawing/2014/main" id="{751FE470-CF90-C340-B80C-758938E46A44}"/>
+                  <a16:creationId xmlns:a16="http://schemas.microsoft.com/office/drawing/2014/main" id="{751FE470-CF90-C340-B80C-758938E46A44}"/>
                 </a:ext>
               </a:extLst>
             </p:cNvPr>
@@ -10840,7 +10815,7 @@
             <p:cNvPr id="12" name="Straight Connector 11">
               <a:extLst>
                 <a:ext uri="{FF2B5EF4-FFF2-40B4-BE49-F238E27FC236}">
-                  <a16:creationId xmlns="" xmlns:a16="http://schemas.microsoft.com/office/drawing/2014/main" id="{34BE5600-1732-BF43-8B35-46C1653C2836}"/>
+                  <a16:creationId xmlns:a16="http://schemas.microsoft.com/office/drawing/2014/main" id="{34BE5600-1732-BF43-8B35-46C1653C2836}"/>
                 </a:ext>
               </a:extLst>
             </p:cNvPr>
@@ -10884,7 +10859,7 @@
             <p:cNvPr id="13" name="Straight Connector 12">
               <a:extLst>
                 <a:ext uri="{FF2B5EF4-FFF2-40B4-BE49-F238E27FC236}">
-                  <a16:creationId xmlns="" xmlns:a16="http://schemas.microsoft.com/office/drawing/2014/main" id="{E722A8A1-4DD9-6445-A3BD-3B1EBD0A9E7D}"/>
+                  <a16:creationId xmlns:a16="http://schemas.microsoft.com/office/drawing/2014/main" id="{E722A8A1-4DD9-6445-A3BD-3B1EBD0A9E7D}"/>
                 </a:ext>
               </a:extLst>
             </p:cNvPr>
@@ -10928,7 +10903,7 @@
             <p:cNvPr id="14" name="Straight Connector 13">
               <a:extLst>
                 <a:ext uri="{FF2B5EF4-FFF2-40B4-BE49-F238E27FC236}">
-                  <a16:creationId xmlns="" xmlns:a16="http://schemas.microsoft.com/office/drawing/2014/main" id="{DE7F96F3-534C-2146-91C5-BE4B60173515}"/>
+                  <a16:creationId xmlns:a16="http://schemas.microsoft.com/office/drawing/2014/main" id="{DE7F96F3-534C-2146-91C5-BE4B60173515}"/>
                 </a:ext>
               </a:extLst>
             </p:cNvPr>
@@ -10972,7 +10947,7 @@
             <p:cNvPr id="15" name="Straight Connector 14">
               <a:extLst>
                 <a:ext uri="{FF2B5EF4-FFF2-40B4-BE49-F238E27FC236}">
-                  <a16:creationId xmlns="" xmlns:a16="http://schemas.microsoft.com/office/drawing/2014/main" id="{E1879E24-CFD8-814F-9429-4339AC223CB7}"/>
+                  <a16:creationId xmlns:a16="http://schemas.microsoft.com/office/drawing/2014/main" id="{E1879E24-CFD8-814F-9429-4339AC223CB7}"/>
                 </a:ext>
               </a:extLst>
             </p:cNvPr>
@@ -11017,7 +10992,7 @@
           <p:cNvPr id="19" name="Rounded Rectangle 18">
             <a:extLst>
               <a:ext uri="{FF2B5EF4-FFF2-40B4-BE49-F238E27FC236}">
-                <a16:creationId xmlns="" xmlns:a16="http://schemas.microsoft.com/office/drawing/2014/main" id="{67F55CC5-2673-4A46-8AA5-EF074A023FBE}"/>
+                <a16:creationId xmlns:a16="http://schemas.microsoft.com/office/drawing/2014/main" id="{67F55CC5-2673-4A46-8AA5-EF074A023FBE}"/>
               </a:ext>
             </a:extLst>
           </p:cNvPr>
@@ -11074,7 +11049,7 @@
           <p:cNvPr id="20" name="Curved Connector 59">
             <a:extLst>
               <a:ext uri="{FF2B5EF4-FFF2-40B4-BE49-F238E27FC236}">
-                <a16:creationId xmlns="" xmlns:a16="http://schemas.microsoft.com/office/drawing/2014/main" id="{0B6BBEF3-E586-5746-A3EE-56ECF7FFCA8F}"/>
+                <a16:creationId xmlns:a16="http://schemas.microsoft.com/office/drawing/2014/main" id="{0B6BBEF3-E586-5746-A3EE-56ECF7FFCA8F}"/>
               </a:ext>
             </a:extLst>
           </p:cNvPr>
@@ -11117,7 +11092,7 @@
           <p:cNvPr id="21" name="Can 20">
             <a:extLst>
               <a:ext uri="{FF2B5EF4-FFF2-40B4-BE49-F238E27FC236}">
-                <a16:creationId xmlns="" xmlns:a16="http://schemas.microsoft.com/office/drawing/2014/main" id="{D9F2DBDA-57C0-904A-B5A4-5D742186469D}"/>
+                <a16:creationId xmlns:a16="http://schemas.microsoft.com/office/drawing/2014/main" id="{D9F2DBDA-57C0-904A-B5A4-5D742186469D}"/>
               </a:ext>
             </a:extLst>
           </p:cNvPr>
@@ -11189,7 +11164,7 @@
           <p:cNvPr id="23" name="Rectangle 22">
             <a:extLst>
               <a:ext uri="{FF2B5EF4-FFF2-40B4-BE49-F238E27FC236}">
-                <a16:creationId xmlns="" xmlns:a16="http://schemas.microsoft.com/office/drawing/2014/main" id="{F96E4CEF-4C1B-B244-BE6A-0BB540570619}"/>
+                <a16:creationId xmlns:a16="http://schemas.microsoft.com/office/drawing/2014/main" id="{F96E4CEF-4C1B-B244-BE6A-0BB540570619}"/>
               </a:ext>
             </a:extLst>
           </p:cNvPr>
@@ -11248,25 +11223,8 @@
                   </a:schemeClr>
                 </a:solidFill>
               </a:rPr>
-              <a:t>API Usage </a:t>
-            </a:r>
-            <a:r>
-              <a:rPr lang="en-US" sz="2400" dirty="0" smtClean="0">
-                <a:solidFill>
-                  <a:schemeClr val="accent2">
-                    <a:lumMod val="50000"/>
-                  </a:schemeClr>
-                </a:solidFill>
-              </a:rPr>
-              <a:t>Extractor</a:t>
-            </a:r>
-            <a:endParaRPr lang="en-US" sz="2400" dirty="0">
-              <a:solidFill>
-                <a:schemeClr val="accent2">
-                  <a:lumMod val="50000"/>
-                </a:schemeClr>
-              </a:solidFill>
-            </a:endParaRPr>
+              <a:t>API Usage Extractor</a:t>
+            </a:r>
           </a:p>
         </p:txBody>
       </p:sp>
@@ -11275,7 +11233,7 @@
           <p:cNvPr id="24" name="Rounded Rectangle 23">
             <a:extLst>
               <a:ext uri="{FF2B5EF4-FFF2-40B4-BE49-F238E27FC236}">
-                <a16:creationId xmlns="" xmlns:a16="http://schemas.microsoft.com/office/drawing/2014/main" id="{7C598126-C6D0-9B4F-A3C9-B5DFDD798F12}"/>
+                <a16:creationId xmlns:a16="http://schemas.microsoft.com/office/drawing/2014/main" id="{7C598126-C6D0-9B4F-A3C9-B5DFDD798F12}"/>
               </a:ext>
             </a:extLst>
           </p:cNvPr>
@@ -11320,13 +11278,8 @@
             <a:pPr algn="ctr"/>
             <a:r>
               <a:rPr lang="en-US" sz="2400" dirty="0"/>
-              <a:t>Static </a:t>
-            </a:r>
-            <a:r>
-              <a:rPr lang="en-US" sz="2400" dirty="0" smtClean="0"/>
-              <a:t>Analyzer</a:t>
-            </a:r>
-            <a:endParaRPr lang="en-US" sz="2400" dirty="0"/>
+              <a:t>Static Analyzer</a:t>
+            </a:r>
           </a:p>
         </p:txBody>
       </p:sp>
@@ -11335,7 +11288,7 @@
           <p:cNvPr id="26" name="TextBox 25">
             <a:extLst>
               <a:ext uri="{FF2B5EF4-FFF2-40B4-BE49-F238E27FC236}">
-                <a16:creationId xmlns="" xmlns:a16="http://schemas.microsoft.com/office/drawing/2014/main" id="{8E115417-89E6-CF46-9DFE-0603E4CEA342}"/>
+                <a16:creationId xmlns:a16="http://schemas.microsoft.com/office/drawing/2014/main" id="{8E115417-89E6-CF46-9DFE-0603E4CEA342}"/>
               </a:ext>
             </a:extLst>
           </p:cNvPr>
@@ -11383,7 +11336,7 @@
           <p:cNvPr id="27" name="Group 26">
             <a:extLst>
               <a:ext uri="{FF2B5EF4-FFF2-40B4-BE49-F238E27FC236}">
-                <a16:creationId xmlns="" xmlns:a16="http://schemas.microsoft.com/office/drawing/2014/main" id="{D7F20AD9-7CA4-0041-955B-5E18FE4DAC77}"/>
+                <a16:creationId xmlns:a16="http://schemas.microsoft.com/office/drawing/2014/main" id="{D7F20AD9-7CA4-0041-955B-5E18FE4DAC77}"/>
               </a:ext>
             </a:extLst>
           </p:cNvPr>
@@ -11403,7 +11356,7 @@
             <p:cNvPr id="28" name="Snip Single Corner Rectangle 27">
               <a:extLst>
                 <a:ext uri="{FF2B5EF4-FFF2-40B4-BE49-F238E27FC236}">
-                  <a16:creationId xmlns="" xmlns:a16="http://schemas.microsoft.com/office/drawing/2014/main" id="{06FA0D0C-9EA4-F04D-A8A9-5995163A633F}"/>
+                  <a16:creationId xmlns:a16="http://schemas.microsoft.com/office/drawing/2014/main" id="{06FA0D0C-9EA4-F04D-A8A9-5995163A633F}"/>
                 </a:ext>
               </a:extLst>
             </p:cNvPr>
@@ -11455,7 +11408,7 @@
             <p:cNvPr id="29" name="Straight Connector 28">
               <a:extLst>
                 <a:ext uri="{FF2B5EF4-FFF2-40B4-BE49-F238E27FC236}">
-                  <a16:creationId xmlns="" xmlns:a16="http://schemas.microsoft.com/office/drawing/2014/main" id="{308B8246-BD2E-AE48-879F-EBC48ABC90EA}"/>
+                  <a16:creationId xmlns:a16="http://schemas.microsoft.com/office/drawing/2014/main" id="{308B8246-BD2E-AE48-879F-EBC48ABC90EA}"/>
                 </a:ext>
               </a:extLst>
             </p:cNvPr>
@@ -11499,7 +11452,7 @@
             <p:cNvPr id="30" name="Straight Connector 29">
               <a:extLst>
                 <a:ext uri="{FF2B5EF4-FFF2-40B4-BE49-F238E27FC236}">
-                  <a16:creationId xmlns="" xmlns:a16="http://schemas.microsoft.com/office/drawing/2014/main" id="{78CCB9DB-2613-214E-9817-C9A41BE4C724}"/>
+                  <a16:creationId xmlns:a16="http://schemas.microsoft.com/office/drawing/2014/main" id="{78CCB9DB-2613-214E-9817-C9A41BE4C724}"/>
                 </a:ext>
               </a:extLst>
             </p:cNvPr>
@@ -11543,7 +11496,7 @@
             <p:cNvPr id="31" name="Straight Connector 30">
               <a:extLst>
                 <a:ext uri="{FF2B5EF4-FFF2-40B4-BE49-F238E27FC236}">
-                  <a16:creationId xmlns="" xmlns:a16="http://schemas.microsoft.com/office/drawing/2014/main" id="{6B70F2B2-5A83-1F4B-B4D5-AD5064B29D6D}"/>
+                  <a16:creationId xmlns:a16="http://schemas.microsoft.com/office/drawing/2014/main" id="{6B70F2B2-5A83-1F4B-B4D5-AD5064B29D6D}"/>
                 </a:ext>
               </a:extLst>
             </p:cNvPr>
@@ -11587,7 +11540,7 @@
             <p:cNvPr id="32" name="Straight Connector 31">
               <a:extLst>
                 <a:ext uri="{FF2B5EF4-FFF2-40B4-BE49-F238E27FC236}">
-                  <a16:creationId xmlns="" xmlns:a16="http://schemas.microsoft.com/office/drawing/2014/main" id="{77E995BE-6ACF-9B43-8A72-2F40C0D6AE54}"/>
+                  <a16:creationId xmlns:a16="http://schemas.microsoft.com/office/drawing/2014/main" id="{77E995BE-6ACF-9B43-8A72-2F40C0D6AE54}"/>
                 </a:ext>
               </a:extLst>
             </p:cNvPr>
@@ -11632,7 +11585,7 @@
           <p:cNvPr id="33" name="Curved Connector 59">
             <a:extLst>
               <a:ext uri="{FF2B5EF4-FFF2-40B4-BE49-F238E27FC236}">
-                <a16:creationId xmlns="" xmlns:a16="http://schemas.microsoft.com/office/drawing/2014/main" id="{56D9BF13-AB6C-E845-8961-B80393CBAF45}"/>
+                <a16:creationId xmlns:a16="http://schemas.microsoft.com/office/drawing/2014/main" id="{56D9BF13-AB6C-E845-8961-B80393CBAF45}"/>
               </a:ext>
             </a:extLst>
           </p:cNvPr>
@@ -11673,7 +11626,7 @@
           <p:cNvPr id="36" name="Rectangle 35">
             <a:extLst>
               <a:ext uri="{FF2B5EF4-FFF2-40B4-BE49-F238E27FC236}">
-                <a16:creationId xmlns="" xmlns:a16="http://schemas.microsoft.com/office/drawing/2014/main" id="{24B2218B-44C2-2E49-A2B2-C8C5EFA69EAE}"/>
+                <a16:creationId xmlns:a16="http://schemas.microsoft.com/office/drawing/2014/main" id="{24B2218B-44C2-2E49-A2B2-C8C5EFA69EAE}"/>
               </a:ext>
             </a:extLst>
           </p:cNvPr>
@@ -11739,7 +11692,7 @@
           <p:cNvPr id="37" name="Rounded Rectangle 36">
             <a:extLst>
               <a:ext uri="{FF2B5EF4-FFF2-40B4-BE49-F238E27FC236}">
-                <a16:creationId xmlns="" xmlns:a16="http://schemas.microsoft.com/office/drawing/2014/main" id="{39322434-EC85-F440-A08A-BB8939C64696}"/>
+                <a16:creationId xmlns:a16="http://schemas.microsoft.com/office/drawing/2014/main" id="{39322434-EC85-F440-A08A-BB8939C64696}"/>
               </a:ext>
             </a:extLst>
           </p:cNvPr>
@@ -11796,7 +11749,7 @@
           <p:cNvPr id="38" name="Rounded Rectangle 37">
             <a:extLst>
               <a:ext uri="{FF2B5EF4-FFF2-40B4-BE49-F238E27FC236}">
-                <a16:creationId xmlns="" xmlns:a16="http://schemas.microsoft.com/office/drawing/2014/main" id="{DB32C2BA-0B7D-F040-AB58-94D2D873B677}"/>
+                <a16:creationId xmlns:a16="http://schemas.microsoft.com/office/drawing/2014/main" id="{DB32C2BA-0B7D-F040-AB58-94D2D873B677}"/>
               </a:ext>
             </a:extLst>
           </p:cNvPr>
@@ -11842,12 +11795,8 @@
           <a:p>
             <a:pPr algn="ctr"/>
             <a:r>
-              <a:rPr lang="en-US" sz="2400" dirty="0" smtClean="0"/>
-              <a:t>Permission Mismatch </a:t>
-            </a:r>
-            <a:r>
               <a:rPr lang="en-US" sz="2400" dirty="0"/>
-              <a:t>Detector</a:t>
+              <a:t>Permission Mismatch Detector</a:t>
             </a:r>
           </a:p>
         </p:txBody>
@@ -11966,13 +11915,8 @@
             <a:pPr algn="ctr"/>
             <a:r>
               <a:rPr lang="en-US" sz="2400" dirty="0"/>
-              <a:t>Android </a:t>
-            </a:r>
-            <a:r>
-              <a:rPr lang="en-US" sz="2400" dirty="0" smtClean="0"/>
-              <a:t>Frameworks</a:t>
-            </a:r>
-            <a:endParaRPr lang="en-US" sz="2400" dirty="0"/>
+              <a:t>Android Frameworks</a:t>
+            </a:r>
           </a:p>
         </p:txBody>
       </p:sp>
@@ -11999,10 +11943,9 @@
           <a:p>
             <a:pPr algn="ctr"/>
             <a:r>
-              <a:rPr lang="en-US" sz="2400" dirty="0" smtClean="0"/>
+              <a:rPr lang="en-US" sz="2400" dirty="0"/>
               <a:t>Application</a:t>
             </a:r>
-            <a:endParaRPr lang="en-US" sz="2400" dirty="0"/>
           </a:p>
         </p:txBody>
       </p:sp>
@@ -12011,7 +11954,7 @@
           <p:cNvPr id="43" name="Curved Connector 42">
             <a:extLst>
               <a:ext uri="{FF2B5EF4-FFF2-40B4-BE49-F238E27FC236}">
-                <a16:creationId xmlns="" xmlns:a16="http://schemas.microsoft.com/office/drawing/2014/main" id="{950E21EB-BC86-F644-8B06-3360B209EA13}"/>
+                <a16:creationId xmlns:a16="http://schemas.microsoft.com/office/drawing/2014/main" id="{950E21EB-BC86-F644-8B06-3360B209EA13}"/>
               </a:ext>
             </a:extLst>
           </p:cNvPr>
@@ -12056,7 +11999,7 @@
           <p:cNvPr id="44" name="Curved Connector 43">
             <a:extLst>
               <a:ext uri="{FF2B5EF4-FFF2-40B4-BE49-F238E27FC236}">
-                <a16:creationId xmlns="" xmlns:a16="http://schemas.microsoft.com/office/drawing/2014/main" id="{ACB9E620-19E0-5D4F-9ECE-3A536286F796}"/>
+                <a16:creationId xmlns:a16="http://schemas.microsoft.com/office/drawing/2014/main" id="{ACB9E620-19E0-5D4F-9ECE-3A536286F796}"/>
               </a:ext>
             </a:extLst>
           </p:cNvPr>
@@ -12101,7 +12044,7 @@
           <p:cNvPr id="45" name="Curved Connector 44">
             <a:extLst>
               <a:ext uri="{FF2B5EF4-FFF2-40B4-BE49-F238E27FC236}">
-                <a16:creationId xmlns="" xmlns:a16="http://schemas.microsoft.com/office/drawing/2014/main" id="{387DC31D-2539-3449-92C1-4A4272DEB432}"/>
+                <a16:creationId xmlns:a16="http://schemas.microsoft.com/office/drawing/2014/main" id="{387DC31D-2539-3449-92C1-4A4272DEB432}"/>
               </a:ext>
             </a:extLst>
           </p:cNvPr>
@@ -12146,7 +12089,7 @@
           <p:cNvPr id="52" name="Curved Connector 59">
             <a:extLst>
               <a:ext uri="{FF2B5EF4-FFF2-40B4-BE49-F238E27FC236}">
-                <a16:creationId xmlns="" xmlns:a16="http://schemas.microsoft.com/office/drawing/2014/main" id="{56361E46-CFB5-9248-8E67-947FF6B18BA0}"/>
+                <a16:creationId xmlns:a16="http://schemas.microsoft.com/office/drawing/2014/main" id="{56361E46-CFB5-9248-8E67-947FF6B18BA0}"/>
               </a:ext>
             </a:extLst>
           </p:cNvPr>
@@ -12187,7 +12130,7 @@
           <p:cNvPr id="53" name="Curved Connector 52">
             <a:extLst>
               <a:ext uri="{FF2B5EF4-FFF2-40B4-BE49-F238E27FC236}">
-                <a16:creationId xmlns="" xmlns:a16="http://schemas.microsoft.com/office/drawing/2014/main" id="{A5F259BC-8033-1647-A622-CBA797C2683C}"/>
+                <a16:creationId xmlns:a16="http://schemas.microsoft.com/office/drawing/2014/main" id="{A5F259BC-8033-1647-A622-CBA797C2683C}"/>
               </a:ext>
             </a:extLst>
           </p:cNvPr>
@@ -12232,7 +12175,7 @@
           <p:cNvPr id="59" name="Curved Connector 73">
             <a:extLst>
               <a:ext uri="{FF2B5EF4-FFF2-40B4-BE49-F238E27FC236}">
-                <a16:creationId xmlns="" xmlns:a16="http://schemas.microsoft.com/office/drawing/2014/main" id="{3D1CA2FA-15DF-AF44-945E-700F8DABE0F0}"/>
+                <a16:creationId xmlns:a16="http://schemas.microsoft.com/office/drawing/2014/main" id="{3D1CA2FA-15DF-AF44-945E-700F8DABE0F0}"/>
               </a:ext>
             </a:extLst>
           </p:cNvPr>
@@ -12274,7 +12217,7 @@
           <p:cNvPr id="66" name="Curved Connector 65">
             <a:extLst>
               <a:ext uri="{FF2B5EF4-FFF2-40B4-BE49-F238E27FC236}">
-                <a16:creationId xmlns="" xmlns:a16="http://schemas.microsoft.com/office/drawing/2014/main" id="{A5F259BC-8033-1647-A622-CBA797C2683C}"/>
+                <a16:creationId xmlns:a16="http://schemas.microsoft.com/office/drawing/2014/main" id="{A5F259BC-8033-1647-A622-CBA797C2683C}"/>
               </a:ext>
             </a:extLst>
           </p:cNvPr>
@@ -12337,17 +12280,16 @@
           <a:p>
             <a:pPr algn="ctr"/>
             <a:r>
-              <a:rPr lang="en-US" sz="2400" dirty="0" smtClean="0"/>
+              <a:rPr lang="en-US" sz="2400" dirty="0"/>
               <a:t>Mismatch</a:t>
             </a:r>
           </a:p>
           <a:p>
             <a:pPr algn="ctr"/>
             <a:r>
-              <a:rPr lang="en-US" sz="2400" dirty="0" smtClean="0"/>
+              <a:rPr lang="en-US" sz="2400" dirty="0"/>
               <a:t>Issues</a:t>
             </a:r>
-            <a:endParaRPr lang="en-US" sz="2400" dirty="0"/>
           </a:p>
         </p:txBody>
       </p:sp>
@@ -12356,7 +12298,7 @@
           <p:cNvPr id="70" name="Curved Connector 59">
             <a:extLst>
               <a:ext uri="{FF2B5EF4-FFF2-40B4-BE49-F238E27FC236}">
-                <a16:creationId xmlns="" xmlns:a16="http://schemas.microsoft.com/office/drawing/2014/main" id="{56361E46-CFB5-9248-8E67-947FF6B18BA0}"/>
+                <a16:creationId xmlns:a16="http://schemas.microsoft.com/office/drawing/2014/main" id="{56361E46-CFB5-9248-8E67-947FF6B18BA0}"/>
               </a:ext>
             </a:extLst>
           </p:cNvPr>
@@ -12452,16 +12394,11 @@
               </a:rPr>
               <a:t> </a:t>
             </a:r>
-            <a:endParaRPr lang="en-US" smtClean="0">
-              <a:solidFill>
-                <a:prstClr val="white"/>
-              </a:solidFill>
-            </a:endParaRPr>
           </a:p>
           <a:p>
             <a:pPr lvl="0" algn="ctr"/>
             <a:r>
-              <a:rPr lang="en-US" sz="2400" dirty="0" smtClean="0">
+              <a:rPr lang="en-US" sz="2400" dirty="0">
                 <a:solidFill>
                   <a:schemeClr val="accent6">
                     <a:lumMod val="50000"/>
@@ -12470,13 +12407,6 @@
               </a:rPr>
               <a:t>Detector</a:t>
             </a:r>
-            <a:endParaRPr lang="en-US" sz="2400" dirty="0">
-              <a:solidFill>
-                <a:schemeClr val="accent6">
-                  <a:lumMod val="50000"/>
-                </a:schemeClr>
-              </a:solidFill>
-            </a:endParaRPr>
           </a:p>
         </p:txBody>
       </p:sp>
@@ -12515,7 +12445,7 @@
           <p:cNvPr id="18" name="Rectangle 17">
             <a:extLst>
               <a:ext uri="{FF2B5EF4-FFF2-40B4-BE49-F238E27FC236}">
-                <a16:creationId xmlns="" xmlns:a16="http://schemas.microsoft.com/office/drawing/2014/main" id="{D44296FC-44E1-5E44-B8F1-ACF7669705BF}"/>
+                <a16:creationId xmlns:a16="http://schemas.microsoft.com/office/drawing/2014/main" id="{D44296FC-44E1-5E44-B8F1-ACF7669705BF}"/>
               </a:ext>
             </a:extLst>
           </p:cNvPr>
@@ -12567,7 +12497,7 @@
           <a:p>
             <a:pPr algn="ctr"/>
             <a:r>
-              <a:rPr lang="en-US" sz="2400" dirty="0" smtClean="0">
+              <a:rPr lang="en-US" sz="2400" dirty="0">
                 <a:solidFill>
                   <a:schemeClr val="accent1">
                     <a:lumMod val="50000"/>
@@ -12576,13 +12506,6 @@
               </a:rPr>
               <a:t>Android Revision Modeler</a:t>
             </a:r>
-            <a:endParaRPr lang="en-US" sz="2400" dirty="0">
-              <a:solidFill>
-                <a:schemeClr val="accent1">
-                  <a:lumMod val="50000"/>
-                </a:schemeClr>
-              </a:solidFill>
-            </a:endParaRPr>
           </a:p>
         </p:txBody>
       </p:sp>
@@ -12591,7 +12514,7 @@
           <p:cNvPr id="20" name="Curved Connector 59">
             <a:extLst>
               <a:ext uri="{FF2B5EF4-FFF2-40B4-BE49-F238E27FC236}">
-                <a16:creationId xmlns="" xmlns:a16="http://schemas.microsoft.com/office/drawing/2014/main" id="{0B6BBEF3-E586-5746-A3EE-56ECF7FFCA8F}"/>
+                <a16:creationId xmlns:a16="http://schemas.microsoft.com/office/drawing/2014/main" id="{0B6BBEF3-E586-5746-A3EE-56ECF7FFCA8F}"/>
               </a:ext>
             </a:extLst>
           </p:cNvPr>
@@ -12633,7 +12556,7 @@
           <p:cNvPr id="21" name="Can 20">
             <a:extLst>
               <a:ext uri="{FF2B5EF4-FFF2-40B4-BE49-F238E27FC236}">
-                <a16:creationId xmlns="" xmlns:a16="http://schemas.microsoft.com/office/drawing/2014/main" id="{D9F2DBDA-57C0-904A-B5A4-5D742186469D}"/>
+                <a16:creationId xmlns:a16="http://schemas.microsoft.com/office/drawing/2014/main" id="{D9F2DBDA-57C0-904A-B5A4-5D742186469D}"/>
               </a:ext>
             </a:extLst>
           </p:cNvPr>
@@ -12691,7 +12614,7 @@
           <p:cNvPr id="23" name="Rectangle 22">
             <a:extLst>
               <a:ext uri="{FF2B5EF4-FFF2-40B4-BE49-F238E27FC236}">
-                <a16:creationId xmlns="" xmlns:a16="http://schemas.microsoft.com/office/drawing/2014/main" id="{F96E4CEF-4C1B-B244-BE6A-0BB540570619}"/>
+                <a16:creationId xmlns:a16="http://schemas.microsoft.com/office/drawing/2014/main" id="{F96E4CEF-4C1B-B244-BE6A-0BB540570619}"/>
               </a:ext>
             </a:extLst>
           </p:cNvPr>
@@ -12752,18 +12675,11 @@
               </a:rPr>
               <a:t>API Usage </a:t>
             </a:r>
-            <a:endParaRPr lang="en-US" sz="2400" dirty="0" smtClean="0">
-              <a:solidFill>
-                <a:schemeClr val="accent2">
-                  <a:lumMod val="50000"/>
-                </a:schemeClr>
-              </a:solidFill>
-            </a:endParaRPr>
           </a:p>
           <a:p>
             <a:pPr algn="ctr"/>
             <a:r>
-              <a:rPr lang="en-US" sz="2400" dirty="0" smtClean="0">
+              <a:rPr lang="en-US" sz="2400" dirty="0">
                 <a:solidFill>
                   <a:schemeClr val="accent2">
                     <a:lumMod val="50000"/>
@@ -12772,13 +12688,6 @@
               </a:rPr>
               <a:t>Modeler</a:t>
             </a:r>
-            <a:endParaRPr lang="en-US" sz="2400" dirty="0">
-              <a:solidFill>
-                <a:schemeClr val="accent2">
-                  <a:lumMod val="50000"/>
-                </a:schemeClr>
-              </a:solidFill>
-            </a:endParaRPr>
           </a:p>
         </p:txBody>
       </p:sp>
@@ -12787,7 +12696,7 @@
           <p:cNvPr id="27" name="Group 26">
             <a:extLst>
               <a:ext uri="{FF2B5EF4-FFF2-40B4-BE49-F238E27FC236}">
-                <a16:creationId xmlns="" xmlns:a16="http://schemas.microsoft.com/office/drawing/2014/main" id="{D7F20AD9-7CA4-0041-955B-5E18FE4DAC77}"/>
+                <a16:creationId xmlns:a16="http://schemas.microsoft.com/office/drawing/2014/main" id="{D7F20AD9-7CA4-0041-955B-5E18FE4DAC77}"/>
               </a:ext>
             </a:extLst>
           </p:cNvPr>
@@ -12810,7 +12719,7 @@
             <p:cNvPr id="28" name="Snip Single Corner Rectangle 27">
               <a:extLst>
                 <a:ext uri="{FF2B5EF4-FFF2-40B4-BE49-F238E27FC236}">
-                  <a16:creationId xmlns="" xmlns:a16="http://schemas.microsoft.com/office/drawing/2014/main" id="{06FA0D0C-9EA4-F04D-A8A9-5995163A633F}"/>
+                  <a16:creationId xmlns:a16="http://schemas.microsoft.com/office/drawing/2014/main" id="{06FA0D0C-9EA4-F04D-A8A9-5995163A633F}"/>
                 </a:ext>
               </a:extLst>
             </p:cNvPr>
@@ -12860,7 +12769,7 @@
             <p:cNvPr id="29" name="Straight Connector 28">
               <a:extLst>
                 <a:ext uri="{FF2B5EF4-FFF2-40B4-BE49-F238E27FC236}">
-                  <a16:creationId xmlns="" xmlns:a16="http://schemas.microsoft.com/office/drawing/2014/main" id="{308B8246-BD2E-AE48-879F-EBC48ABC90EA}"/>
+                  <a16:creationId xmlns:a16="http://schemas.microsoft.com/office/drawing/2014/main" id="{308B8246-BD2E-AE48-879F-EBC48ABC90EA}"/>
                 </a:ext>
               </a:extLst>
             </p:cNvPr>
@@ -12902,7 +12811,7 @@
             <p:cNvPr id="30" name="Straight Connector 29">
               <a:extLst>
                 <a:ext uri="{FF2B5EF4-FFF2-40B4-BE49-F238E27FC236}">
-                  <a16:creationId xmlns="" xmlns:a16="http://schemas.microsoft.com/office/drawing/2014/main" id="{78CCB9DB-2613-214E-9817-C9A41BE4C724}"/>
+                  <a16:creationId xmlns:a16="http://schemas.microsoft.com/office/drawing/2014/main" id="{78CCB9DB-2613-214E-9817-C9A41BE4C724}"/>
                 </a:ext>
               </a:extLst>
             </p:cNvPr>
@@ -12944,7 +12853,7 @@
             <p:cNvPr id="31" name="Straight Connector 30">
               <a:extLst>
                 <a:ext uri="{FF2B5EF4-FFF2-40B4-BE49-F238E27FC236}">
-                  <a16:creationId xmlns="" xmlns:a16="http://schemas.microsoft.com/office/drawing/2014/main" id="{6B70F2B2-5A83-1F4B-B4D5-AD5064B29D6D}"/>
+                  <a16:creationId xmlns:a16="http://schemas.microsoft.com/office/drawing/2014/main" id="{6B70F2B2-5A83-1F4B-B4D5-AD5064B29D6D}"/>
                 </a:ext>
               </a:extLst>
             </p:cNvPr>
@@ -12986,7 +12895,7 @@
             <p:cNvPr id="32" name="Straight Connector 31">
               <a:extLst>
                 <a:ext uri="{FF2B5EF4-FFF2-40B4-BE49-F238E27FC236}">
-                  <a16:creationId xmlns="" xmlns:a16="http://schemas.microsoft.com/office/drawing/2014/main" id="{77E995BE-6ACF-9B43-8A72-2F40C0D6AE54}"/>
+                  <a16:creationId xmlns:a16="http://schemas.microsoft.com/office/drawing/2014/main" id="{77E995BE-6ACF-9B43-8A72-2F40C0D6AE54}"/>
                 </a:ext>
               </a:extLst>
             </p:cNvPr>
@@ -13029,7 +12938,7 @@
           <p:cNvPr id="33" name="Curved Connector 59">
             <a:extLst>
               <a:ext uri="{FF2B5EF4-FFF2-40B4-BE49-F238E27FC236}">
-                <a16:creationId xmlns="" xmlns:a16="http://schemas.microsoft.com/office/drawing/2014/main" id="{56D9BF13-AB6C-E845-8961-B80393CBAF45}"/>
+                <a16:creationId xmlns:a16="http://schemas.microsoft.com/office/drawing/2014/main" id="{56D9BF13-AB6C-E845-8961-B80393CBAF45}"/>
               </a:ext>
             </a:extLst>
           </p:cNvPr>
@@ -13070,7 +12979,7 @@
           <p:cNvPr id="36" name="Rectangle 35">
             <a:extLst>
               <a:ext uri="{FF2B5EF4-FFF2-40B4-BE49-F238E27FC236}">
-                <a16:creationId xmlns="" xmlns:a16="http://schemas.microsoft.com/office/drawing/2014/main" id="{24B2218B-44C2-2E49-A2B2-C8C5EFA69EAE}"/>
+                <a16:creationId xmlns:a16="http://schemas.microsoft.com/office/drawing/2014/main" id="{24B2218B-44C2-2E49-A2B2-C8C5EFA69EAE}"/>
               </a:ext>
             </a:extLst>
           </p:cNvPr>
@@ -13136,7 +13045,7 @@
           <p:cNvPr id="37" name="Rounded Rectangle 36">
             <a:extLst>
               <a:ext uri="{FF2B5EF4-FFF2-40B4-BE49-F238E27FC236}">
-                <a16:creationId xmlns="" xmlns:a16="http://schemas.microsoft.com/office/drawing/2014/main" id="{39322434-EC85-F440-A08A-BB8939C64696}"/>
+                <a16:creationId xmlns:a16="http://schemas.microsoft.com/office/drawing/2014/main" id="{39322434-EC85-F440-A08A-BB8939C64696}"/>
               </a:ext>
             </a:extLst>
           </p:cNvPr>
@@ -13207,7 +13116,7 @@
           <p:cNvPr id="38" name="Rounded Rectangle 37">
             <a:extLst>
               <a:ext uri="{FF2B5EF4-FFF2-40B4-BE49-F238E27FC236}">
-                <a16:creationId xmlns="" xmlns:a16="http://schemas.microsoft.com/office/drawing/2014/main" id="{DB32C2BA-0B7D-F040-AB58-94D2D873B677}"/>
+                <a16:creationId xmlns:a16="http://schemas.microsoft.com/office/drawing/2014/main" id="{DB32C2BA-0B7D-F040-AB58-94D2D873B677}"/>
               </a:ext>
             </a:extLst>
           </p:cNvPr>
@@ -13268,17 +13177,7 @@
                   </a:schemeClr>
                 </a:solidFill>
               </a:rPr>
-              <a:t>Permission Mismatch </a:t>
-            </a:r>
-            <a:r>
-              <a:rPr lang="en-US" sz="2400" dirty="0">
-                <a:solidFill>
-                  <a:schemeClr val="accent1">
-                    <a:lumMod val="50000"/>
-                  </a:schemeClr>
-                </a:solidFill>
-              </a:rPr>
-              <a:t>Detector</a:t>
+              <a:t>Permission Mismatch Detector</a:t>
             </a:r>
           </a:p>
         </p:txBody>
@@ -13399,15 +13298,13 @@
               <a:rPr lang="en-US" sz="2000" dirty="0"/>
               <a:t>Android </a:t>
             </a:r>
-            <a:endParaRPr lang="en-US" sz="2000" dirty="0" smtClean="0"/>
           </a:p>
           <a:p>
             <a:pPr algn="ctr"/>
             <a:r>
-              <a:rPr lang="en-US" sz="2000" dirty="0" smtClean="0"/>
+              <a:rPr lang="en-US" sz="2000" dirty="0"/>
               <a:t>Frameworks</a:t>
             </a:r>
-            <a:endParaRPr lang="en-US" sz="2000" dirty="0"/>
           </a:p>
         </p:txBody>
       </p:sp>
@@ -13434,10 +13331,9 @@
           <a:p>
             <a:pPr algn="ctr"/>
             <a:r>
-              <a:rPr lang="en-US" sz="2000" dirty="0" smtClean="0"/>
+              <a:rPr lang="en-US" sz="2000" dirty="0"/>
               <a:t>Application</a:t>
             </a:r>
-            <a:endParaRPr lang="en-US" sz="2000" dirty="0"/>
           </a:p>
         </p:txBody>
       </p:sp>
@@ -13446,7 +13342,7 @@
           <p:cNvPr id="52" name="Curved Connector 59">
             <a:extLst>
               <a:ext uri="{FF2B5EF4-FFF2-40B4-BE49-F238E27FC236}">
-                <a16:creationId xmlns="" xmlns:a16="http://schemas.microsoft.com/office/drawing/2014/main" id="{56361E46-CFB5-9248-8E67-947FF6B18BA0}"/>
+                <a16:creationId xmlns:a16="http://schemas.microsoft.com/office/drawing/2014/main" id="{56361E46-CFB5-9248-8E67-947FF6B18BA0}"/>
               </a:ext>
             </a:extLst>
           </p:cNvPr>
@@ -13487,7 +13383,7 @@
           <p:cNvPr id="53" name="Curved Connector 52">
             <a:extLst>
               <a:ext uri="{FF2B5EF4-FFF2-40B4-BE49-F238E27FC236}">
-                <a16:creationId xmlns="" xmlns:a16="http://schemas.microsoft.com/office/drawing/2014/main" id="{A5F259BC-8033-1647-A622-CBA797C2683C}"/>
+                <a16:creationId xmlns:a16="http://schemas.microsoft.com/office/drawing/2014/main" id="{A5F259BC-8033-1647-A622-CBA797C2683C}"/>
               </a:ext>
             </a:extLst>
           </p:cNvPr>
@@ -13532,7 +13428,7 @@
           <p:cNvPr id="59" name="Curved Connector 73">
             <a:extLst>
               <a:ext uri="{FF2B5EF4-FFF2-40B4-BE49-F238E27FC236}">
-                <a16:creationId xmlns="" xmlns:a16="http://schemas.microsoft.com/office/drawing/2014/main" id="{3D1CA2FA-15DF-AF44-945E-700F8DABE0F0}"/>
+                <a16:creationId xmlns:a16="http://schemas.microsoft.com/office/drawing/2014/main" id="{3D1CA2FA-15DF-AF44-945E-700F8DABE0F0}"/>
               </a:ext>
             </a:extLst>
           </p:cNvPr>
@@ -13574,7 +13470,7 @@
           <p:cNvPr id="66" name="Curved Connector 65">
             <a:extLst>
               <a:ext uri="{FF2B5EF4-FFF2-40B4-BE49-F238E27FC236}">
-                <a16:creationId xmlns="" xmlns:a16="http://schemas.microsoft.com/office/drawing/2014/main" id="{A5F259BC-8033-1647-A622-CBA797C2683C}"/>
+                <a16:creationId xmlns:a16="http://schemas.microsoft.com/office/drawing/2014/main" id="{A5F259BC-8033-1647-A622-CBA797C2683C}"/>
               </a:ext>
             </a:extLst>
           </p:cNvPr>
@@ -13637,17 +13533,16 @@
           <a:p>
             <a:pPr algn="ctr"/>
             <a:r>
-              <a:rPr lang="en-US" sz="2400" dirty="0" smtClean="0"/>
+              <a:rPr lang="en-US" sz="2400" dirty="0"/>
               <a:t>Mismatch</a:t>
             </a:r>
           </a:p>
           <a:p>
             <a:pPr algn="ctr"/>
             <a:r>
-              <a:rPr lang="en-US" sz="2400" dirty="0" smtClean="0"/>
+              <a:rPr lang="en-US" sz="2400" dirty="0"/>
               <a:t>Issues</a:t>
             </a:r>
-            <a:endParaRPr lang="en-US" sz="2400" dirty="0"/>
           </a:p>
         </p:txBody>
       </p:sp>
@@ -13656,7 +13551,7 @@
           <p:cNvPr id="70" name="Curved Connector 59">
             <a:extLst>
               <a:ext uri="{FF2B5EF4-FFF2-40B4-BE49-F238E27FC236}">
-                <a16:creationId xmlns="" xmlns:a16="http://schemas.microsoft.com/office/drawing/2014/main" id="{56361E46-CFB5-9248-8E67-947FF6B18BA0}"/>
+                <a16:creationId xmlns:a16="http://schemas.microsoft.com/office/drawing/2014/main" id="{56361E46-CFB5-9248-8E67-947FF6B18BA0}"/>
               </a:ext>
             </a:extLst>
           </p:cNvPr>
@@ -13752,16 +13647,11 @@
               </a:rPr>
               <a:t> </a:t>
             </a:r>
-            <a:endParaRPr lang="en-US" smtClean="0">
-              <a:solidFill>
-                <a:prstClr val="white"/>
-              </a:solidFill>
-            </a:endParaRPr>
           </a:p>
           <a:p>
             <a:pPr lvl="0" algn="ctr"/>
             <a:r>
-              <a:rPr lang="en-US" sz="2400" dirty="0" smtClean="0">
+              <a:rPr lang="en-US" sz="2400" dirty="0">
                 <a:solidFill>
                   <a:schemeClr val="accent6">
                     <a:lumMod val="50000"/>
@@ -13770,13 +13660,6 @@
               </a:rPr>
               <a:t>Detector</a:t>
             </a:r>
-            <a:endParaRPr lang="en-US" sz="2400" dirty="0">
-              <a:solidFill>
-                <a:schemeClr val="accent6">
-                  <a:lumMod val="50000"/>
-                </a:schemeClr>
-              </a:solidFill>
-            </a:endParaRPr>
           </a:p>
         </p:txBody>
       </p:sp>
@@ -13810,17 +13693,16 @@
           <a:p>
             <a:pPr algn="ctr"/>
             <a:r>
-              <a:rPr lang="en-US" sz="2000" dirty="0" smtClean="0"/>
+              <a:rPr lang="en-US" sz="2000" dirty="0"/>
               <a:t>Revision </a:t>
             </a:r>
           </a:p>
           <a:p>
             <a:pPr algn="ctr"/>
             <a:r>
-              <a:rPr lang="en-US" sz="2000" dirty="0" smtClean="0"/>
+              <a:rPr lang="en-US" sz="2000" dirty="0"/>
               <a:t>DB</a:t>
             </a:r>
-            <a:endParaRPr lang="en-US" sz="2000" dirty="0"/>
           </a:p>
         </p:txBody>
       </p:sp>
@@ -13877,7 +13759,7 @@
           <p:cNvPr id="26" name="TextBox 25">
             <a:extLst>
               <a:ext uri="{FF2B5EF4-FFF2-40B4-BE49-F238E27FC236}">
-                <a16:creationId xmlns="" xmlns:a16="http://schemas.microsoft.com/office/drawing/2014/main" id="{8E115417-89E6-CF46-9DFE-0603E4CEA342}"/>
+                <a16:creationId xmlns:a16="http://schemas.microsoft.com/office/drawing/2014/main" id="{8E115417-89E6-CF46-9DFE-0603E4CEA342}"/>
               </a:ext>
             </a:extLst>
           </p:cNvPr>
@@ -13955,7 +13837,7 @@
           <p:cNvPr id="20" name="Curved Connector 59">
             <a:extLst>
               <a:ext uri="{FF2B5EF4-FFF2-40B4-BE49-F238E27FC236}">
-                <a16:creationId xmlns="" xmlns:a16="http://schemas.microsoft.com/office/drawing/2014/main" id="{0B6BBEF3-E586-5746-A3EE-56ECF7FFCA8F}"/>
+                <a16:creationId xmlns:a16="http://schemas.microsoft.com/office/drawing/2014/main" id="{0B6BBEF3-E586-5746-A3EE-56ECF7FFCA8F}"/>
               </a:ext>
             </a:extLst>
           </p:cNvPr>
@@ -13997,7 +13879,7 @@
           <p:cNvPr id="21" name="Can 20">
             <a:extLst>
               <a:ext uri="{FF2B5EF4-FFF2-40B4-BE49-F238E27FC236}">
-                <a16:creationId xmlns="" xmlns:a16="http://schemas.microsoft.com/office/drawing/2014/main" id="{D9F2DBDA-57C0-904A-B5A4-5D742186469D}"/>
+                <a16:creationId xmlns:a16="http://schemas.microsoft.com/office/drawing/2014/main" id="{D9F2DBDA-57C0-904A-B5A4-5D742186469D}"/>
               </a:ext>
             </a:extLst>
           </p:cNvPr>
@@ -14058,7 +13940,7 @@
           <p:cNvPr id="27" name="Group 26">
             <a:extLst>
               <a:ext uri="{FF2B5EF4-FFF2-40B4-BE49-F238E27FC236}">
-                <a16:creationId xmlns="" xmlns:a16="http://schemas.microsoft.com/office/drawing/2014/main" id="{D7F20AD9-7CA4-0041-955B-5E18FE4DAC77}"/>
+                <a16:creationId xmlns:a16="http://schemas.microsoft.com/office/drawing/2014/main" id="{D7F20AD9-7CA4-0041-955B-5E18FE4DAC77}"/>
               </a:ext>
             </a:extLst>
           </p:cNvPr>
@@ -14081,7 +13963,7 @@
             <p:cNvPr id="28" name="Snip Single Corner Rectangle 27">
               <a:extLst>
                 <a:ext uri="{FF2B5EF4-FFF2-40B4-BE49-F238E27FC236}">
-                  <a16:creationId xmlns="" xmlns:a16="http://schemas.microsoft.com/office/drawing/2014/main" id="{06FA0D0C-9EA4-F04D-A8A9-5995163A633F}"/>
+                  <a16:creationId xmlns:a16="http://schemas.microsoft.com/office/drawing/2014/main" id="{06FA0D0C-9EA4-F04D-A8A9-5995163A633F}"/>
                 </a:ext>
               </a:extLst>
             </p:cNvPr>
@@ -14134,7 +14016,7 @@
             <p:cNvPr id="29" name="Straight Connector 28">
               <a:extLst>
                 <a:ext uri="{FF2B5EF4-FFF2-40B4-BE49-F238E27FC236}">
-                  <a16:creationId xmlns="" xmlns:a16="http://schemas.microsoft.com/office/drawing/2014/main" id="{308B8246-BD2E-AE48-879F-EBC48ABC90EA}"/>
+                  <a16:creationId xmlns:a16="http://schemas.microsoft.com/office/drawing/2014/main" id="{308B8246-BD2E-AE48-879F-EBC48ABC90EA}"/>
                 </a:ext>
               </a:extLst>
             </p:cNvPr>
@@ -14179,7 +14061,7 @@
             <p:cNvPr id="30" name="Straight Connector 29">
               <a:extLst>
                 <a:ext uri="{FF2B5EF4-FFF2-40B4-BE49-F238E27FC236}">
-                  <a16:creationId xmlns="" xmlns:a16="http://schemas.microsoft.com/office/drawing/2014/main" id="{78CCB9DB-2613-214E-9817-C9A41BE4C724}"/>
+                  <a16:creationId xmlns:a16="http://schemas.microsoft.com/office/drawing/2014/main" id="{78CCB9DB-2613-214E-9817-C9A41BE4C724}"/>
                 </a:ext>
               </a:extLst>
             </p:cNvPr>
@@ -14224,7 +14106,7 @@
             <p:cNvPr id="31" name="Straight Connector 30">
               <a:extLst>
                 <a:ext uri="{FF2B5EF4-FFF2-40B4-BE49-F238E27FC236}">
-                  <a16:creationId xmlns="" xmlns:a16="http://schemas.microsoft.com/office/drawing/2014/main" id="{6B70F2B2-5A83-1F4B-B4D5-AD5064B29D6D}"/>
+                  <a16:creationId xmlns:a16="http://schemas.microsoft.com/office/drawing/2014/main" id="{6B70F2B2-5A83-1F4B-B4D5-AD5064B29D6D}"/>
                 </a:ext>
               </a:extLst>
             </p:cNvPr>
@@ -14269,7 +14151,7 @@
             <p:cNvPr id="32" name="Straight Connector 31">
               <a:extLst>
                 <a:ext uri="{FF2B5EF4-FFF2-40B4-BE49-F238E27FC236}">
-                  <a16:creationId xmlns="" xmlns:a16="http://schemas.microsoft.com/office/drawing/2014/main" id="{77E995BE-6ACF-9B43-8A72-2F40C0D6AE54}"/>
+                  <a16:creationId xmlns:a16="http://schemas.microsoft.com/office/drawing/2014/main" id="{77E995BE-6ACF-9B43-8A72-2F40C0D6AE54}"/>
                 </a:ext>
               </a:extLst>
             </p:cNvPr>
@@ -14315,7 +14197,7 @@
           <p:cNvPr id="33" name="Curved Connector 59">
             <a:extLst>
               <a:ext uri="{FF2B5EF4-FFF2-40B4-BE49-F238E27FC236}">
-                <a16:creationId xmlns="" xmlns:a16="http://schemas.microsoft.com/office/drawing/2014/main" id="{56D9BF13-AB6C-E845-8961-B80393CBAF45}"/>
+                <a16:creationId xmlns:a16="http://schemas.microsoft.com/office/drawing/2014/main" id="{56D9BF13-AB6C-E845-8961-B80393CBAF45}"/>
               </a:ext>
             </a:extLst>
           </p:cNvPr>
@@ -14467,15 +14349,13 @@
               <a:rPr lang="en-US" sz="2000" dirty="0"/>
               <a:t>Android </a:t>
             </a:r>
-            <a:endParaRPr lang="en-US" sz="2000" dirty="0" smtClean="0"/>
           </a:p>
           <a:p>
             <a:pPr algn="ctr"/>
             <a:r>
-              <a:rPr lang="en-US" sz="2000" dirty="0" smtClean="0"/>
+              <a:rPr lang="en-US" sz="2000" dirty="0"/>
               <a:t>Frameworks</a:t>
             </a:r>
-            <a:endParaRPr lang="en-US" sz="2000" dirty="0"/>
           </a:p>
         </p:txBody>
       </p:sp>
@@ -14502,10 +14382,9 @@
           <a:p>
             <a:pPr algn="ctr"/>
             <a:r>
-              <a:rPr lang="en-US" sz="2000" dirty="0" smtClean="0"/>
+              <a:rPr lang="en-US" sz="2000" dirty="0"/>
               <a:t>Application</a:t>
             </a:r>
-            <a:endParaRPr lang="en-US" sz="2000" dirty="0"/>
           </a:p>
         </p:txBody>
       </p:sp>
@@ -14514,7 +14393,7 @@
           <p:cNvPr id="52" name="Curved Connector 59">
             <a:extLst>
               <a:ext uri="{FF2B5EF4-FFF2-40B4-BE49-F238E27FC236}">
-                <a16:creationId xmlns="" xmlns:a16="http://schemas.microsoft.com/office/drawing/2014/main" id="{56361E46-CFB5-9248-8E67-947FF6B18BA0}"/>
+                <a16:creationId xmlns:a16="http://schemas.microsoft.com/office/drawing/2014/main" id="{56361E46-CFB5-9248-8E67-947FF6B18BA0}"/>
               </a:ext>
             </a:extLst>
           </p:cNvPr>
@@ -14557,7 +14436,7 @@
           <p:cNvPr id="59" name="Curved Connector 73">
             <a:extLst>
               <a:ext uri="{FF2B5EF4-FFF2-40B4-BE49-F238E27FC236}">
-                <a16:creationId xmlns="" xmlns:a16="http://schemas.microsoft.com/office/drawing/2014/main" id="{3D1CA2FA-15DF-AF44-945E-700F8DABE0F0}"/>
+                <a16:creationId xmlns:a16="http://schemas.microsoft.com/office/drawing/2014/main" id="{3D1CA2FA-15DF-AF44-945E-700F8DABE0F0}"/>
               </a:ext>
             </a:extLst>
           </p:cNvPr>
@@ -14616,17 +14495,16 @@
           <a:p>
             <a:pPr algn="ctr"/>
             <a:r>
-              <a:rPr lang="en-US" sz="2000" dirty="0" smtClean="0"/>
+              <a:rPr lang="en-US" sz="2000" dirty="0"/>
               <a:t>Mismatch</a:t>
             </a:r>
           </a:p>
           <a:p>
             <a:pPr algn="ctr"/>
             <a:r>
-              <a:rPr lang="en-US" sz="2000" dirty="0" smtClean="0"/>
+              <a:rPr lang="en-US" sz="2000" dirty="0"/>
               <a:t>Issues</a:t>
             </a:r>
-            <a:endParaRPr lang="en-US" sz="2000" dirty="0"/>
           </a:p>
         </p:txBody>
       </p:sp>
@@ -14635,7 +14513,7 @@
           <p:cNvPr id="70" name="Curved Connector 59">
             <a:extLst>
               <a:ext uri="{FF2B5EF4-FFF2-40B4-BE49-F238E27FC236}">
-                <a16:creationId xmlns="" xmlns:a16="http://schemas.microsoft.com/office/drawing/2014/main" id="{56361E46-CFB5-9248-8E67-947FF6B18BA0}"/>
+                <a16:creationId xmlns:a16="http://schemas.microsoft.com/office/drawing/2014/main" id="{56361E46-CFB5-9248-8E67-947FF6B18BA0}"/>
               </a:ext>
             </a:extLst>
           </p:cNvPr>
@@ -14702,17 +14580,16 @@
           <a:p>
             <a:pPr algn="ctr"/>
             <a:r>
-              <a:rPr lang="en-US" sz="2000" dirty="0" smtClean="0"/>
+              <a:rPr lang="en-US" sz="2000" dirty="0"/>
               <a:t>Revision </a:t>
             </a:r>
           </a:p>
           <a:p>
             <a:pPr algn="ctr"/>
             <a:r>
-              <a:rPr lang="en-US" sz="2000" dirty="0" smtClean="0"/>
+              <a:rPr lang="en-US" sz="2000" dirty="0"/>
               <a:t>DB</a:t>
             </a:r>
-            <a:endParaRPr lang="en-US" sz="2000" dirty="0"/>
           </a:p>
         </p:txBody>
       </p:sp>
@@ -14769,7 +14646,7 @@
           <p:cNvPr id="26" name="TextBox 25">
             <a:extLst>
               <a:ext uri="{FF2B5EF4-FFF2-40B4-BE49-F238E27FC236}">
-                <a16:creationId xmlns="" xmlns:a16="http://schemas.microsoft.com/office/drawing/2014/main" id="{8E115417-89E6-CF46-9DFE-0603E4CEA342}"/>
+                <a16:creationId xmlns:a16="http://schemas.microsoft.com/office/drawing/2014/main" id="{8E115417-89E6-CF46-9DFE-0603E4CEA342}"/>
               </a:ext>
             </a:extLst>
           </p:cNvPr>
@@ -14817,7 +14694,7 @@
           <p:cNvPr id="35" name="Rounded Rectangle 34">
             <a:extLst>
               <a:ext uri="{FF2B5EF4-FFF2-40B4-BE49-F238E27FC236}">
-                <a16:creationId xmlns="" xmlns:a16="http://schemas.microsoft.com/office/drawing/2014/main" id="{DB32C2BA-0B7D-F040-AB58-94D2D873B677}"/>
+                <a16:creationId xmlns:a16="http://schemas.microsoft.com/office/drawing/2014/main" id="{DB32C2BA-0B7D-F040-AB58-94D2D873B677}"/>
               </a:ext>
             </a:extLst>
           </p:cNvPr>
@@ -14878,11 +14755,6 @@
               </a:rPr>
               <a:t>Android Revision Modeler</a:t>
             </a:r>
-            <a:endParaRPr lang="en-US" sz="2400" dirty="0">
-              <a:solidFill>
-                <a:schemeClr val="tx1"/>
-              </a:solidFill>
-            </a:endParaRPr>
           </a:p>
         </p:txBody>
       </p:sp>
@@ -14891,7 +14763,7 @@
           <p:cNvPr id="39" name="Rounded Rectangle 38">
             <a:extLst>
               <a:ext uri="{FF2B5EF4-FFF2-40B4-BE49-F238E27FC236}">
-                <a16:creationId xmlns="" xmlns:a16="http://schemas.microsoft.com/office/drawing/2014/main" id="{DB32C2BA-0B7D-F040-AB58-94D2D873B677}"/>
+                <a16:creationId xmlns:a16="http://schemas.microsoft.com/office/drawing/2014/main" id="{DB32C2BA-0B7D-F040-AB58-94D2D873B677}"/>
               </a:ext>
             </a:extLst>
           </p:cNvPr>
@@ -14945,7 +14817,7 @@
           <a:p>
             <a:pPr algn="ctr"/>
             <a:r>
-              <a:rPr lang="en-US" sz="2400" dirty="0" smtClean="0">
+              <a:rPr lang="en-US" sz="2400" dirty="0">
                 <a:solidFill>
                   <a:schemeClr val="tx1"/>
                 </a:solidFill>
@@ -14956,18 +14828,13 @@
           <a:p>
             <a:pPr algn="ctr"/>
             <a:r>
-              <a:rPr lang="en-US" sz="2400" dirty="0" smtClean="0">
+              <a:rPr lang="en-US" sz="2400" dirty="0">
                 <a:solidFill>
                   <a:schemeClr val="tx1"/>
                 </a:solidFill>
               </a:rPr>
               <a:t>Modeler</a:t>
             </a:r>
-            <a:endParaRPr lang="en-US" sz="2400" dirty="0">
-              <a:solidFill>
-                <a:schemeClr val="tx1"/>
-              </a:solidFill>
-            </a:endParaRPr>
           </a:p>
         </p:txBody>
       </p:sp>
@@ -14976,7 +14843,7 @@
           <p:cNvPr id="41" name="Rounded Rectangle 40">
             <a:extLst>
               <a:ext uri="{FF2B5EF4-FFF2-40B4-BE49-F238E27FC236}">
-                <a16:creationId xmlns="" xmlns:a16="http://schemas.microsoft.com/office/drawing/2014/main" id="{DB32C2BA-0B7D-F040-AB58-94D2D873B677}"/>
+                <a16:creationId xmlns:a16="http://schemas.microsoft.com/office/drawing/2014/main" id="{DB32C2BA-0B7D-F040-AB58-94D2D873B677}"/>
               </a:ext>
             </a:extLst>
           </p:cNvPr>
@@ -15042,7 +14909,7 @@
           <p:cNvPr id="43" name="Curved Connector 59">
             <a:extLst>
               <a:ext uri="{FF2B5EF4-FFF2-40B4-BE49-F238E27FC236}">
-                <a16:creationId xmlns="" xmlns:a16="http://schemas.microsoft.com/office/drawing/2014/main" id="{56361E46-CFB5-9248-8E67-947FF6B18BA0}"/>
+                <a16:creationId xmlns:a16="http://schemas.microsoft.com/office/drawing/2014/main" id="{56361E46-CFB5-9248-8E67-947FF6B18BA0}"/>
               </a:ext>
             </a:extLst>
           </p:cNvPr>
@@ -15117,15 +14984,13 @@
               <a:rPr lang="en-US" dirty="0"/>
               <a:t> </a:t>
             </a:r>
-            <a:endParaRPr lang="en-US" dirty="0" smtClean="0"/>
           </a:p>
           <a:p>
             <a:pPr lvl="0" algn="ctr"/>
             <a:r>
-              <a:rPr lang="en-US" sz="2400" dirty="0" smtClean="0"/>
+              <a:rPr lang="en-US" sz="2400" dirty="0"/>
               <a:t>Detector</a:t>
             </a:r>
-            <a:endParaRPr lang="en-US" sz="2400" dirty="0"/>
           </a:p>
         </p:txBody>
       </p:sp>
@@ -15134,7 +14999,7 @@
           <p:cNvPr id="37" name="Rounded Rectangle 36">
             <a:extLst>
               <a:ext uri="{FF2B5EF4-FFF2-40B4-BE49-F238E27FC236}">
-                <a16:creationId xmlns="" xmlns:a16="http://schemas.microsoft.com/office/drawing/2014/main" id="{39322434-EC85-F440-A08A-BB8939C64696}"/>
+                <a16:creationId xmlns:a16="http://schemas.microsoft.com/office/drawing/2014/main" id="{39322434-EC85-F440-A08A-BB8939C64696}"/>
               </a:ext>
             </a:extLst>
           </p:cNvPr>
@@ -15202,7 +15067,7 @@
           <p:cNvPr id="44" name="Rounded Rectangle 43">
             <a:extLst>
               <a:ext uri="{FF2B5EF4-FFF2-40B4-BE49-F238E27FC236}">
-                <a16:creationId xmlns="" xmlns:a16="http://schemas.microsoft.com/office/drawing/2014/main" id="{39322434-EC85-F440-A08A-BB8939C64696}"/>
+                <a16:creationId xmlns:a16="http://schemas.microsoft.com/office/drawing/2014/main" id="{39322434-EC85-F440-A08A-BB8939C64696}"/>
               </a:ext>
             </a:extLst>
           </p:cNvPr>
@@ -15255,7 +15120,7 @@
           <a:p>
             <a:pPr algn="ctr"/>
             <a:r>
-              <a:rPr lang="en-US" sz="2000" smtClean="0">
+              <a:rPr lang="en-US" sz="2000">
                 <a:solidFill>
                   <a:schemeClr val="tx1"/>
                 </a:solidFill>
@@ -15278,7 +15143,7 @@
           <p:cNvPr id="50" name="Curved Connector 59">
             <a:extLst>
               <a:ext uri="{FF2B5EF4-FFF2-40B4-BE49-F238E27FC236}">
-                <a16:creationId xmlns="" xmlns:a16="http://schemas.microsoft.com/office/drawing/2014/main" id="{56D9BF13-AB6C-E845-8961-B80393CBAF45}"/>
+                <a16:creationId xmlns:a16="http://schemas.microsoft.com/office/drawing/2014/main" id="{56D9BF13-AB6C-E845-8961-B80393CBAF45}"/>
               </a:ext>
             </a:extLst>
           </p:cNvPr>
@@ -15319,7 +15184,7 @@
           <p:cNvPr id="60" name="Curved Connector 59">
             <a:extLst>
               <a:ext uri="{FF2B5EF4-FFF2-40B4-BE49-F238E27FC236}">
-                <a16:creationId xmlns="" xmlns:a16="http://schemas.microsoft.com/office/drawing/2014/main" id="{56361E46-CFB5-9248-8E67-947FF6B18BA0}"/>
+                <a16:creationId xmlns:a16="http://schemas.microsoft.com/office/drawing/2014/main" id="{56361E46-CFB5-9248-8E67-947FF6B18BA0}"/>
               </a:ext>
             </a:extLst>
           </p:cNvPr>
@@ -15390,7 +15255,7 @@
           <p:cNvPr id="20" name="Curved Connector 59">
             <a:extLst>
               <a:ext uri="{FF2B5EF4-FFF2-40B4-BE49-F238E27FC236}">
-                <a16:creationId xmlns="" xmlns:a16="http://schemas.microsoft.com/office/drawing/2014/main" id="{0B6BBEF3-E586-5746-A3EE-56ECF7FFCA8F}"/>
+                <a16:creationId xmlns:a16="http://schemas.microsoft.com/office/drawing/2014/main" id="{0B6BBEF3-E586-5746-A3EE-56ECF7FFCA8F}"/>
               </a:ext>
             </a:extLst>
           </p:cNvPr>
@@ -15432,7 +15297,7 @@
           <p:cNvPr id="21" name="Can 20">
             <a:extLst>
               <a:ext uri="{FF2B5EF4-FFF2-40B4-BE49-F238E27FC236}">
-                <a16:creationId xmlns="" xmlns:a16="http://schemas.microsoft.com/office/drawing/2014/main" id="{D9F2DBDA-57C0-904A-B5A4-5D742186469D}"/>
+                <a16:creationId xmlns:a16="http://schemas.microsoft.com/office/drawing/2014/main" id="{D9F2DBDA-57C0-904A-B5A4-5D742186469D}"/>
               </a:ext>
             </a:extLst>
           </p:cNvPr>
@@ -15495,7 +15360,7 @@
           <p:cNvPr id="27" name="Group 26">
             <a:extLst>
               <a:ext uri="{FF2B5EF4-FFF2-40B4-BE49-F238E27FC236}">
-                <a16:creationId xmlns="" xmlns:a16="http://schemas.microsoft.com/office/drawing/2014/main" id="{D7F20AD9-7CA4-0041-955B-5E18FE4DAC77}"/>
+                <a16:creationId xmlns:a16="http://schemas.microsoft.com/office/drawing/2014/main" id="{D7F20AD9-7CA4-0041-955B-5E18FE4DAC77}"/>
               </a:ext>
             </a:extLst>
           </p:cNvPr>
@@ -15521,7 +15386,7 @@
             <p:cNvPr id="28" name="Snip Single Corner Rectangle 27">
               <a:extLst>
                 <a:ext uri="{FF2B5EF4-FFF2-40B4-BE49-F238E27FC236}">
-                  <a16:creationId xmlns="" xmlns:a16="http://schemas.microsoft.com/office/drawing/2014/main" id="{06FA0D0C-9EA4-F04D-A8A9-5995163A633F}"/>
+                  <a16:creationId xmlns:a16="http://schemas.microsoft.com/office/drawing/2014/main" id="{06FA0D0C-9EA4-F04D-A8A9-5995163A633F}"/>
                 </a:ext>
               </a:extLst>
             </p:cNvPr>
@@ -15573,7 +15438,7 @@
             <p:cNvPr id="29" name="Straight Connector 28">
               <a:extLst>
                 <a:ext uri="{FF2B5EF4-FFF2-40B4-BE49-F238E27FC236}">
-                  <a16:creationId xmlns="" xmlns:a16="http://schemas.microsoft.com/office/drawing/2014/main" id="{308B8246-BD2E-AE48-879F-EBC48ABC90EA}"/>
+                  <a16:creationId xmlns:a16="http://schemas.microsoft.com/office/drawing/2014/main" id="{308B8246-BD2E-AE48-879F-EBC48ABC90EA}"/>
                 </a:ext>
               </a:extLst>
             </p:cNvPr>
@@ -15617,7 +15482,7 @@
             <p:cNvPr id="30" name="Straight Connector 29">
               <a:extLst>
                 <a:ext uri="{FF2B5EF4-FFF2-40B4-BE49-F238E27FC236}">
-                  <a16:creationId xmlns="" xmlns:a16="http://schemas.microsoft.com/office/drawing/2014/main" id="{78CCB9DB-2613-214E-9817-C9A41BE4C724}"/>
+                  <a16:creationId xmlns:a16="http://schemas.microsoft.com/office/drawing/2014/main" id="{78CCB9DB-2613-214E-9817-C9A41BE4C724}"/>
                 </a:ext>
               </a:extLst>
             </p:cNvPr>
@@ -15661,7 +15526,7 @@
             <p:cNvPr id="31" name="Straight Connector 30">
               <a:extLst>
                 <a:ext uri="{FF2B5EF4-FFF2-40B4-BE49-F238E27FC236}">
-                  <a16:creationId xmlns="" xmlns:a16="http://schemas.microsoft.com/office/drawing/2014/main" id="{6B70F2B2-5A83-1F4B-B4D5-AD5064B29D6D}"/>
+                  <a16:creationId xmlns:a16="http://schemas.microsoft.com/office/drawing/2014/main" id="{6B70F2B2-5A83-1F4B-B4D5-AD5064B29D6D}"/>
                 </a:ext>
               </a:extLst>
             </p:cNvPr>
@@ -15705,7 +15570,7 @@
             <p:cNvPr id="32" name="Straight Connector 31">
               <a:extLst>
                 <a:ext uri="{FF2B5EF4-FFF2-40B4-BE49-F238E27FC236}">
-                  <a16:creationId xmlns="" xmlns:a16="http://schemas.microsoft.com/office/drawing/2014/main" id="{77E995BE-6ACF-9B43-8A72-2F40C0D6AE54}"/>
+                  <a16:creationId xmlns:a16="http://schemas.microsoft.com/office/drawing/2014/main" id="{77E995BE-6ACF-9B43-8A72-2F40C0D6AE54}"/>
                 </a:ext>
               </a:extLst>
             </p:cNvPr>
@@ -15750,7 +15615,7 @@
           <p:cNvPr id="33" name="Curved Connector 59">
             <a:extLst>
               <a:ext uri="{FF2B5EF4-FFF2-40B4-BE49-F238E27FC236}">
-                <a16:creationId xmlns="" xmlns:a16="http://schemas.microsoft.com/office/drawing/2014/main" id="{56D9BF13-AB6C-E845-8961-B80393CBAF45}"/>
+                <a16:creationId xmlns:a16="http://schemas.microsoft.com/office/drawing/2014/main" id="{56D9BF13-AB6C-E845-8961-B80393CBAF45}"/>
               </a:ext>
             </a:extLst>
           </p:cNvPr>
@@ -15902,15 +15767,13 @@
               <a:rPr lang="en-US" sz="2000" dirty="0"/>
               <a:t>Android </a:t>
             </a:r>
-            <a:endParaRPr lang="en-US" sz="2000" dirty="0" smtClean="0"/>
           </a:p>
           <a:p>
             <a:pPr algn="ctr"/>
             <a:r>
-              <a:rPr lang="en-US" sz="2000" dirty="0" smtClean="0"/>
+              <a:rPr lang="en-US" sz="2000" dirty="0"/>
               <a:t>Frameworks</a:t>
             </a:r>
-            <a:endParaRPr lang="en-US" sz="2000" dirty="0"/>
           </a:p>
         </p:txBody>
       </p:sp>
@@ -15937,10 +15800,9 @@
           <a:p>
             <a:pPr algn="ctr"/>
             <a:r>
-              <a:rPr lang="en-US" sz="2000" dirty="0" smtClean="0"/>
+              <a:rPr lang="en-US" sz="2000" dirty="0"/>
               <a:t>Application</a:t>
             </a:r>
-            <a:endParaRPr lang="en-US" sz="2000" dirty="0"/>
           </a:p>
         </p:txBody>
       </p:sp>
@@ -15949,7 +15811,7 @@
           <p:cNvPr id="52" name="Curved Connector 59">
             <a:extLst>
               <a:ext uri="{FF2B5EF4-FFF2-40B4-BE49-F238E27FC236}">
-                <a16:creationId xmlns="" xmlns:a16="http://schemas.microsoft.com/office/drawing/2014/main" id="{56361E46-CFB5-9248-8E67-947FF6B18BA0}"/>
+                <a16:creationId xmlns:a16="http://schemas.microsoft.com/office/drawing/2014/main" id="{56361E46-CFB5-9248-8E67-947FF6B18BA0}"/>
               </a:ext>
             </a:extLst>
           </p:cNvPr>
@@ -15992,7 +15854,7 @@
           <p:cNvPr id="59" name="Curved Connector 73">
             <a:extLst>
               <a:ext uri="{FF2B5EF4-FFF2-40B4-BE49-F238E27FC236}">
-                <a16:creationId xmlns="" xmlns:a16="http://schemas.microsoft.com/office/drawing/2014/main" id="{3D1CA2FA-15DF-AF44-945E-700F8DABE0F0}"/>
+                <a16:creationId xmlns:a16="http://schemas.microsoft.com/office/drawing/2014/main" id="{3D1CA2FA-15DF-AF44-945E-700F8DABE0F0}"/>
               </a:ext>
             </a:extLst>
           </p:cNvPr>
@@ -16051,17 +15913,16 @@
           <a:p>
             <a:pPr algn="ctr"/>
             <a:r>
-              <a:rPr lang="en-US" sz="2000" dirty="0" smtClean="0"/>
+              <a:rPr lang="en-US" sz="2000" dirty="0"/>
               <a:t>Mismatch</a:t>
             </a:r>
           </a:p>
           <a:p>
             <a:pPr algn="ctr"/>
             <a:r>
-              <a:rPr lang="en-US" sz="2000" dirty="0" smtClean="0"/>
+              <a:rPr lang="en-US" sz="2000" dirty="0"/>
               <a:t>Issues</a:t>
             </a:r>
-            <a:endParaRPr lang="en-US" sz="2000" dirty="0"/>
           </a:p>
         </p:txBody>
       </p:sp>
@@ -16070,7 +15931,7 @@
           <p:cNvPr id="70" name="Curved Connector 59">
             <a:extLst>
               <a:ext uri="{FF2B5EF4-FFF2-40B4-BE49-F238E27FC236}">
-                <a16:creationId xmlns="" xmlns:a16="http://schemas.microsoft.com/office/drawing/2014/main" id="{56361E46-CFB5-9248-8E67-947FF6B18BA0}"/>
+                <a16:creationId xmlns:a16="http://schemas.microsoft.com/office/drawing/2014/main" id="{56361E46-CFB5-9248-8E67-947FF6B18BA0}"/>
               </a:ext>
             </a:extLst>
           </p:cNvPr>
@@ -16137,17 +15998,16 @@
           <a:p>
             <a:pPr algn="ctr"/>
             <a:r>
-              <a:rPr lang="en-US" sz="2000" dirty="0" smtClean="0"/>
+              <a:rPr lang="en-US" sz="2000" dirty="0"/>
               <a:t>Revision </a:t>
             </a:r>
           </a:p>
           <a:p>
             <a:pPr algn="ctr"/>
             <a:r>
-              <a:rPr lang="en-US" sz="2000" dirty="0" smtClean="0"/>
+              <a:rPr lang="en-US" sz="2000" dirty="0"/>
               <a:t>DB</a:t>
             </a:r>
-            <a:endParaRPr lang="en-US" sz="2000" dirty="0"/>
           </a:p>
         </p:txBody>
       </p:sp>
@@ -16206,7 +16066,7 @@
           <p:cNvPr id="26" name="TextBox 25">
             <a:extLst>
               <a:ext uri="{FF2B5EF4-FFF2-40B4-BE49-F238E27FC236}">
-                <a16:creationId xmlns="" xmlns:a16="http://schemas.microsoft.com/office/drawing/2014/main" id="{8E115417-89E6-CF46-9DFE-0603E4CEA342}"/>
+                <a16:creationId xmlns:a16="http://schemas.microsoft.com/office/drawing/2014/main" id="{8E115417-89E6-CF46-9DFE-0603E4CEA342}"/>
               </a:ext>
             </a:extLst>
           </p:cNvPr>
@@ -16254,7 +16114,7 @@
           <p:cNvPr id="35" name="Rounded Rectangle 34">
             <a:extLst>
               <a:ext uri="{FF2B5EF4-FFF2-40B4-BE49-F238E27FC236}">
-                <a16:creationId xmlns="" xmlns:a16="http://schemas.microsoft.com/office/drawing/2014/main" id="{DB32C2BA-0B7D-F040-AB58-94D2D873B677}"/>
+                <a16:creationId xmlns:a16="http://schemas.microsoft.com/office/drawing/2014/main" id="{DB32C2BA-0B7D-F040-AB58-94D2D873B677}"/>
               </a:ext>
             </a:extLst>
           </p:cNvPr>
@@ -16315,11 +16175,6 @@
               </a:rPr>
               <a:t>Android Revision Modeler</a:t>
             </a:r>
-            <a:endParaRPr lang="en-US" sz="2400" dirty="0">
-              <a:solidFill>
-                <a:schemeClr val="tx1"/>
-              </a:solidFill>
-            </a:endParaRPr>
           </a:p>
         </p:txBody>
       </p:sp>
@@ -16328,7 +16183,7 @@
           <p:cNvPr id="39" name="Rounded Rectangle 38">
             <a:extLst>
               <a:ext uri="{FF2B5EF4-FFF2-40B4-BE49-F238E27FC236}">
-                <a16:creationId xmlns="" xmlns:a16="http://schemas.microsoft.com/office/drawing/2014/main" id="{DB32C2BA-0B7D-F040-AB58-94D2D873B677}"/>
+                <a16:creationId xmlns:a16="http://schemas.microsoft.com/office/drawing/2014/main" id="{DB32C2BA-0B7D-F040-AB58-94D2D873B677}"/>
               </a:ext>
             </a:extLst>
           </p:cNvPr>
@@ -16382,7 +16237,7 @@
           <a:p>
             <a:pPr algn="ctr"/>
             <a:r>
-              <a:rPr lang="en-US" sz="2400" dirty="0" smtClean="0">
+              <a:rPr lang="en-US" sz="2400" dirty="0">
                 <a:solidFill>
                   <a:schemeClr val="tx1"/>
                 </a:solidFill>
@@ -16393,18 +16248,13 @@
           <a:p>
             <a:pPr algn="ctr"/>
             <a:r>
-              <a:rPr lang="en-US" sz="2400" dirty="0" smtClean="0">
+              <a:rPr lang="en-US" sz="2400" dirty="0">
                 <a:solidFill>
                   <a:schemeClr val="tx1"/>
                 </a:solidFill>
               </a:rPr>
               <a:t>Modeler</a:t>
             </a:r>
-            <a:endParaRPr lang="en-US" sz="2400" dirty="0">
-              <a:solidFill>
-                <a:schemeClr val="tx1"/>
-              </a:solidFill>
-            </a:endParaRPr>
           </a:p>
         </p:txBody>
       </p:sp>
@@ -16413,7 +16263,7 @@
           <p:cNvPr id="41" name="Rounded Rectangle 40">
             <a:extLst>
               <a:ext uri="{FF2B5EF4-FFF2-40B4-BE49-F238E27FC236}">
-                <a16:creationId xmlns="" xmlns:a16="http://schemas.microsoft.com/office/drawing/2014/main" id="{DB32C2BA-0B7D-F040-AB58-94D2D873B677}"/>
+                <a16:creationId xmlns:a16="http://schemas.microsoft.com/office/drawing/2014/main" id="{DB32C2BA-0B7D-F040-AB58-94D2D873B677}"/>
               </a:ext>
             </a:extLst>
           </p:cNvPr>
@@ -16479,7 +16329,7 @@
           <p:cNvPr id="43" name="Curved Connector 59">
             <a:extLst>
               <a:ext uri="{FF2B5EF4-FFF2-40B4-BE49-F238E27FC236}">
-                <a16:creationId xmlns="" xmlns:a16="http://schemas.microsoft.com/office/drawing/2014/main" id="{56361E46-CFB5-9248-8E67-947FF6B18BA0}"/>
+                <a16:creationId xmlns:a16="http://schemas.microsoft.com/office/drawing/2014/main" id="{56361E46-CFB5-9248-8E67-947FF6B18BA0}"/>
               </a:ext>
             </a:extLst>
           </p:cNvPr>
@@ -16554,15 +16404,13 @@
               <a:rPr lang="en-US" dirty="0"/>
               <a:t> </a:t>
             </a:r>
-            <a:endParaRPr lang="en-US" dirty="0" smtClean="0"/>
           </a:p>
           <a:p>
             <a:pPr lvl="0" algn="ctr"/>
             <a:r>
-              <a:rPr lang="en-US" sz="2400" dirty="0" smtClean="0"/>
+              <a:rPr lang="en-US" sz="2400" dirty="0"/>
               <a:t>Detector</a:t>
             </a:r>
-            <a:endParaRPr lang="en-US" sz="2400" dirty="0"/>
           </a:p>
         </p:txBody>
       </p:sp>
@@ -16571,7 +16419,7 @@
           <p:cNvPr id="37" name="Rounded Rectangle 36">
             <a:extLst>
               <a:ext uri="{FF2B5EF4-FFF2-40B4-BE49-F238E27FC236}">
-                <a16:creationId xmlns="" xmlns:a16="http://schemas.microsoft.com/office/drawing/2014/main" id="{39322434-EC85-F440-A08A-BB8939C64696}"/>
+                <a16:creationId xmlns:a16="http://schemas.microsoft.com/office/drawing/2014/main" id="{39322434-EC85-F440-A08A-BB8939C64696}"/>
               </a:ext>
             </a:extLst>
           </p:cNvPr>
@@ -16640,7 +16488,7 @@
           <p:cNvPr id="44" name="Rounded Rectangle 43">
             <a:extLst>
               <a:ext uri="{FF2B5EF4-FFF2-40B4-BE49-F238E27FC236}">
-                <a16:creationId xmlns="" xmlns:a16="http://schemas.microsoft.com/office/drawing/2014/main" id="{39322434-EC85-F440-A08A-BB8939C64696}"/>
+                <a16:creationId xmlns:a16="http://schemas.microsoft.com/office/drawing/2014/main" id="{39322434-EC85-F440-A08A-BB8939C64696}"/>
               </a:ext>
             </a:extLst>
           </p:cNvPr>
@@ -16694,7 +16542,7 @@
           <a:p>
             <a:pPr algn="ctr"/>
             <a:r>
-              <a:rPr lang="en-US" sz="2000" smtClean="0">
+              <a:rPr lang="en-US" sz="2000">
                 <a:solidFill>
                   <a:schemeClr val="tx1"/>
                 </a:solidFill>
@@ -16717,7 +16565,7 @@
           <p:cNvPr id="50" name="Curved Connector 59">
             <a:extLst>
               <a:ext uri="{FF2B5EF4-FFF2-40B4-BE49-F238E27FC236}">
-                <a16:creationId xmlns="" xmlns:a16="http://schemas.microsoft.com/office/drawing/2014/main" id="{56D9BF13-AB6C-E845-8961-B80393CBAF45}"/>
+                <a16:creationId xmlns:a16="http://schemas.microsoft.com/office/drawing/2014/main" id="{56D9BF13-AB6C-E845-8961-B80393CBAF45}"/>
               </a:ext>
             </a:extLst>
           </p:cNvPr>
@@ -16758,7 +16606,7 @@
           <p:cNvPr id="60" name="Curved Connector 59">
             <a:extLst>
               <a:ext uri="{FF2B5EF4-FFF2-40B4-BE49-F238E27FC236}">
-                <a16:creationId xmlns="" xmlns:a16="http://schemas.microsoft.com/office/drawing/2014/main" id="{56361E46-CFB5-9248-8E67-947FF6B18BA0}"/>
+                <a16:creationId xmlns:a16="http://schemas.microsoft.com/office/drawing/2014/main" id="{56361E46-CFB5-9248-8E67-947FF6B18BA0}"/>
               </a:ext>
             </a:extLst>
           </p:cNvPr>
@@ -16829,7 +16677,7 @@
           <p:cNvPr id="20" name="Curved Connector 59">
             <a:extLst>
               <a:ext uri="{FF2B5EF4-FFF2-40B4-BE49-F238E27FC236}">
-                <a16:creationId xmlns="" xmlns:a16="http://schemas.microsoft.com/office/drawing/2014/main" id="{0B6BBEF3-E586-5746-A3EE-56ECF7FFCA8F}"/>
+                <a16:creationId xmlns:a16="http://schemas.microsoft.com/office/drawing/2014/main" id="{0B6BBEF3-E586-5746-A3EE-56ECF7FFCA8F}"/>
               </a:ext>
             </a:extLst>
           </p:cNvPr>
@@ -16871,7 +16719,7 @@
           <p:cNvPr id="21" name="Can 20">
             <a:extLst>
               <a:ext uri="{FF2B5EF4-FFF2-40B4-BE49-F238E27FC236}">
-                <a16:creationId xmlns="" xmlns:a16="http://schemas.microsoft.com/office/drawing/2014/main" id="{D9F2DBDA-57C0-904A-B5A4-5D742186469D}"/>
+                <a16:creationId xmlns:a16="http://schemas.microsoft.com/office/drawing/2014/main" id="{D9F2DBDA-57C0-904A-B5A4-5D742186469D}"/>
               </a:ext>
             </a:extLst>
           </p:cNvPr>
@@ -16931,7 +16779,7 @@
           <p:cNvPr id="27" name="Group 26">
             <a:extLst>
               <a:ext uri="{FF2B5EF4-FFF2-40B4-BE49-F238E27FC236}">
-                <a16:creationId xmlns="" xmlns:a16="http://schemas.microsoft.com/office/drawing/2014/main" id="{D7F20AD9-7CA4-0041-955B-5E18FE4DAC77}"/>
+                <a16:creationId xmlns:a16="http://schemas.microsoft.com/office/drawing/2014/main" id="{D7F20AD9-7CA4-0041-955B-5E18FE4DAC77}"/>
               </a:ext>
             </a:extLst>
           </p:cNvPr>
@@ -16954,7 +16802,7 @@
             <p:cNvPr id="28" name="Snip Single Corner Rectangle 27">
               <a:extLst>
                 <a:ext uri="{FF2B5EF4-FFF2-40B4-BE49-F238E27FC236}">
-                  <a16:creationId xmlns="" xmlns:a16="http://schemas.microsoft.com/office/drawing/2014/main" id="{06FA0D0C-9EA4-F04D-A8A9-5995163A633F}"/>
+                  <a16:creationId xmlns:a16="http://schemas.microsoft.com/office/drawing/2014/main" id="{06FA0D0C-9EA4-F04D-A8A9-5995163A633F}"/>
                 </a:ext>
               </a:extLst>
             </p:cNvPr>
@@ -17006,7 +16854,7 @@
             <p:cNvPr id="29" name="Straight Connector 28">
               <a:extLst>
                 <a:ext uri="{FF2B5EF4-FFF2-40B4-BE49-F238E27FC236}">
-                  <a16:creationId xmlns="" xmlns:a16="http://schemas.microsoft.com/office/drawing/2014/main" id="{308B8246-BD2E-AE48-879F-EBC48ABC90EA}"/>
+                  <a16:creationId xmlns:a16="http://schemas.microsoft.com/office/drawing/2014/main" id="{308B8246-BD2E-AE48-879F-EBC48ABC90EA}"/>
                 </a:ext>
               </a:extLst>
             </p:cNvPr>
@@ -17050,7 +16898,7 @@
             <p:cNvPr id="30" name="Straight Connector 29">
               <a:extLst>
                 <a:ext uri="{FF2B5EF4-FFF2-40B4-BE49-F238E27FC236}">
-                  <a16:creationId xmlns="" xmlns:a16="http://schemas.microsoft.com/office/drawing/2014/main" id="{78CCB9DB-2613-214E-9817-C9A41BE4C724}"/>
+                  <a16:creationId xmlns:a16="http://schemas.microsoft.com/office/drawing/2014/main" id="{78CCB9DB-2613-214E-9817-C9A41BE4C724}"/>
                 </a:ext>
               </a:extLst>
             </p:cNvPr>
@@ -17094,7 +16942,7 @@
             <p:cNvPr id="31" name="Straight Connector 30">
               <a:extLst>
                 <a:ext uri="{FF2B5EF4-FFF2-40B4-BE49-F238E27FC236}">
-                  <a16:creationId xmlns="" xmlns:a16="http://schemas.microsoft.com/office/drawing/2014/main" id="{6B70F2B2-5A83-1F4B-B4D5-AD5064B29D6D}"/>
+                  <a16:creationId xmlns:a16="http://schemas.microsoft.com/office/drawing/2014/main" id="{6B70F2B2-5A83-1F4B-B4D5-AD5064B29D6D}"/>
                 </a:ext>
               </a:extLst>
             </p:cNvPr>
@@ -17138,7 +16986,7 @@
             <p:cNvPr id="32" name="Straight Connector 31">
               <a:extLst>
                 <a:ext uri="{FF2B5EF4-FFF2-40B4-BE49-F238E27FC236}">
-                  <a16:creationId xmlns="" xmlns:a16="http://schemas.microsoft.com/office/drawing/2014/main" id="{77E995BE-6ACF-9B43-8A72-2F40C0D6AE54}"/>
+                  <a16:creationId xmlns:a16="http://schemas.microsoft.com/office/drawing/2014/main" id="{77E995BE-6ACF-9B43-8A72-2F40C0D6AE54}"/>
                 </a:ext>
               </a:extLst>
             </p:cNvPr>
@@ -17183,7 +17031,7 @@
           <p:cNvPr id="33" name="Curved Connector 59">
             <a:extLst>
               <a:ext uri="{FF2B5EF4-FFF2-40B4-BE49-F238E27FC236}">
-                <a16:creationId xmlns="" xmlns:a16="http://schemas.microsoft.com/office/drawing/2014/main" id="{56D9BF13-AB6C-E845-8961-B80393CBAF45}"/>
+                <a16:creationId xmlns:a16="http://schemas.microsoft.com/office/drawing/2014/main" id="{56D9BF13-AB6C-E845-8961-B80393CBAF45}"/>
               </a:ext>
             </a:extLst>
           </p:cNvPr>
@@ -17335,15 +17183,13 @@
               <a:rPr lang="en-US" sz="2000" dirty="0"/>
               <a:t>Android </a:t>
             </a:r>
-            <a:endParaRPr lang="en-US" sz="2000" dirty="0" smtClean="0"/>
           </a:p>
           <a:p>
             <a:pPr algn="ctr"/>
             <a:r>
-              <a:rPr lang="en-US" sz="2000" dirty="0" smtClean="0"/>
+              <a:rPr lang="en-US" sz="2000" dirty="0"/>
               <a:t>Frameworks</a:t>
             </a:r>
-            <a:endParaRPr lang="en-US" sz="2000" dirty="0"/>
           </a:p>
         </p:txBody>
       </p:sp>
@@ -17370,10 +17216,9 @@
           <a:p>
             <a:pPr algn="ctr"/>
             <a:r>
-              <a:rPr lang="en-US" sz="2000" dirty="0" smtClean="0"/>
+              <a:rPr lang="en-US" sz="2000" dirty="0"/>
               <a:t>Application</a:t>
             </a:r>
-            <a:endParaRPr lang="en-US" sz="2000" dirty="0"/>
           </a:p>
         </p:txBody>
       </p:sp>
@@ -17382,7 +17227,7 @@
           <p:cNvPr id="52" name="Curved Connector 59">
             <a:extLst>
               <a:ext uri="{FF2B5EF4-FFF2-40B4-BE49-F238E27FC236}">
-                <a16:creationId xmlns="" xmlns:a16="http://schemas.microsoft.com/office/drawing/2014/main" id="{56361E46-CFB5-9248-8E67-947FF6B18BA0}"/>
+                <a16:creationId xmlns:a16="http://schemas.microsoft.com/office/drawing/2014/main" id="{56361E46-CFB5-9248-8E67-947FF6B18BA0}"/>
               </a:ext>
             </a:extLst>
           </p:cNvPr>
@@ -17425,7 +17270,7 @@
           <p:cNvPr id="59" name="Curved Connector 73">
             <a:extLst>
               <a:ext uri="{FF2B5EF4-FFF2-40B4-BE49-F238E27FC236}">
-                <a16:creationId xmlns="" xmlns:a16="http://schemas.microsoft.com/office/drawing/2014/main" id="{3D1CA2FA-15DF-AF44-945E-700F8DABE0F0}"/>
+                <a16:creationId xmlns:a16="http://schemas.microsoft.com/office/drawing/2014/main" id="{3D1CA2FA-15DF-AF44-945E-700F8DABE0F0}"/>
               </a:ext>
             </a:extLst>
           </p:cNvPr>
@@ -17484,17 +17329,16 @@
           <a:p>
             <a:pPr algn="ctr"/>
             <a:r>
-              <a:rPr lang="en-US" sz="2000" dirty="0" smtClean="0"/>
+              <a:rPr lang="en-US" sz="2000" dirty="0"/>
               <a:t>Mismatch</a:t>
             </a:r>
           </a:p>
           <a:p>
             <a:pPr algn="ctr"/>
             <a:r>
-              <a:rPr lang="en-US" sz="2000" dirty="0" smtClean="0"/>
+              <a:rPr lang="en-US" sz="2000" dirty="0"/>
               <a:t>Issues</a:t>
             </a:r>
-            <a:endParaRPr lang="en-US" sz="2000" dirty="0"/>
           </a:p>
         </p:txBody>
       </p:sp>
@@ -17503,7 +17347,7 @@
           <p:cNvPr id="70" name="Curved Connector 59">
             <a:extLst>
               <a:ext uri="{FF2B5EF4-FFF2-40B4-BE49-F238E27FC236}">
-                <a16:creationId xmlns="" xmlns:a16="http://schemas.microsoft.com/office/drawing/2014/main" id="{56361E46-CFB5-9248-8E67-947FF6B18BA0}"/>
+                <a16:creationId xmlns:a16="http://schemas.microsoft.com/office/drawing/2014/main" id="{56361E46-CFB5-9248-8E67-947FF6B18BA0}"/>
               </a:ext>
             </a:extLst>
           </p:cNvPr>
@@ -17570,17 +17414,16 @@
           <a:p>
             <a:pPr algn="ctr"/>
             <a:r>
-              <a:rPr lang="en-US" sz="2000" dirty="0" smtClean="0"/>
+              <a:rPr lang="en-US" sz="2000" dirty="0"/>
               <a:t>Revision </a:t>
             </a:r>
           </a:p>
           <a:p>
             <a:pPr algn="ctr"/>
             <a:r>
-              <a:rPr lang="en-US" sz="2000" dirty="0" smtClean="0"/>
+              <a:rPr lang="en-US" sz="2000" dirty="0"/>
               <a:t>DB</a:t>
             </a:r>
-            <a:endParaRPr lang="en-US" sz="2000" dirty="0"/>
           </a:p>
         </p:txBody>
       </p:sp>
@@ -17637,7 +17480,7 @@
           <p:cNvPr id="26" name="TextBox 25">
             <a:extLst>
               <a:ext uri="{FF2B5EF4-FFF2-40B4-BE49-F238E27FC236}">
-                <a16:creationId xmlns="" xmlns:a16="http://schemas.microsoft.com/office/drawing/2014/main" id="{8E115417-89E6-CF46-9DFE-0603E4CEA342}"/>
+                <a16:creationId xmlns:a16="http://schemas.microsoft.com/office/drawing/2014/main" id="{8E115417-89E6-CF46-9DFE-0603E4CEA342}"/>
               </a:ext>
             </a:extLst>
           </p:cNvPr>
@@ -17685,7 +17528,7 @@
           <p:cNvPr id="35" name="Rounded Rectangle 34">
             <a:extLst>
               <a:ext uri="{FF2B5EF4-FFF2-40B4-BE49-F238E27FC236}">
-                <a16:creationId xmlns="" xmlns:a16="http://schemas.microsoft.com/office/drawing/2014/main" id="{DB32C2BA-0B7D-F040-AB58-94D2D873B677}"/>
+                <a16:creationId xmlns:a16="http://schemas.microsoft.com/office/drawing/2014/main" id="{DB32C2BA-0B7D-F040-AB58-94D2D873B677}"/>
               </a:ext>
             </a:extLst>
           </p:cNvPr>
@@ -17743,11 +17586,6 @@
               </a:rPr>
               <a:t>Android Revision Modeler</a:t>
             </a:r>
-            <a:endParaRPr lang="en-US" sz="2400" dirty="0">
-              <a:solidFill>
-                <a:schemeClr val="tx1"/>
-              </a:solidFill>
-            </a:endParaRPr>
           </a:p>
         </p:txBody>
       </p:sp>
@@ -17756,7 +17594,7 @@
           <p:cNvPr id="39" name="Rounded Rectangle 38">
             <a:extLst>
               <a:ext uri="{FF2B5EF4-FFF2-40B4-BE49-F238E27FC236}">
-                <a16:creationId xmlns="" xmlns:a16="http://schemas.microsoft.com/office/drawing/2014/main" id="{DB32C2BA-0B7D-F040-AB58-94D2D873B677}"/>
+                <a16:creationId xmlns:a16="http://schemas.microsoft.com/office/drawing/2014/main" id="{DB32C2BA-0B7D-F040-AB58-94D2D873B677}"/>
               </a:ext>
             </a:extLst>
           </p:cNvPr>
@@ -17807,7 +17645,7 @@
           <a:p>
             <a:pPr algn="ctr"/>
             <a:r>
-              <a:rPr lang="en-US" sz="2400" dirty="0" smtClean="0">
+              <a:rPr lang="en-US" sz="2400" dirty="0">
                 <a:solidFill>
                   <a:schemeClr val="tx1"/>
                 </a:solidFill>
@@ -17818,18 +17656,13 @@
           <a:p>
             <a:pPr algn="ctr"/>
             <a:r>
-              <a:rPr lang="en-US" sz="2400" dirty="0" smtClean="0">
+              <a:rPr lang="en-US" sz="2400" dirty="0">
                 <a:solidFill>
                   <a:schemeClr val="tx1"/>
                 </a:solidFill>
               </a:rPr>
               <a:t>Modeler</a:t>
             </a:r>
-            <a:endParaRPr lang="en-US" sz="2400" dirty="0">
-              <a:solidFill>
-                <a:schemeClr val="tx1"/>
-              </a:solidFill>
-            </a:endParaRPr>
           </a:p>
         </p:txBody>
       </p:sp>
@@ -17838,7 +17671,7 @@
           <p:cNvPr id="41" name="Rounded Rectangle 40">
             <a:extLst>
               <a:ext uri="{FF2B5EF4-FFF2-40B4-BE49-F238E27FC236}">
-                <a16:creationId xmlns="" xmlns:a16="http://schemas.microsoft.com/office/drawing/2014/main" id="{DB32C2BA-0B7D-F040-AB58-94D2D873B677}"/>
+                <a16:creationId xmlns:a16="http://schemas.microsoft.com/office/drawing/2014/main" id="{DB32C2BA-0B7D-F040-AB58-94D2D873B677}"/>
               </a:ext>
             </a:extLst>
           </p:cNvPr>
@@ -17901,7 +17734,7 @@
           <p:cNvPr id="43" name="Curved Connector 59">
             <a:extLst>
               <a:ext uri="{FF2B5EF4-FFF2-40B4-BE49-F238E27FC236}">
-                <a16:creationId xmlns="" xmlns:a16="http://schemas.microsoft.com/office/drawing/2014/main" id="{56361E46-CFB5-9248-8E67-947FF6B18BA0}"/>
+                <a16:creationId xmlns:a16="http://schemas.microsoft.com/office/drawing/2014/main" id="{56361E46-CFB5-9248-8E67-947FF6B18BA0}"/>
               </a:ext>
             </a:extLst>
           </p:cNvPr>
@@ -17976,15 +17809,13 @@
               <a:rPr lang="en-US" dirty="0"/>
               <a:t> </a:t>
             </a:r>
-            <a:endParaRPr lang="en-US" dirty="0" smtClean="0"/>
           </a:p>
           <a:p>
             <a:pPr lvl="0" algn="ctr"/>
             <a:r>
-              <a:rPr lang="en-US" sz="2400" dirty="0" smtClean="0"/>
+              <a:rPr lang="en-US" sz="2400" dirty="0"/>
               <a:t>Detector</a:t>
             </a:r>
-            <a:endParaRPr lang="en-US" sz="2400" dirty="0"/>
           </a:p>
         </p:txBody>
       </p:sp>
@@ -17993,7 +17824,7 @@
           <p:cNvPr id="37" name="Rounded Rectangle 36">
             <a:extLst>
               <a:ext uri="{FF2B5EF4-FFF2-40B4-BE49-F238E27FC236}">
-                <a16:creationId xmlns="" xmlns:a16="http://schemas.microsoft.com/office/drawing/2014/main" id="{39322434-EC85-F440-A08A-BB8939C64696}"/>
+                <a16:creationId xmlns:a16="http://schemas.microsoft.com/office/drawing/2014/main" id="{39322434-EC85-F440-A08A-BB8939C64696}"/>
               </a:ext>
             </a:extLst>
           </p:cNvPr>
@@ -18059,7 +17890,7 @@
           <p:cNvPr id="44" name="Rounded Rectangle 43">
             <a:extLst>
               <a:ext uri="{FF2B5EF4-FFF2-40B4-BE49-F238E27FC236}">
-                <a16:creationId xmlns="" xmlns:a16="http://schemas.microsoft.com/office/drawing/2014/main" id="{39322434-EC85-F440-A08A-BB8939C64696}"/>
+                <a16:creationId xmlns:a16="http://schemas.microsoft.com/office/drawing/2014/main" id="{39322434-EC85-F440-A08A-BB8939C64696}"/>
               </a:ext>
             </a:extLst>
           </p:cNvPr>
@@ -18110,7 +17941,7 @@
           <a:p>
             <a:pPr algn="ctr"/>
             <a:r>
-              <a:rPr lang="en-US" sz="2000" smtClean="0">
+              <a:rPr lang="en-US" sz="2000">
                 <a:solidFill>
                   <a:schemeClr val="tx1"/>
                 </a:solidFill>
@@ -18133,7 +17964,7 @@
           <p:cNvPr id="50" name="Curved Connector 59">
             <a:extLst>
               <a:ext uri="{FF2B5EF4-FFF2-40B4-BE49-F238E27FC236}">
-                <a16:creationId xmlns="" xmlns:a16="http://schemas.microsoft.com/office/drawing/2014/main" id="{56D9BF13-AB6C-E845-8961-B80393CBAF45}"/>
+                <a16:creationId xmlns:a16="http://schemas.microsoft.com/office/drawing/2014/main" id="{56D9BF13-AB6C-E845-8961-B80393CBAF45}"/>
               </a:ext>
             </a:extLst>
           </p:cNvPr>
@@ -18174,7 +18005,7 @@
           <p:cNvPr id="60" name="Curved Connector 59">
             <a:extLst>
               <a:ext uri="{FF2B5EF4-FFF2-40B4-BE49-F238E27FC236}">
-                <a16:creationId xmlns="" xmlns:a16="http://schemas.microsoft.com/office/drawing/2014/main" id="{56361E46-CFB5-9248-8E67-947FF6B18BA0}"/>
+                <a16:creationId xmlns:a16="http://schemas.microsoft.com/office/drawing/2014/main" id="{56361E46-CFB5-9248-8E67-947FF6B18BA0}"/>
               </a:ext>
             </a:extLst>
           </p:cNvPr>
@@ -18214,6 +18045,913 @@
     <p:extLst>
       <p:ext uri="{BB962C8B-B14F-4D97-AF65-F5344CB8AC3E}">
         <p14:creationId xmlns:p14="http://schemas.microsoft.com/office/powerpoint/2010/main" val="1803003749"/>
+      </p:ext>
+    </p:extLst>
+  </p:cSld>
+  <p:clrMapOvr>
+    <a:masterClrMapping/>
+  </p:clrMapOvr>
+</p:sld>
+</file>
+
+<file path=ppt/slides/slide9.xml><?xml version="1.0" encoding="utf-8"?>
+<p:sld xmlns:a="http://schemas.openxmlformats.org/drawingml/2006/main" xmlns:r="http://schemas.openxmlformats.org/officeDocument/2006/relationships" xmlns:p="http://schemas.openxmlformats.org/presentationml/2006/main">
+  <p:cSld>
+    <p:spTree>
+      <p:nvGrpSpPr>
+        <p:cNvPr id="1" name=""/>
+        <p:cNvGrpSpPr/>
+        <p:nvPr/>
+      </p:nvGrpSpPr>
+      <p:grpSpPr>
+        <a:xfrm>
+          <a:off x="0" y="0"/>
+          <a:ext cx="0" cy="0"/>
+          <a:chOff x="0" y="0"/>
+          <a:chExt cx="0" cy="0"/>
+        </a:xfrm>
+      </p:grpSpPr>
+      <p:sp>
+        <p:nvSpPr>
+          <p:cNvPr id="33" name="Rectangle 32">
+            <a:extLst>
+              <a:ext uri="{FF2B5EF4-FFF2-40B4-BE49-F238E27FC236}">
+                <a16:creationId xmlns:a16="http://schemas.microsoft.com/office/drawing/2014/main" id="{4FBED2EA-D42D-B545-94FE-EECD803D61CF}"/>
+              </a:ext>
+            </a:extLst>
+          </p:cNvPr>
+          <p:cNvSpPr/>
+          <p:nvPr/>
+        </p:nvSpPr>
+        <p:spPr>
+          <a:xfrm>
+            <a:off x="647658" y="2510970"/>
+            <a:ext cx="7692779" cy="460658"/>
+          </a:xfrm>
+          <a:prstGeom prst="rect">
+            <a:avLst/>
+          </a:prstGeom>
+          <a:solidFill>
+            <a:schemeClr val="bg1">
+              <a:lumMod val="95000"/>
+            </a:schemeClr>
+          </a:solidFill>
+          <a:ln>
+            <a:noFill/>
+          </a:ln>
+        </p:spPr>
+        <p:style>
+          <a:lnRef idx="2">
+            <a:schemeClr val="accent1">
+              <a:shade val="50000"/>
+            </a:schemeClr>
+          </a:lnRef>
+          <a:fillRef idx="1">
+            <a:schemeClr val="accent1"/>
+          </a:fillRef>
+          <a:effectRef idx="0">
+            <a:schemeClr val="accent1"/>
+          </a:effectRef>
+          <a:fontRef idx="minor">
+            <a:schemeClr val="lt1"/>
+          </a:fontRef>
+        </p:style>
+        <p:txBody>
+          <a:bodyPr rtlCol="0" anchor="ctr"/>
+          <a:lstStyle/>
+          <a:p>
+            <a:pPr algn="ctr"/>
+            <a:endParaRPr lang="en-US"/>
+          </a:p>
+        </p:txBody>
+      </p:sp>
+      <p:cxnSp>
+        <p:nvCxnSpPr>
+          <p:cNvPr id="5" name="Straight Arrow Connector 4">
+            <a:extLst>
+              <a:ext uri="{FF2B5EF4-FFF2-40B4-BE49-F238E27FC236}">
+                <a16:creationId xmlns:a16="http://schemas.microsoft.com/office/drawing/2014/main" id="{BDD45CC9-1109-B149-8513-E956BA24F4A1}"/>
+              </a:ext>
+            </a:extLst>
+          </p:cNvPr>
+          <p:cNvCxnSpPr>
+            <a:cxnSpLocks/>
+          </p:cNvCxnSpPr>
+          <p:nvPr/>
+        </p:nvCxnSpPr>
+        <p:spPr>
+          <a:xfrm>
+            <a:off x="2216727" y="2217056"/>
+            <a:ext cx="6123709" cy="0"/>
+          </a:xfrm>
+          <a:prstGeom prst="straightConnector1">
+            <a:avLst/>
+          </a:prstGeom>
+          <a:ln w="38100">
+            <a:tailEnd type="triangle" w="lg" len="lg"/>
+          </a:ln>
+        </p:spPr>
+        <p:style>
+          <a:lnRef idx="1">
+            <a:schemeClr val="dk1"/>
+          </a:lnRef>
+          <a:fillRef idx="0">
+            <a:schemeClr val="dk1"/>
+          </a:fillRef>
+          <a:effectRef idx="0">
+            <a:schemeClr val="dk1"/>
+          </a:effectRef>
+          <a:fontRef idx="minor">
+            <a:schemeClr val="tx1"/>
+          </a:fontRef>
+        </p:style>
+      </p:cxnSp>
+      <p:sp>
+        <p:nvSpPr>
+          <p:cNvPr id="10" name="TextBox 9">
+            <a:extLst>
+              <a:ext uri="{FF2B5EF4-FFF2-40B4-BE49-F238E27FC236}">
+                <a16:creationId xmlns:a16="http://schemas.microsoft.com/office/drawing/2014/main" id="{B62ED961-5D99-6B40-B136-280559D5B1B2}"/>
+              </a:ext>
+            </a:extLst>
+          </p:cNvPr>
+          <p:cNvSpPr txBox="1"/>
+          <p:nvPr/>
+        </p:nvSpPr>
+        <p:spPr>
+          <a:xfrm>
+            <a:off x="7098148" y="2556633"/>
+            <a:ext cx="1009699" cy="369332"/>
+          </a:xfrm>
+          <a:prstGeom prst="rect">
+            <a:avLst/>
+          </a:prstGeom>
+          <a:noFill/>
+        </p:spPr>
+        <p:txBody>
+          <a:bodyPr wrap="none" rtlCol="0">
+            <a:spAutoFit/>
+          </a:bodyPr>
+          <a:lstStyle/>
+          <a:p>
+            <a:pPr algn="ctr"/>
+            <a:r>
+              <a:rPr lang="en-US" dirty="0"/>
+              <a:t>Max. API</a:t>
+            </a:r>
+          </a:p>
+        </p:txBody>
+      </p:sp>
+      <p:sp>
+        <p:nvSpPr>
+          <p:cNvPr id="15" name="TextBox 14">
+            <a:extLst>
+              <a:ext uri="{FF2B5EF4-FFF2-40B4-BE49-F238E27FC236}">
+                <a16:creationId xmlns:a16="http://schemas.microsoft.com/office/drawing/2014/main" id="{E764E595-586D-E34A-8A78-EDDFFAF156CC}"/>
+              </a:ext>
+            </a:extLst>
+          </p:cNvPr>
+          <p:cNvSpPr txBox="1"/>
+          <p:nvPr/>
+        </p:nvSpPr>
+        <p:spPr>
+          <a:xfrm>
+            <a:off x="3397011" y="3051837"/>
+            <a:ext cx="1770741" cy="646331"/>
+          </a:xfrm>
+          <a:prstGeom prst="rect">
+            <a:avLst/>
+          </a:prstGeom>
+          <a:noFill/>
+        </p:spPr>
+        <p:txBody>
+          <a:bodyPr wrap="none" rtlCol="0">
+            <a:spAutoFit/>
+          </a:bodyPr>
+          <a:lstStyle/>
+          <a:p>
+            <a:r>
+              <a:rPr lang="en-US" dirty="0"/>
+              <a:t>Method/callback</a:t>
+            </a:r>
+          </a:p>
+          <a:p>
+            <a:pPr algn="ctr"/>
+            <a:r>
+              <a:rPr lang="en-US" dirty="0"/>
+              <a:t>introduced</a:t>
+            </a:r>
+          </a:p>
+        </p:txBody>
+      </p:sp>
+      <p:sp>
+        <p:nvSpPr>
+          <p:cNvPr id="16" name="TextBox 15">
+            <a:extLst>
+              <a:ext uri="{FF2B5EF4-FFF2-40B4-BE49-F238E27FC236}">
+                <a16:creationId xmlns:a16="http://schemas.microsoft.com/office/drawing/2014/main" id="{047CA50B-7C13-704E-94C5-C8A5D07C7DAE}"/>
+              </a:ext>
+            </a:extLst>
+          </p:cNvPr>
+          <p:cNvSpPr txBox="1"/>
+          <p:nvPr/>
+        </p:nvSpPr>
+        <p:spPr>
+          <a:xfrm>
+            <a:off x="5610755" y="3051837"/>
+            <a:ext cx="1770741" cy="646331"/>
+          </a:xfrm>
+          <a:prstGeom prst="rect">
+            <a:avLst/>
+          </a:prstGeom>
+          <a:noFill/>
+        </p:spPr>
+        <p:txBody>
+          <a:bodyPr wrap="none" rtlCol="0">
+            <a:spAutoFit/>
+          </a:bodyPr>
+          <a:lstStyle/>
+          <a:p>
+            <a:r>
+              <a:rPr lang="en-US" dirty="0"/>
+              <a:t>Method/callback</a:t>
+            </a:r>
+          </a:p>
+          <a:p>
+            <a:pPr algn="ctr"/>
+            <a:r>
+              <a:rPr lang="en-US" dirty="0"/>
+              <a:t>updated</a:t>
+            </a:r>
+          </a:p>
+        </p:txBody>
+      </p:sp>
+      <p:sp>
+        <p:nvSpPr>
+          <p:cNvPr id="11" name="TextBox 10">
+            <a:extLst>
+              <a:ext uri="{FF2B5EF4-FFF2-40B4-BE49-F238E27FC236}">
+                <a16:creationId xmlns:a16="http://schemas.microsoft.com/office/drawing/2014/main" id="{136F3630-A212-9944-9977-FA0013EECFBE}"/>
+              </a:ext>
+            </a:extLst>
+          </p:cNvPr>
+          <p:cNvSpPr txBox="1"/>
+          <p:nvPr/>
+        </p:nvSpPr>
+        <p:spPr>
+          <a:xfrm>
+            <a:off x="4825767" y="2556633"/>
+            <a:ext cx="1126975" cy="369332"/>
+          </a:xfrm>
+          <a:prstGeom prst="rect">
+            <a:avLst/>
+          </a:prstGeom>
+          <a:noFill/>
+        </p:spPr>
+        <p:txBody>
+          <a:bodyPr wrap="none" rtlCol="0">
+            <a:spAutoFit/>
+          </a:bodyPr>
+          <a:lstStyle/>
+          <a:p>
+            <a:r>
+              <a:rPr lang="en-US" dirty="0"/>
+              <a:t>Target API</a:t>
+            </a:r>
+          </a:p>
+        </p:txBody>
+      </p:sp>
+      <p:sp>
+        <p:nvSpPr>
+          <p:cNvPr id="9" name="TextBox 8">
+            <a:extLst>
+              <a:ext uri="{FF2B5EF4-FFF2-40B4-BE49-F238E27FC236}">
+                <a16:creationId xmlns:a16="http://schemas.microsoft.com/office/drawing/2014/main" id="{0E064C99-5DB4-D743-ABAF-B81B037D334E}"/>
+              </a:ext>
+            </a:extLst>
+          </p:cNvPr>
+          <p:cNvSpPr txBox="1"/>
+          <p:nvPr/>
+        </p:nvSpPr>
+        <p:spPr>
+          <a:xfrm>
+            <a:off x="2612804" y="2556633"/>
+            <a:ext cx="976549" cy="369332"/>
+          </a:xfrm>
+          <a:prstGeom prst="rect">
+            <a:avLst/>
+          </a:prstGeom>
+          <a:noFill/>
+        </p:spPr>
+        <p:txBody>
+          <a:bodyPr wrap="none" rtlCol="0">
+            <a:spAutoFit/>
+          </a:bodyPr>
+          <a:lstStyle/>
+          <a:p>
+            <a:r>
+              <a:rPr lang="en-US" dirty="0"/>
+              <a:t>Min. API</a:t>
+            </a:r>
+          </a:p>
+        </p:txBody>
+      </p:sp>
+      <p:sp>
+        <p:nvSpPr>
+          <p:cNvPr id="30" name="TextBox 29">
+            <a:extLst>
+              <a:ext uri="{FF2B5EF4-FFF2-40B4-BE49-F238E27FC236}">
+                <a16:creationId xmlns:a16="http://schemas.microsoft.com/office/drawing/2014/main" id="{C5B6A5E2-7FD7-B446-9399-86CBE6038EC7}"/>
+              </a:ext>
+            </a:extLst>
+          </p:cNvPr>
+          <p:cNvSpPr txBox="1"/>
+          <p:nvPr/>
+        </p:nvSpPr>
+        <p:spPr>
+          <a:xfrm>
+            <a:off x="647658" y="2032390"/>
+            <a:ext cx="1174168" cy="369332"/>
+          </a:xfrm>
+          <a:prstGeom prst="rect">
+            <a:avLst/>
+          </a:prstGeom>
+          <a:noFill/>
+        </p:spPr>
+        <p:txBody>
+          <a:bodyPr wrap="none" rtlCol="0">
+            <a:spAutoFit/>
+          </a:bodyPr>
+          <a:lstStyle/>
+          <a:p>
+            <a:r>
+              <a:rPr lang="en-US" i="1" dirty="0"/>
+              <a:t>Device API</a:t>
+            </a:r>
+          </a:p>
+        </p:txBody>
+      </p:sp>
+      <p:sp>
+        <p:nvSpPr>
+          <p:cNvPr id="31" name="TextBox 30">
+            <a:extLst>
+              <a:ext uri="{FF2B5EF4-FFF2-40B4-BE49-F238E27FC236}">
+                <a16:creationId xmlns:a16="http://schemas.microsoft.com/office/drawing/2014/main" id="{7B153107-2041-8F4E-A82D-92AF08A0E644}"/>
+              </a:ext>
+            </a:extLst>
+          </p:cNvPr>
+          <p:cNvSpPr txBox="1"/>
+          <p:nvPr/>
+        </p:nvSpPr>
+        <p:spPr>
+          <a:xfrm>
+            <a:off x="640118" y="2556633"/>
+            <a:ext cx="554960" cy="369332"/>
+          </a:xfrm>
+          <a:prstGeom prst="rect">
+            <a:avLst/>
+          </a:prstGeom>
+          <a:noFill/>
+        </p:spPr>
+        <p:txBody>
+          <a:bodyPr wrap="none" rtlCol="0">
+            <a:spAutoFit/>
+          </a:bodyPr>
+          <a:lstStyle/>
+          <a:p>
+            <a:r>
+              <a:rPr lang="en-US" i="1" dirty="0"/>
+              <a:t>App</a:t>
+            </a:r>
+          </a:p>
+        </p:txBody>
+      </p:sp>
+      <p:sp>
+        <p:nvSpPr>
+          <p:cNvPr id="32" name="TextBox 31">
+            <a:extLst>
+              <a:ext uri="{FF2B5EF4-FFF2-40B4-BE49-F238E27FC236}">
+                <a16:creationId xmlns:a16="http://schemas.microsoft.com/office/drawing/2014/main" id="{A348CDBD-070C-684F-B096-7284446E3A8E}"/>
+              </a:ext>
+            </a:extLst>
+          </p:cNvPr>
+          <p:cNvSpPr txBox="1"/>
+          <p:nvPr/>
+        </p:nvSpPr>
+        <p:spPr>
+          <a:xfrm>
+            <a:off x="640118" y="3190336"/>
+            <a:ext cx="1754711" cy="369332"/>
+          </a:xfrm>
+          <a:prstGeom prst="rect">
+            <a:avLst/>
+          </a:prstGeom>
+          <a:noFill/>
+        </p:spPr>
+        <p:txBody>
+          <a:bodyPr wrap="none" rtlCol="0">
+            <a:spAutoFit/>
+          </a:bodyPr>
+          <a:lstStyle/>
+          <a:p>
+            <a:r>
+              <a:rPr lang="en-US" i="1" dirty="0"/>
+              <a:t>Android Updates</a:t>
+            </a:r>
+          </a:p>
+        </p:txBody>
+      </p:sp>
+      <p:sp>
+        <p:nvSpPr>
+          <p:cNvPr id="39" name="Rectangle 38">
+            <a:extLst>
+              <a:ext uri="{FF2B5EF4-FFF2-40B4-BE49-F238E27FC236}">
+                <a16:creationId xmlns:a16="http://schemas.microsoft.com/office/drawing/2014/main" id="{E79AF95A-47E0-0347-AA86-D1A5698CFCBF}"/>
+              </a:ext>
+            </a:extLst>
+          </p:cNvPr>
+          <p:cNvSpPr/>
+          <p:nvPr/>
+        </p:nvSpPr>
+        <p:spPr>
+          <a:xfrm>
+            <a:off x="3175510" y="2145174"/>
+            <a:ext cx="1106872" cy="183978"/>
+          </a:xfrm>
+          <a:prstGeom prst="rect">
+            <a:avLst/>
+          </a:prstGeom>
+          <a:solidFill>
+            <a:srgbClr val="C00000"/>
+          </a:solidFill>
+          <a:ln>
+            <a:noFill/>
+          </a:ln>
+        </p:spPr>
+        <p:style>
+          <a:lnRef idx="2">
+            <a:schemeClr val="accent1">
+              <a:shade val="50000"/>
+            </a:schemeClr>
+          </a:lnRef>
+          <a:fillRef idx="1">
+            <a:schemeClr val="accent1"/>
+          </a:fillRef>
+          <a:effectRef idx="0">
+            <a:schemeClr val="accent1"/>
+          </a:effectRef>
+          <a:fontRef idx="minor">
+            <a:schemeClr val="lt1"/>
+          </a:fontRef>
+        </p:style>
+        <p:txBody>
+          <a:bodyPr rtlCol="0" anchor="ctr"/>
+          <a:lstStyle/>
+          <a:p>
+            <a:pPr algn="ctr"/>
+            <a:endParaRPr lang="en-US"/>
+          </a:p>
+        </p:txBody>
+      </p:sp>
+      <p:sp>
+        <p:nvSpPr>
+          <p:cNvPr id="40" name="Rectangle 39">
+            <a:extLst>
+              <a:ext uri="{FF2B5EF4-FFF2-40B4-BE49-F238E27FC236}">
+                <a16:creationId xmlns:a16="http://schemas.microsoft.com/office/drawing/2014/main" id="{FDB32BF3-69FE-9141-ACCC-271D2E75AF72}"/>
+              </a:ext>
+            </a:extLst>
+          </p:cNvPr>
+          <p:cNvSpPr/>
+          <p:nvPr/>
+        </p:nvSpPr>
+        <p:spPr>
+          <a:xfrm>
+            <a:off x="6496125" y="2141638"/>
+            <a:ext cx="1106872" cy="183978"/>
+          </a:xfrm>
+          <a:prstGeom prst="rect">
+            <a:avLst/>
+          </a:prstGeom>
+          <a:solidFill>
+            <a:srgbClr val="C00000"/>
+          </a:solidFill>
+          <a:ln>
+            <a:noFill/>
+          </a:ln>
+        </p:spPr>
+        <p:style>
+          <a:lnRef idx="2">
+            <a:schemeClr val="accent1">
+              <a:shade val="50000"/>
+            </a:schemeClr>
+          </a:lnRef>
+          <a:fillRef idx="1">
+            <a:schemeClr val="accent1"/>
+          </a:fillRef>
+          <a:effectRef idx="0">
+            <a:schemeClr val="accent1"/>
+          </a:effectRef>
+          <a:fontRef idx="minor">
+            <a:schemeClr val="lt1"/>
+          </a:fontRef>
+        </p:style>
+        <p:txBody>
+          <a:bodyPr rtlCol="0" anchor="ctr"/>
+          <a:lstStyle/>
+          <a:p>
+            <a:pPr algn="ctr"/>
+            <a:endParaRPr lang="en-US"/>
+          </a:p>
+        </p:txBody>
+      </p:sp>
+      <p:sp>
+        <p:nvSpPr>
+          <p:cNvPr id="41" name="Rectangle 40">
+            <a:extLst>
+              <a:ext uri="{FF2B5EF4-FFF2-40B4-BE49-F238E27FC236}">
+                <a16:creationId xmlns:a16="http://schemas.microsoft.com/office/drawing/2014/main" id="{2DDCCE20-A08C-C248-A1FF-704B833BAB2B}"/>
+              </a:ext>
+            </a:extLst>
+          </p:cNvPr>
+          <p:cNvSpPr/>
+          <p:nvPr/>
+        </p:nvSpPr>
+        <p:spPr>
+          <a:xfrm>
+            <a:off x="4282381" y="2145070"/>
+            <a:ext cx="2212895" cy="183978"/>
+          </a:xfrm>
+          <a:prstGeom prst="rect">
+            <a:avLst/>
+          </a:prstGeom>
+          <a:solidFill>
+            <a:schemeClr val="accent6">
+              <a:lumMod val="40000"/>
+              <a:lumOff val="60000"/>
+            </a:schemeClr>
+          </a:solidFill>
+          <a:ln>
+            <a:noFill/>
+          </a:ln>
+        </p:spPr>
+        <p:style>
+          <a:lnRef idx="2">
+            <a:schemeClr val="accent1">
+              <a:shade val="50000"/>
+            </a:schemeClr>
+          </a:lnRef>
+          <a:fillRef idx="1">
+            <a:schemeClr val="accent1"/>
+          </a:fillRef>
+          <a:effectRef idx="0">
+            <a:schemeClr val="accent1"/>
+          </a:effectRef>
+          <a:fontRef idx="minor">
+            <a:schemeClr val="lt1"/>
+          </a:fontRef>
+        </p:style>
+        <p:txBody>
+          <a:bodyPr rtlCol="0" anchor="ctr"/>
+          <a:lstStyle/>
+          <a:p>
+            <a:pPr algn="ctr"/>
+            <a:endParaRPr lang="en-US"/>
+          </a:p>
+        </p:txBody>
+      </p:sp>
+      <p:cxnSp>
+        <p:nvCxnSpPr>
+          <p:cNvPr id="14" name="Straight Connector 13">
+            <a:extLst>
+              <a:ext uri="{FF2B5EF4-FFF2-40B4-BE49-F238E27FC236}">
+                <a16:creationId xmlns:a16="http://schemas.microsoft.com/office/drawing/2014/main" id="{AF976DD0-E554-5746-BF33-14CFBD1DB610}"/>
+              </a:ext>
+            </a:extLst>
+          </p:cNvPr>
+          <p:cNvCxnSpPr>
+            <a:cxnSpLocks/>
+          </p:cNvCxnSpPr>
+          <p:nvPr/>
+        </p:nvCxnSpPr>
+        <p:spPr>
+          <a:xfrm>
+            <a:off x="3164400" y="2032390"/>
+            <a:ext cx="0" cy="505898"/>
+          </a:xfrm>
+          <a:prstGeom prst="line">
+            <a:avLst/>
+          </a:prstGeom>
+          <a:ln w="31750"/>
+        </p:spPr>
+        <p:style>
+          <a:lnRef idx="1">
+            <a:schemeClr val="accent1"/>
+          </a:lnRef>
+          <a:fillRef idx="0">
+            <a:schemeClr val="accent1"/>
+          </a:fillRef>
+          <a:effectRef idx="0">
+            <a:schemeClr val="accent1"/>
+          </a:effectRef>
+          <a:fontRef idx="minor">
+            <a:schemeClr val="tx1"/>
+          </a:fontRef>
+        </p:style>
+      </p:cxnSp>
+      <p:cxnSp>
+        <p:nvCxnSpPr>
+          <p:cNvPr id="18" name="Straight Connector 17">
+            <a:extLst>
+              <a:ext uri="{FF2B5EF4-FFF2-40B4-BE49-F238E27FC236}">
+                <a16:creationId xmlns:a16="http://schemas.microsoft.com/office/drawing/2014/main" id="{01620F23-6885-A443-846F-062C3DD8E290}"/>
+              </a:ext>
+            </a:extLst>
+          </p:cNvPr>
+          <p:cNvCxnSpPr>
+            <a:cxnSpLocks/>
+            <a:endCxn id="11" idx="0"/>
+          </p:cNvCxnSpPr>
+          <p:nvPr/>
+        </p:nvCxnSpPr>
+        <p:spPr>
+          <a:xfrm>
+            <a:off x="5389254" y="2024740"/>
+            <a:ext cx="1" cy="531893"/>
+          </a:xfrm>
+          <a:prstGeom prst="line">
+            <a:avLst/>
+          </a:prstGeom>
+          <a:ln w="31750"/>
+        </p:spPr>
+        <p:style>
+          <a:lnRef idx="1">
+            <a:schemeClr val="accent1"/>
+          </a:lnRef>
+          <a:fillRef idx="0">
+            <a:schemeClr val="accent1"/>
+          </a:fillRef>
+          <a:effectRef idx="0">
+            <a:schemeClr val="accent1"/>
+          </a:effectRef>
+          <a:fontRef idx="minor">
+            <a:schemeClr val="tx1"/>
+          </a:fontRef>
+        </p:style>
+      </p:cxnSp>
+      <p:cxnSp>
+        <p:nvCxnSpPr>
+          <p:cNvPr id="20" name="Straight Connector 19">
+            <a:extLst>
+              <a:ext uri="{FF2B5EF4-FFF2-40B4-BE49-F238E27FC236}">
+                <a16:creationId xmlns:a16="http://schemas.microsoft.com/office/drawing/2014/main" id="{2F65CA26-EFAC-9A4B-BFF5-0A9ACFF53187}"/>
+              </a:ext>
+            </a:extLst>
+          </p:cNvPr>
+          <p:cNvCxnSpPr>
+            <a:cxnSpLocks/>
+            <a:endCxn id="16" idx="0"/>
+          </p:cNvCxnSpPr>
+          <p:nvPr/>
+        </p:nvCxnSpPr>
+        <p:spPr>
+          <a:xfrm>
+            <a:off x="6496126" y="2024740"/>
+            <a:ext cx="0" cy="1027097"/>
+          </a:xfrm>
+          <a:prstGeom prst="line">
+            <a:avLst/>
+          </a:prstGeom>
+          <a:ln w="31750"/>
+        </p:spPr>
+        <p:style>
+          <a:lnRef idx="1">
+            <a:schemeClr val="accent1"/>
+          </a:lnRef>
+          <a:fillRef idx="0">
+            <a:schemeClr val="accent1"/>
+          </a:fillRef>
+          <a:effectRef idx="0">
+            <a:schemeClr val="accent1"/>
+          </a:effectRef>
+          <a:fontRef idx="minor">
+            <a:schemeClr val="tx1"/>
+          </a:fontRef>
+        </p:style>
+      </p:cxnSp>
+      <p:cxnSp>
+        <p:nvCxnSpPr>
+          <p:cNvPr id="21" name="Straight Connector 20">
+            <a:extLst>
+              <a:ext uri="{FF2B5EF4-FFF2-40B4-BE49-F238E27FC236}">
+                <a16:creationId xmlns:a16="http://schemas.microsoft.com/office/drawing/2014/main" id="{62FBB8F3-82B1-3042-AB02-7592E2B088E2}"/>
+              </a:ext>
+            </a:extLst>
+          </p:cNvPr>
+          <p:cNvCxnSpPr>
+            <a:cxnSpLocks/>
+            <a:endCxn id="15" idx="0"/>
+          </p:cNvCxnSpPr>
+          <p:nvPr/>
+        </p:nvCxnSpPr>
+        <p:spPr>
+          <a:xfrm>
+            <a:off x="4282382" y="2024740"/>
+            <a:ext cx="0" cy="1027097"/>
+          </a:xfrm>
+          <a:prstGeom prst="line">
+            <a:avLst/>
+          </a:prstGeom>
+          <a:ln w="31750"/>
+        </p:spPr>
+        <p:style>
+          <a:lnRef idx="1">
+            <a:schemeClr val="accent1"/>
+          </a:lnRef>
+          <a:fillRef idx="0">
+            <a:schemeClr val="accent1"/>
+          </a:fillRef>
+          <a:effectRef idx="0">
+            <a:schemeClr val="accent1"/>
+          </a:effectRef>
+          <a:fontRef idx="minor">
+            <a:schemeClr val="tx1"/>
+          </a:fontRef>
+        </p:style>
+      </p:cxnSp>
+      <p:cxnSp>
+        <p:nvCxnSpPr>
+          <p:cNvPr id="26" name="Straight Connector 25">
+            <a:extLst>
+              <a:ext uri="{FF2B5EF4-FFF2-40B4-BE49-F238E27FC236}">
+                <a16:creationId xmlns:a16="http://schemas.microsoft.com/office/drawing/2014/main" id="{96BF3D9F-2BB6-6540-A302-BAC931B24B44}"/>
+              </a:ext>
+            </a:extLst>
+          </p:cNvPr>
+          <p:cNvCxnSpPr>
+            <a:cxnSpLocks/>
+            <a:endCxn id="10" idx="0"/>
+          </p:cNvCxnSpPr>
+          <p:nvPr/>
+        </p:nvCxnSpPr>
+        <p:spPr>
+          <a:xfrm>
+            <a:off x="7602998" y="2024740"/>
+            <a:ext cx="0" cy="531893"/>
+          </a:xfrm>
+          <a:prstGeom prst="line">
+            <a:avLst/>
+          </a:prstGeom>
+          <a:ln w="31750"/>
+        </p:spPr>
+        <p:style>
+          <a:lnRef idx="1">
+            <a:schemeClr val="accent1"/>
+          </a:lnRef>
+          <a:fillRef idx="0">
+            <a:schemeClr val="accent1"/>
+          </a:fillRef>
+          <a:effectRef idx="0">
+            <a:schemeClr val="accent1"/>
+          </a:effectRef>
+          <a:fontRef idx="minor">
+            <a:schemeClr val="tx1"/>
+          </a:fontRef>
+        </p:style>
+      </p:cxnSp>
+      <p:sp>
+        <p:nvSpPr>
+          <p:cNvPr id="44" name="TextBox 43">
+            <a:extLst>
+              <a:ext uri="{FF2B5EF4-FFF2-40B4-BE49-F238E27FC236}">
+                <a16:creationId xmlns:a16="http://schemas.microsoft.com/office/drawing/2014/main" id="{9CCACA91-60FE-1141-A74C-E3EFC71D57FF}"/>
+              </a:ext>
+            </a:extLst>
+          </p:cNvPr>
+          <p:cNvSpPr txBox="1"/>
+          <p:nvPr/>
+        </p:nvSpPr>
+        <p:spPr>
+          <a:xfrm>
+            <a:off x="4816000" y="1595243"/>
+            <a:ext cx="1130118" cy="369332"/>
+          </a:xfrm>
+          <a:prstGeom prst="rect">
+            <a:avLst/>
+          </a:prstGeom>
+          <a:noFill/>
+        </p:spPr>
+        <p:txBody>
+          <a:bodyPr wrap="none" rtlCol="0">
+            <a:spAutoFit/>
+          </a:bodyPr>
+          <a:lstStyle/>
+          <a:p>
+            <a:r>
+              <a:rPr lang="en-US" b="1" dirty="0"/>
+              <a:t>Mismatch</a:t>
+            </a:r>
+          </a:p>
+        </p:txBody>
+      </p:sp>
+      <p:cxnSp>
+        <p:nvCxnSpPr>
+          <p:cNvPr id="46" name="Straight Arrow Connector 45">
+            <a:extLst>
+              <a:ext uri="{FF2B5EF4-FFF2-40B4-BE49-F238E27FC236}">
+                <a16:creationId xmlns:a16="http://schemas.microsoft.com/office/drawing/2014/main" id="{731FB82D-F558-EE41-AE87-08B146496508}"/>
+              </a:ext>
+            </a:extLst>
+          </p:cNvPr>
+          <p:cNvCxnSpPr>
+            <a:cxnSpLocks/>
+            <a:stCxn id="44" idx="1"/>
+            <a:endCxn id="39" idx="0"/>
+          </p:cNvCxnSpPr>
+          <p:nvPr/>
+        </p:nvCxnSpPr>
+        <p:spPr>
+          <a:xfrm rot="10800000" flipV="1">
+            <a:off x="3728946" y="1779908"/>
+            <a:ext cx="1087054" cy="365265"/>
+          </a:xfrm>
+          <a:prstGeom prst="bentConnector2">
+            <a:avLst/>
+          </a:prstGeom>
+          <a:ln w="38100">
+            <a:solidFill>
+              <a:schemeClr val="tx1"/>
+            </a:solidFill>
+            <a:prstDash val="sysDash"/>
+            <a:tailEnd type="triangle"/>
+          </a:ln>
+        </p:spPr>
+        <p:style>
+          <a:lnRef idx="1">
+            <a:schemeClr val="accent1"/>
+          </a:lnRef>
+          <a:fillRef idx="0">
+            <a:schemeClr val="accent1"/>
+          </a:fillRef>
+          <a:effectRef idx="0">
+            <a:schemeClr val="accent1"/>
+          </a:effectRef>
+          <a:fontRef idx="minor">
+            <a:schemeClr val="tx1"/>
+          </a:fontRef>
+        </p:style>
+      </p:cxnSp>
+      <p:cxnSp>
+        <p:nvCxnSpPr>
+          <p:cNvPr id="48" name="Straight Arrow Connector 45">
+            <a:extLst>
+              <a:ext uri="{FF2B5EF4-FFF2-40B4-BE49-F238E27FC236}">
+                <a16:creationId xmlns:a16="http://schemas.microsoft.com/office/drawing/2014/main" id="{0225733A-A117-9547-B08C-88111942C94C}"/>
+              </a:ext>
+            </a:extLst>
+          </p:cNvPr>
+          <p:cNvCxnSpPr>
+            <a:cxnSpLocks/>
+            <a:stCxn id="44" idx="3"/>
+            <a:endCxn id="40" idx="0"/>
+          </p:cNvCxnSpPr>
+          <p:nvPr/>
+        </p:nvCxnSpPr>
+        <p:spPr>
+          <a:xfrm>
+            <a:off x="5946118" y="1779909"/>
+            <a:ext cx="1103443" cy="361729"/>
+          </a:xfrm>
+          <a:prstGeom prst="bentConnector2">
+            <a:avLst/>
+          </a:prstGeom>
+          <a:ln w="38100">
+            <a:solidFill>
+              <a:schemeClr val="tx1"/>
+            </a:solidFill>
+            <a:prstDash val="sysDash"/>
+            <a:tailEnd type="triangle"/>
+          </a:ln>
+        </p:spPr>
+        <p:style>
+          <a:lnRef idx="1">
+            <a:schemeClr val="accent1"/>
+          </a:lnRef>
+          <a:fillRef idx="0">
+            <a:schemeClr val="accent1"/>
+          </a:fillRef>
+          <a:effectRef idx="0">
+            <a:schemeClr val="accent1"/>
+          </a:effectRef>
+          <a:fontRef idx="minor">
+            <a:schemeClr val="tx1"/>
+          </a:fontRef>
+        </p:style>
+      </p:cxnSp>
+    </p:spTree>
+    <p:extLst>
+      <p:ext uri="{BB962C8B-B14F-4D97-AF65-F5344CB8AC3E}">
+        <p14:creationId xmlns:p14="http://schemas.microsoft.com/office/powerpoint/2010/main" val="1064406436"/>
       </p:ext>
     </p:extLst>
   </p:cSld>

</xml_diff>